<commit_message>
updates to file structure
</commit_message>
<xml_diff>
--- a/Formalised_Anal/Prophylaxis_Model.pptx
+++ b/Formalised_Anal/Prophylaxis_Model.pptx
@@ -5,15 +5,16 @@
     <p:sldMasterId id="2147483648" r:id="rId1"/>
   </p:sldMasterIdLst>
   <p:notesMasterIdLst>
-    <p:notesMasterId r:id="rId8"/>
+    <p:notesMasterId r:id="rId9"/>
   </p:notesMasterIdLst>
   <p:sldIdLst>
     <p:sldId id="256" r:id="rId2"/>
     <p:sldId id="257" r:id="rId3"/>
     <p:sldId id="261" r:id="rId4"/>
     <p:sldId id="262" r:id="rId5"/>
-    <p:sldId id="258" r:id="rId6"/>
-    <p:sldId id="259" r:id="rId7"/>
+    <p:sldId id="263" r:id="rId6"/>
+    <p:sldId id="258" r:id="rId7"/>
+    <p:sldId id="259" r:id="rId8"/>
   </p:sldIdLst>
   <p:sldSz cx="12192000" cy="6858000"/>
   <p:notesSz cx="6858000" cy="9144000"/>
@@ -202,7 +203,7 @@
           <a:p>
             <a:fld id="{EEE6165F-F878-B74C-A9CB-1D93544D2133}" type="datetimeFigureOut">
               <a:rPr lang="en-CH" smtClean="0"/>
-              <a:t>20.06.22</a:t>
+              <a:t>29.06.22</a:t>
             </a:fld>
             <a:endParaRPr lang="en-CH"/>
           </a:p>
@@ -782,6 +783,110 @@
 </p:notes>
 </file>
 
+<file path=ppt/notesSlides/notesSlide4.xml><?xml version="1.0" encoding="utf-8"?>
+<p:notes xmlns:a="http://schemas.openxmlformats.org/drawingml/2006/main" xmlns:r="http://schemas.openxmlformats.org/officeDocument/2006/relationships" xmlns:p="http://schemas.openxmlformats.org/presentationml/2006/main">
+  <p:cSld>
+    <p:spTree>
+      <p:nvGrpSpPr>
+        <p:cNvPr id="1" name=""/>
+        <p:cNvGrpSpPr/>
+        <p:nvPr/>
+      </p:nvGrpSpPr>
+      <p:grpSpPr>
+        <a:xfrm>
+          <a:off x="0" y="0"/>
+          <a:ext cx="0" cy="0"/>
+          <a:chOff x="0" y="0"/>
+          <a:chExt cx="0" cy="0"/>
+        </a:xfrm>
+      </p:grpSpPr>
+      <p:sp>
+        <p:nvSpPr>
+          <p:cNvPr id="2" name="Slide Image Placeholder 1"/>
+          <p:cNvSpPr>
+            <a:spLocks noGrp="1" noRot="1" noChangeAspect="1"/>
+          </p:cNvSpPr>
+          <p:nvPr>
+            <p:ph type="sldImg"/>
+          </p:nvPr>
+        </p:nvSpPr>
+        <p:spPr/>
+      </p:sp>
+      <p:sp>
+        <p:nvSpPr>
+          <p:cNvPr id="3" name="Notes Placeholder 2"/>
+          <p:cNvSpPr>
+            <a:spLocks noGrp="1"/>
+          </p:cNvSpPr>
+          <p:nvPr>
+            <p:ph type="body" idx="1"/>
+          </p:nvPr>
+        </p:nvSpPr>
+        <p:spPr/>
+        <p:txBody>
+          <a:bodyPr/>
+          <a:lstStyle/>
+          <a:p>
+            <a:r>
+              <a:rPr lang="en-CH" dirty="0"/>
+              <a:t>Things to consider</a:t>
+            </a:r>
+          </a:p>
+          <a:p>
+            <a:pPr marL="171450" indent="-171450">
+              <a:buFont typeface="Arial" panose="020B0604020202020204" pitchFamily="34" charset="0"/>
+              <a:buChar char="•"/>
+            </a:pPr>
+            <a:r>
+              <a:rPr lang="en-CH" dirty="0"/>
+              <a:t>Differential recovery rates for those who are colonised or clinically infected</a:t>
+            </a:r>
+          </a:p>
+          <a:p>
+            <a:pPr marL="171450" indent="-171450">
+              <a:buFont typeface="Arial" panose="020B0604020202020204" pitchFamily="34" charset="0"/>
+              <a:buChar char="•"/>
+            </a:pPr>
+            <a:endParaRPr lang="en-CH" dirty="0"/>
+          </a:p>
+        </p:txBody>
+      </p:sp>
+      <p:sp>
+        <p:nvSpPr>
+          <p:cNvPr id="4" name="Slide Number Placeholder 3"/>
+          <p:cNvSpPr>
+            <a:spLocks noGrp="1"/>
+          </p:cNvSpPr>
+          <p:nvPr>
+            <p:ph type="sldNum" sz="quarter" idx="5"/>
+          </p:nvPr>
+        </p:nvSpPr>
+        <p:spPr/>
+        <p:txBody>
+          <a:bodyPr/>
+          <a:lstStyle/>
+          <a:p>
+            <a:fld id="{6BC073EA-12D6-9A48-90AF-A5442583D523}" type="slidenum">
+              <a:rPr lang="en-CH" smtClean="0"/>
+              <a:t>5</a:t>
+            </a:fld>
+            <a:endParaRPr lang="en-CH"/>
+          </a:p>
+        </p:txBody>
+      </p:sp>
+    </p:spTree>
+    <p:extLst>
+      <p:ext uri="{BB962C8B-B14F-4D97-AF65-F5344CB8AC3E}">
+        <p14:creationId xmlns:p14="http://schemas.microsoft.com/office/powerpoint/2010/main" val="339380105"/>
+      </p:ext>
+    </p:extLst>
+  </p:cSld>
+  <p:clrMapOvr>
+    <a:masterClrMapping/>
+  </p:clrMapOvr>
+</p:notes>
+</file>
+
 <file path=ppt/slideLayouts/slideLayout1.xml><?xml version="1.0" encoding="utf-8"?>
 <p:sldLayout xmlns:a="http://schemas.openxmlformats.org/drawingml/2006/main" xmlns:r="http://schemas.openxmlformats.org/officeDocument/2006/relationships" xmlns:p="http://schemas.openxmlformats.org/presentationml/2006/main" type="title" preserve="1">
   <p:cSld name="Title Slide">
@@ -931,7 +1036,7 @@
           <a:p>
             <a:fld id="{6B0AB520-85C3-3F4A-BBF1-568BB9EDF9C7}" type="datetimeFigureOut">
               <a:rPr lang="en-CH" smtClean="0"/>
-              <a:t>20.06.22</a:t>
+              <a:t>29.06.22</a:t>
             </a:fld>
             <a:endParaRPr lang="en-CH"/>
           </a:p>
@@ -1131,7 +1236,7 @@
           <a:p>
             <a:fld id="{6B0AB520-85C3-3F4A-BBF1-568BB9EDF9C7}" type="datetimeFigureOut">
               <a:rPr lang="en-CH" smtClean="0"/>
-              <a:t>20.06.22</a:t>
+              <a:t>29.06.22</a:t>
             </a:fld>
             <a:endParaRPr lang="en-CH"/>
           </a:p>
@@ -1341,7 +1446,7 @@
           <a:p>
             <a:fld id="{6B0AB520-85C3-3F4A-BBF1-568BB9EDF9C7}" type="datetimeFigureOut">
               <a:rPr lang="en-CH" smtClean="0"/>
-              <a:t>20.06.22</a:t>
+              <a:t>29.06.22</a:t>
             </a:fld>
             <a:endParaRPr lang="en-CH"/>
           </a:p>
@@ -1541,7 +1646,7 @@
           <a:p>
             <a:fld id="{6B0AB520-85C3-3F4A-BBF1-568BB9EDF9C7}" type="datetimeFigureOut">
               <a:rPr lang="en-CH" smtClean="0"/>
-              <a:t>20.06.22</a:t>
+              <a:t>29.06.22</a:t>
             </a:fld>
             <a:endParaRPr lang="en-CH"/>
           </a:p>
@@ -1817,7 +1922,7 @@
           <a:p>
             <a:fld id="{6B0AB520-85C3-3F4A-BBF1-568BB9EDF9C7}" type="datetimeFigureOut">
               <a:rPr lang="en-CH" smtClean="0"/>
-              <a:t>20.06.22</a:t>
+              <a:t>29.06.22</a:t>
             </a:fld>
             <a:endParaRPr lang="en-CH"/>
           </a:p>
@@ -2085,7 +2190,7 @@
           <a:p>
             <a:fld id="{6B0AB520-85C3-3F4A-BBF1-568BB9EDF9C7}" type="datetimeFigureOut">
               <a:rPr lang="en-CH" smtClean="0"/>
-              <a:t>20.06.22</a:t>
+              <a:t>29.06.22</a:t>
             </a:fld>
             <a:endParaRPr lang="en-CH"/>
           </a:p>
@@ -2500,7 +2605,7 @@
           <a:p>
             <a:fld id="{6B0AB520-85C3-3F4A-BBF1-568BB9EDF9C7}" type="datetimeFigureOut">
               <a:rPr lang="en-CH" smtClean="0"/>
-              <a:t>20.06.22</a:t>
+              <a:t>29.06.22</a:t>
             </a:fld>
             <a:endParaRPr lang="en-CH"/>
           </a:p>
@@ -2642,7 +2747,7 @@
           <a:p>
             <a:fld id="{6B0AB520-85C3-3F4A-BBF1-568BB9EDF9C7}" type="datetimeFigureOut">
               <a:rPr lang="en-CH" smtClean="0"/>
-              <a:t>20.06.22</a:t>
+              <a:t>29.06.22</a:t>
             </a:fld>
             <a:endParaRPr lang="en-CH"/>
           </a:p>
@@ -2755,7 +2860,7 @@
           <a:p>
             <a:fld id="{6B0AB520-85C3-3F4A-BBF1-568BB9EDF9C7}" type="datetimeFigureOut">
               <a:rPr lang="en-CH" smtClean="0"/>
-              <a:t>20.06.22</a:t>
+              <a:t>29.06.22</a:t>
             </a:fld>
             <a:endParaRPr lang="en-CH"/>
           </a:p>
@@ -3068,7 +3173,7 @@
           <a:p>
             <a:fld id="{6B0AB520-85C3-3F4A-BBF1-568BB9EDF9C7}" type="datetimeFigureOut">
               <a:rPr lang="en-CH" smtClean="0"/>
-              <a:t>20.06.22</a:t>
+              <a:t>29.06.22</a:t>
             </a:fld>
             <a:endParaRPr lang="en-CH"/>
           </a:p>
@@ -3357,7 +3462,7 @@
           <a:p>
             <a:fld id="{6B0AB520-85C3-3F4A-BBF1-568BB9EDF9C7}" type="datetimeFigureOut">
               <a:rPr lang="en-CH" smtClean="0"/>
-              <a:t>20.06.22</a:t>
+              <a:t>29.06.22</a:t>
             </a:fld>
             <a:endParaRPr lang="en-CH"/>
           </a:p>
@@ -3600,7 +3705,7 @@
           <a:p>
             <a:fld id="{6B0AB520-85C3-3F4A-BBF1-568BB9EDF9C7}" type="datetimeFigureOut">
               <a:rPr lang="en-CH" smtClean="0"/>
-              <a:t>20.06.22</a:t>
+              <a:t>29.06.22</a:t>
             </a:fld>
             <a:endParaRPr lang="en-CH"/>
           </a:p>
@@ -15390,6 +15495,4202 @@
       </p:grpSpPr>
       <p:sp>
         <p:nvSpPr>
+          <p:cNvPr id="170" name="Rectangle 169">
+            <a:extLst>
+              <a:ext uri="{FF2B5EF4-FFF2-40B4-BE49-F238E27FC236}">
+                <a16:creationId xmlns:a16="http://schemas.microsoft.com/office/drawing/2014/main" id="{312F67DA-41E0-B08E-A790-5B97121F79FD}"/>
+              </a:ext>
+            </a:extLst>
+          </p:cNvPr>
+          <p:cNvSpPr/>
+          <p:nvPr/>
+        </p:nvSpPr>
+        <p:spPr>
+          <a:xfrm>
+            <a:off x="865986" y="541575"/>
+            <a:ext cx="10796631" cy="5679347"/>
+          </a:xfrm>
+          <a:prstGeom prst="rect">
+            <a:avLst/>
+          </a:prstGeom>
+          <a:solidFill>
+            <a:schemeClr val="bg1"/>
+          </a:solidFill>
+          <a:ln>
+            <a:solidFill>
+              <a:schemeClr val="tx1"/>
+            </a:solidFill>
+          </a:ln>
+        </p:spPr>
+        <p:style>
+          <a:lnRef idx="2">
+            <a:schemeClr val="accent1">
+              <a:shade val="50000"/>
+            </a:schemeClr>
+          </a:lnRef>
+          <a:fillRef idx="1">
+            <a:schemeClr val="accent1"/>
+          </a:fillRef>
+          <a:effectRef idx="0">
+            <a:schemeClr val="accent1"/>
+          </a:effectRef>
+          <a:fontRef idx="minor">
+            <a:schemeClr val="lt1"/>
+          </a:fontRef>
+        </p:style>
+        <p:txBody>
+          <a:bodyPr rtlCol="0" anchor="ctr"/>
+          <a:lstStyle/>
+          <a:p>
+            <a:pPr algn="ctr"/>
+            <a:endParaRPr lang="en-CH"/>
+          </a:p>
+        </p:txBody>
+      </p:sp>
+      <p:sp>
+        <p:nvSpPr>
+          <p:cNvPr id="5" name="Rectangle 4">
+            <a:extLst>
+              <a:ext uri="{FF2B5EF4-FFF2-40B4-BE49-F238E27FC236}">
+                <a16:creationId xmlns:a16="http://schemas.microsoft.com/office/drawing/2014/main" id="{E8D56EAC-7D55-1F36-F93A-DAFD0903E858}"/>
+              </a:ext>
+            </a:extLst>
+          </p:cNvPr>
+          <p:cNvSpPr/>
+          <p:nvPr/>
+        </p:nvSpPr>
+        <p:spPr>
+          <a:xfrm>
+            <a:off x="4398875" y="2897731"/>
+            <a:ext cx="914400" cy="914400"/>
+          </a:xfrm>
+          <a:prstGeom prst="rect">
+            <a:avLst/>
+          </a:prstGeom>
+        </p:spPr>
+        <p:style>
+          <a:lnRef idx="2">
+            <a:schemeClr val="accent1">
+              <a:shade val="50000"/>
+            </a:schemeClr>
+          </a:lnRef>
+          <a:fillRef idx="1">
+            <a:schemeClr val="accent1"/>
+          </a:fillRef>
+          <a:effectRef idx="0">
+            <a:schemeClr val="accent1"/>
+          </a:effectRef>
+          <a:fontRef idx="minor">
+            <a:schemeClr val="lt1"/>
+          </a:fontRef>
+        </p:style>
+        <p:txBody>
+          <a:bodyPr rtlCol="0" anchor="ctr"/>
+          <a:lstStyle/>
+          <a:p>
+            <a:pPr algn="ctr"/>
+            <a:r>
+              <a:rPr lang="en-CH" dirty="0"/>
+              <a:t>Wc</a:t>
+            </a:r>
+          </a:p>
+        </p:txBody>
+      </p:sp>
+      <p:sp>
+        <p:nvSpPr>
+          <p:cNvPr id="6" name="Rectangle 5">
+            <a:extLst>
+              <a:ext uri="{FF2B5EF4-FFF2-40B4-BE49-F238E27FC236}">
+                <a16:creationId xmlns:a16="http://schemas.microsoft.com/office/drawing/2014/main" id="{D874BD9B-2793-400A-439D-883393AE44CD}"/>
+              </a:ext>
+            </a:extLst>
+          </p:cNvPr>
+          <p:cNvSpPr/>
+          <p:nvPr/>
+        </p:nvSpPr>
+        <p:spPr>
+          <a:xfrm>
+            <a:off x="1476495" y="774189"/>
+            <a:ext cx="914400" cy="914400"/>
+          </a:xfrm>
+          <a:prstGeom prst="rect">
+            <a:avLst/>
+          </a:prstGeom>
+        </p:spPr>
+        <p:style>
+          <a:lnRef idx="2">
+            <a:schemeClr val="accent1">
+              <a:shade val="50000"/>
+            </a:schemeClr>
+          </a:lnRef>
+          <a:fillRef idx="1">
+            <a:schemeClr val="accent1"/>
+          </a:fillRef>
+          <a:effectRef idx="0">
+            <a:schemeClr val="accent1"/>
+          </a:effectRef>
+          <a:fontRef idx="minor">
+            <a:schemeClr val="lt1"/>
+          </a:fontRef>
+        </p:style>
+        <p:txBody>
+          <a:bodyPr rtlCol="0" anchor="ctr"/>
+          <a:lstStyle/>
+          <a:p>
+            <a:pPr algn="ctr"/>
+            <a:r>
+              <a:rPr lang="en-CH" dirty="0"/>
+              <a:t>P</a:t>
+            </a:r>
+            <a:r>
+              <a:rPr lang="en-CH" baseline="-25000" dirty="0"/>
+              <a:t>1</a:t>
+            </a:r>
+          </a:p>
+        </p:txBody>
+      </p:sp>
+      <p:sp>
+        <p:nvSpPr>
+          <p:cNvPr id="7" name="Rectangle 6">
+            <a:extLst>
+              <a:ext uri="{FF2B5EF4-FFF2-40B4-BE49-F238E27FC236}">
+                <a16:creationId xmlns:a16="http://schemas.microsoft.com/office/drawing/2014/main" id="{ACD8451D-70D9-D4BD-99F6-727BDE2D709E}"/>
+              </a:ext>
+            </a:extLst>
+          </p:cNvPr>
+          <p:cNvSpPr/>
+          <p:nvPr/>
+        </p:nvSpPr>
+        <p:spPr>
+          <a:xfrm>
+            <a:off x="1476495" y="5001634"/>
+            <a:ext cx="914400" cy="914400"/>
+          </a:xfrm>
+          <a:prstGeom prst="rect">
+            <a:avLst/>
+          </a:prstGeom>
+        </p:spPr>
+        <p:style>
+          <a:lnRef idx="2">
+            <a:schemeClr val="accent1">
+              <a:shade val="50000"/>
+            </a:schemeClr>
+          </a:lnRef>
+          <a:fillRef idx="1">
+            <a:schemeClr val="accent1"/>
+          </a:fillRef>
+          <a:effectRef idx="0">
+            <a:schemeClr val="accent1"/>
+          </a:effectRef>
+          <a:fontRef idx="minor">
+            <a:schemeClr val="lt1"/>
+          </a:fontRef>
+        </p:style>
+        <p:txBody>
+          <a:bodyPr rtlCol="0" anchor="ctr"/>
+          <a:lstStyle/>
+          <a:p>
+            <a:pPr algn="ctr"/>
+            <a:r>
+              <a:rPr lang="en-CH" dirty="0"/>
+              <a:t>P</a:t>
+            </a:r>
+            <a:r>
+              <a:rPr lang="en-CH" baseline="-25000" dirty="0"/>
+              <a:t>2</a:t>
+            </a:r>
+          </a:p>
+        </p:txBody>
+      </p:sp>
+      <p:sp>
+        <p:nvSpPr>
+          <p:cNvPr id="8" name="Rectangle 7">
+            <a:extLst>
+              <a:ext uri="{FF2B5EF4-FFF2-40B4-BE49-F238E27FC236}">
+                <a16:creationId xmlns:a16="http://schemas.microsoft.com/office/drawing/2014/main" id="{95399688-3BC2-B4DF-0E6E-DBD228AABCCA}"/>
+              </a:ext>
+            </a:extLst>
+          </p:cNvPr>
+          <p:cNvSpPr/>
+          <p:nvPr/>
+        </p:nvSpPr>
+        <p:spPr>
+          <a:xfrm>
+            <a:off x="7484189" y="2897731"/>
+            <a:ext cx="914400" cy="914400"/>
+          </a:xfrm>
+          <a:prstGeom prst="rect">
+            <a:avLst/>
+          </a:prstGeom>
+        </p:spPr>
+        <p:style>
+          <a:lnRef idx="2">
+            <a:schemeClr val="accent1">
+              <a:shade val="50000"/>
+            </a:schemeClr>
+          </a:lnRef>
+          <a:fillRef idx="1">
+            <a:schemeClr val="accent1"/>
+          </a:fillRef>
+          <a:effectRef idx="0">
+            <a:schemeClr val="accent1"/>
+          </a:effectRef>
+          <a:fontRef idx="minor">
+            <a:schemeClr val="lt1"/>
+          </a:fontRef>
+        </p:style>
+        <p:txBody>
+          <a:bodyPr rtlCol="0" anchor="ctr"/>
+          <a:lstStyle/>
+          <a:p>
+            <a:pPr algn="ctr"/>
+            <a:r>
+              <a:rPr lang="en-CH" dirty="0"/>
+              <a:t>S</a:t>
+            </a:r>
+          </a:p>
+        </p:txBody>
+      </p:sp>
+      <p:sp>
+        <p:nvSpPr>
+          <p:cNvPr id="9" name="Rectangle 8">
+            <a:extLst>
+              <a:ext uri="{FF2B5EF4-FFF2-40B4-BE49-F238E27FC236}">
+                <a16:creationId xmlns:a16="http://schemas.microsoft.com/office/drawing/2014/main" id="{59ED44CC-39F5-4F19-430B-0AAEA4216C94}"/>
+              </a:ext>
+            </a:extLst>
+          </p:cNvPr>
+          <p:cNvSpPr/>
+          <p:nvPr/>
+        </p:nvSpPr>
+        <p:spPr>
+          <a:xfrm>
+            <a:off x="5963414" y="804810"/>
+            <a:ext cx="914400" cy="914400"/>
+          </a:xfrm>
+          <a:prstGeom prst="rect">
+            <a:avLst/>
+          </a:prstGeom>
+        </p:spPr>
+        <p:style>
+          <a:lnRef idx="2">
+            <a:schemeClr val="accent1">
+              <a:shade val="50000"/>
+            </a:schemeClr>
+          </a:lnRef>
+          <a:fillRef idx="1">
+            <a:schemeClr val="accent1"/>
+          </a:fillRef>
+          <a:effectRef idx="0">
+            <a:schemeClr val="accent1"/>
+          </a:effectRef>
+          <a:fontRef idx="minor">
+            <a:schemeClr val="lt1"/>
+          </a:fontRef>
+        </p:style>
+        <p:txBody>
+          <a:bodyPr rtlCol="0" anchor="ctr"/>
+          <a:lstStyle/>
+          <a:p>
+            <a:pPr algn="ctr"/>
+            <a:r>
+              <a:rPr lang="en-CH" dirty="0"/>
+              <a:t>Rc</a:t>
+            </a:r>
+            <a:r>
+              <a:rPr lang="en-CH" baseline="-25000" dirty="0"/>
+              <a:t>1</a:t>
+            </a:r>
+          </a:p>
+        </p:txBody>
+      </p:sp>
+      <p:sp>
+        <p:nvSpPr>
+          <p:cNvPr id="10" name="Rectangle 9">
+            <a:extLst>
+              <a:ext uri="{FF2B5EF4-FFF2-40B4-BE49-F238E27FC236}">
+                <a16:creationId xmlns:a16="http://schemas.microsoft.com/office/drawing/2014/main" id="{DD8601B1-E846-4A08-1629-EB0094DA0A9C}"/>
+              </a:ext>
+            </a:extLst>
+          </p:cNvPr>
+          <p:cNvSpPr/>
+          <p:nvPr/>
+        </p:nvSpPr>
+        <p:spPr>
+          <a:xfrm>
+            <a:off x="5853556" y="4882709"/>
+            <a:ext cx="914400" cy="914400"/>
+          </a:xfrm>
+          <a:prstGeom prst="rect">
+            <a:avLst/>
+          </a:prstGeom>
+        </p:spPr>
+        <p:style>
+          <a:lnRef idx="2">
+            <a:schemeClr val="accent1">
+              <a:shade val="50000"/>
+            </a:schemeClr>
+          </a:lnRef>
+          <a:fillRef idx="1">
+            <a:schemeClr val="accent1"/>
+          </a:fillRef>
+          <a:effectRef idx="0">
+            <a:schemeClr val="accent1"/>
+          </a:effectRef>
+          <a:fontRef idx="minor">
+            <a:schemeClr val="lt1"/>
+          </a:fontRef>
+        </p:style>
+        <p:txBody>
+          <a:bodyPr rtlCol="0" anchor="ctr"/>
+          <a:lstStyle/>
+          <a:p>
+            <a:pPr algn="ctr"/>
+            <a:r>
+              <a:rPr lang="en-CH" dirty="0"/>
+              <a:t>Rc</a:t>
+            </a:r>
+            <a:r>
+              <a:rPr lang="en-CH" baseline="-25000" dirty="0"/>
+              <a:t>2</a:t>
+            </a:r>
+          </a:p>
+        </p:txBody>
+      </p:sp>
+      <p:cxnSp>
+        <p:nvCxnSpPr>
+          <p:cNvPr id="12" name="Straight Arrow Connector 11">
+            <a:extLst>
+              <a:ext uri="{FF2B5EF4-FFF2-40B4-BE49-F238E27FC236}">
+                <a16:creationId xmlns:a16="http://schemas.microsoft.com/office/drawing/2014/main" id="{E459EF55-1515-DB46-4441-40E409CE7D1A}"/>
+              </a:ext>
+            </a:extLst>
+          </p:cNvPr>
+          <p:cNvCxnSpPr>
+            <a:cxnSpLocks/>
+          </p:cNvCxnSpPr>
+          <p:nvPr/>
+        </p:nvCxnSpPr>
+        <p:spPr>
+          <a:xfrm>
+            <a:off x="5375420" y="3354931"/>
+            <a:ext cx="1955707" cy="0"/>
+          </a:xfrm>
+          <a:prstGeom prst="straightConnector1">
+            <a:avLst/>
+          </a:prstGeom>
+          <a:ln w="12700">
+            <a:solidFill>
+              <a:srgbClr val="FF0000"/>
+            </a:solidFill>
+            <a:headEnd type="triangle"/>
+            <a:tailEnd type="none"/>
+          </a:ln>
+        </p:spPr>
+        <p:style>
+          <a:lnRef idx="1">
+            <a:schemeClr val="accent1"/>
+          </a:lnRef>
+          <a:fillRef idx="0">
+            <a:schemeClr val="accent1"/>
+          </a:fillRef>
+          <a:effectRef idx="0">
+            <a:schemeClr val="accent1"/>
+          </a:effectRef>
+          <a:fontRef idx="minor">
+            <a:schemeClr val="tx1"/>
+          </a:fontRef>
+        </p:style>
+      </p:cxnSp>
+      <p:cxnSp>
+        <p:nvCxnSpPr>
+          <p:cNvPr id="13" name="Straight Arrow Connector 12">
+            <a:extLst>
+              <a:ext uri="{FF2B5EF4-FFF2-40B4-BE49-F238E27FC236}">
+                <a16:creationId xmlns:a16="http://schemas.microsoft.com/office/drawing/2014/main" id="{904BC260-66FB-7035-ED30-860471B2A69B}"/>
+              </a:ext>
+            </a:extLst>
+          </p:cNvPr>
+          <p:cNvCxnSpPr>
+            <a:cxnSpLocks/>
+          </p:cNvCxnSpPr>
+          <p:nvPr/>
+        </p:nvCxnSpPr>
+        <p:spPr>
+          <a:xfrm>
+            <a:off x="5394287" y="3472577"/>
+            <a:ext cx="1936840" cy="0"/>
+          </a:xfrm>
+          <a:prstGeom prst="straightConnector1">
+            <a:avLst/>
+          </a:prstGeom>
+          <a:ln>
+            <a:solidFill>
+              <a:schemeClr val="accent4"/>
+            </a:solidFill>
+            <a:headEnd type="none"/>
+            <a:tailEnd type="triangle"/>
+          </a:ln>
+        </p:spPr>
+        <p:style>
+          <a:lnRef idx="1">
+            <a:schemeClr val="accent1"/>
+          </a:lnRef>
+          <a:fillRef idx="0">
+            <a:schemeClr val="accent1"/>
+          </a:fillRef>
+          <a:effectRef idx="0">
+            <a:schemeClr val="accent1"/>
+          </a:effectRef>
+          <a:fontRef idx="minor">
+            <a:schemeClr val="tx1"/>
+          </a:fontRef>
+        </p:style>
+      </p:cxnSp>
+      <p:cxnSp>
+        <p:nvCxnSpPr>
+          <p:cNvPr id="22" name="Straight Arrow Connector 21">
+            <a:extLst>
+              <a:ext uri="{FF2B5EF4-FFF2-40B4-BE49-F238E27FC236}">
+                <a16:creationId xmlns:a16="http://schemas.microsoft.com/office/drawing/2014/main" id="{7CA8D4D3-3FDB-6D37-462E-4BB4C8BA0E3E}"/>
+              </a:ext>
+            </a:extLst>
+          </p:cNvPr>
+          <p:cNvCxnSpPr>
+            <a:cxnSpLocks/>
+          </p:cNvCxnSpPr>
+          <p:nvPr/>
+        </p:nvCxnSpPr>
+        <p:spPr>
+          <a:xfrm flipH="1" flipV="1">
+            <a:off x="6932378" y="1333942"/>
+            <a:ext cx="916134" cy="1569841"/>
+          </a:xfrm>
+          <a:prstGeom prst="straightConnector1">
+            <a:avLst/>
+          </a:prstGeom>
+          <a:ln w="12700">
+            <a:solidFill>
+              <a:srgbClr val="FF0000"/>
+            </a:solidFill>
+            <a:tailEnd type="triangle"/>
+          </a:ln>
+        </p:spPr>
+        <p:style>
+          <a:lnRef idx="1">
+            <a:schemeClr val="accent1"/>
+          </a:lnRef>
+          <a:fillRef idx="0">
+            <a:schemeClr val="accent1"/>
+          </a:fillRef>
+          <a:effectRef idx="0">
+            <a:schemeClr val="accent1"/>
+          </a:effectRef>
+          <a:fontRef idx="minor">
+            <a:schemeClr val="tx1"/>
+          </a:fontRef>
+        </p:style>
+      </p:cxnSp>
+      <p:cxnSp>
+        <p:nvCxnSpPr>
+          <p:cNvPr id="25" name="Straight Arrow Connector 24">
+            <a:extLst>
+              <a:ext uri="{FF2B5EF4-FFF2-40B4-BE49-F238E27FC236}">
+                <a16:creationId xmlns:a16="http://schemas.microsoft.com/office/drawing/2014/main" id="{B84A9E84-22F6-ED9D-4347-DFFC0B9DAFC3}"/>
+              </a:ext>
+            </a:extLst>
+          </p:cNvPr>
+          <p:cNvCxnSpPr>
+            <a:cxnSpLocks/>
+          </p:cNvCxnSpPr>
+          <p:nvPr/>
+        </p:nvCxnSpPr>
+        <p:spPr>
+          <a:xfrm flipH="1" flipV="1">
+            <a:off x="6925390" y="1502390"/>
+            <a:ext cx="764372" cy="1367051"/>
+          </a:xfrm>
+          <a:prstGeom prst="straightConnector1">
+            <a:avLst/>
+          </a:prstGeom>
+          <a:ln>
+            <a:solidFill>
+              <a:srgbClr val="00B050"/>
+            </a:solidFill>
+            <a:headEnd type="triangle"/>
+            <a:tailEnd type="none"/>
+          </a:ln>
+        </p:spPr>
+        <p:style>
+          <a:lnRef idx="1">
+            <a:schemeClr val="accent1"/>
+          </a:lnRef>
+          <a:fillRef idx="0">
+            <a:schemeClr val="accent1"/>
+          </a:fillRef>
+          <a:effectRef idx="0">
+            <a:schemeClr val="accent1"/>
+          </a:effectRef>
+          <a:fontRef idx="minor">
+            <a:schemeClr val="tx1"/>
+          </a:fontRef>
+        </p:style>
+      </p:cxnSp>
+      <p:cxnSp>
+        <p:nvCxnSpPr>
+          <p:cNvPr id="30" name="Straight Arrow Connector 29">
+            <a:extLst>
+              <a:ext uri="{FF2B5EF4-FFF2-40B4-BE49-F238E27FC236}">
+                <a16:creationId xmlns:a16="http://schemas.microsoft.com/office/drawing/2014/main" id="{1F82BF90-6814-C800-1405-03C9DB7CB4B0}"/>
+              </a:ext>
+            </a:extLst>
+          </p:cNvPr>
+          <p:cNvCxnSpPr>
+            <a:cxnSpLocks/>
+          </p:cNvCxnSpPr>
+          <p:nvPr/>
+        </p:nvCxnSpPr>
+        <p:spPr>
+          <a:xfrm flipH="1">
+            <a:off x="6877814" y="3869709"/>
+            <a:ext cx="1039341" cy="1547132"/>
+          </a:xfrm>
+          <a:prstGeom prst="straightConnector1">
+            <a:avLst/>
+          </a:prstGeom>
+          <a:ln w="12700">
+            <a:solidFill>
+              <a:srgbClr val="FF0000"/>
+            </a:solidFill>
+            <a:tailEnd type="triangle"/>
+          </a:ln>
+        </p:spPr>
+        <p:style>
+          <a:lnRef idx="1">
+            <a:schemeClr val="accent1"/>
+          </a:lnRef>
+          <a:fillRef idx="0">
+            <a:schemeClr val="accent1"/>
+          </a:fillRef>
+          <a:effectRef idx="0">
+            <a:schemeClr val="accent1"/>
+          </a:effectRef>
+          <a:fontRef idx="minor">
+            <a:schemeClr val="tx1"/>
+          </a:fontRef>
+        </p:style>
+      </p:cxnSp>
+      <p:cxnSp>
+        <p:nvCxnSpPr>
+          <p:cNvPr id="34" name="Straight Arrow Connector 33">
+            <a:extLst>
+              <a:ext uri="{FF2B5EF4-FFF2-40B4-BE49-F238E27FC236}">
+                <a16:creationId xmlns:a16="http://schemas.microsoft.com/office/drawing/2014/main" id="{669CE1E1-8D6E-A25B-B978-61F03609D979}"/>
+              </a:ext>
+            </a:extLst>
+          </p:cNvPr>
+          <p:cNvCxnSpPr>
+            <a:cxnSpLocks/>
+          </p:cNvCxnSpPr>
+          <p:nvPr/>
+        </p:nvCxnSpPr>
+        <p:spPr>
+          <a:xfrm flipH="1">
+            <a:off x="6856351" y="3864649"/>
+            <a:ext cx="943163" cy="1370390"/>
+          </a:xfrm>
+          <a:prstGeom prst="straightConnector1">
+            <a:avLst/>
+          </a:prstGeom>
+          <a:ln>
+            <a:solidFill>
+              <a:srgbClr val="00B050"/>
+            </a:solidFill>
+            <a:headEnd type="triangle"/>
+            <a:tailEnd type="none"/>
+          </a:ln>
+        </p:spPr>
+        <p:style>
+          <a:lnRef idx="1">
+            <a:schemeClr val="accent1"/>
+          </a:lnRef>
+          <a:fillRef idx="0">
+            <a:schemeClr val="accent1"/>
+          </a:fillRef>
+          <a:effectRef idx="0">
+            <a:schemeClr val="accent1"/>
+          </a:effectRef>
+          <a:fontRef idx="minor">
+            <a:schemeClr val="tx1"/>
+          </a:fontRef>
+        </p:style>
+      </p:cxnSp>
+      <p:cxnSp>
+        <p:nvCxnSpPr>
+          <p:cNvPr id="36" name="Straight Arrow Connector 35">
+            <a:extLst>
+              <a:ext uri="{FF2B5EF4-FFF2-40B4-BE49-F238E27FC236}">
+                <a16:creationId xmlns:a16="http://schemas.microsoft.com/office/drawing/2014/main" id="{970FBB40-4F42-F0A4-7A48-C3C9A84ED85A}"/>
+              </a:ext>
+            </a:extLst>
+          </p:cNvPr>
+          <p:cNvCxnSpPr>
+            <a:cxnSpLocks/>
+          </p:cNvCxnSpPr>
+          <p:nvPr/>
+        </p:nvCxnSpPr>
+        <p:spPr>
+          <a:xfrm flipV="1">
+            <a:off x="4746853" y="1334356"/>
+            <a:ext cx="1124492" cy="1485856"/>
+          </a:xfrm>
+          <a:prstGeom prst="straightConnector1">
+            <a:avLst/>
+          </a:prstGeom>
+          <a:ln>
+            <a:solidFill>
+              <a:schemeClr val="accent4"/>
+            </a:solidFill>
+            <a:tailEnd type="triangle"/>
+          </a:ln>
+        </p:spPr>
+        <p:style>
+          <a:lnRef idx="1">
+            <a:schemeClr val="accent1"/>
+          </a:lnRef>
+          <a:fillRef idx="0">
+            <a:schemeClr val="accent1"/>
+          </a:fillRef>
+          <a:effectRef idx="0">
+            <a:schemeClr val="accent1"/>
+          </a:effectRef>
+          <a:fontRef idx="minor">
+            <a:schemeClr val="tx1"/>
+          </a:fontRef>
+        </p:style>
+      </p:cxnSp>
+      <p:cxnSp>
+        <p:nvCxnSpPr>
+          <p:cNvPr id="38" name="Straight Arrow Connector 37">
+            <a:extLst>
+              <a:ext uri="{FF2B5EF4-FFF2-40B4-BE49-F238E27FC236}">
+                <a16:creationId xmlns:a16="http://schemas.microsoft.com/office/drawing/2014/main" id="{8AB963E8-20D3-4C9A-2D3F-B19E7A678FB5}"/>
+              </a:ext>
+            </a:extLst>
+          </p:cNvPr>
+          <p:cNvCxnSpPr>
+            <a:cxnSpLocks/>
+          </p:cNvCxnSpPr>
+          <p:nvPr/>
+        </p:nvCxnSpPr>
+        <p:spPr>
+          <a:xfrm flipV="1">
+            <a:off x="4978573" y="1579488"/>
+            <a:ext cx="871831" cy="1200598"/>
+          </a:xfrm>
+          <a:prstGeom prst="straightConnector1">
+            <a:avLst/>
+          </a:prstGeom>
+          <a:ln>
+            <a:solidFill>
+              <a:schemeClr val="accent2"/>
+            </a:solidFill>
+            <a:headEnd type="triangle"/>
+            <a:tailEnd type="none"/>
+          </a:ln>
+        </p:spPr>
+        <p:style>
+          <a:lnRef idx="1">
+            <a:schemeClr val="accent1"/>
+          </a:lnRef>
+          <a:fillRef idx="0">
+            <a:schemeClr val="accent1"/>
+          </a:fillRef>
+          <a:effectRef idx="0">
+            <a:schemeClr val="accent1"/>
+          </a:effectRef>
+          <a:fontRef idx="minor">
+            <a:schemeClr val="tx1"/>
+          </a:fontRef>
+        </p:style>
+      </p:cxnSp>
+      <p:cxnSp>
+        <p:nvCxnSpPr>
+          <p:cNvPr id="41" name="Straight Arrow Connector 40">
+            <a:extLst>
+              <a:ext uri="{FF2B5EF4-FFF2-40B4-BE49-F238E27FC236}">
+                <a16:creationId xmlns:a16="http://schemas.microsoft.com/office/drawing/2014/main" id="{B6BC6212-A366-6858-A5C1-171890792A8B}"/>
+              </a:ext>
+            </a:extLst>
+          </p:cNvPr>
+          <p:cNvCxnSpPr>
+            <a:cxnSpLocks/>
+          </p:cNvCxnSpPr>
+          <p:nvPr/>
+        </p:nvCxnSpPr>
+        <p:spPr>
+          <a:xfrm>
+            <a:off x="4964911" y="3899999"/>
+            <a:ext cx="809128" cy="1189314"/>
+          </a:xfrm>
+          <a:prstGeom prst="straightConnector1">
+            <a:avLst/>
+          </a:prstGeom>
+          <a:ln>
+            <a:solidFill>
+              <a:schemeClr val="accent2"/>
+            </a:solidFill>
+            <a:headEnd type="triangle"/>
+            <a:tailEnd type="none"/>
+          </a:ln>
+        </p:spPr>
+        <p:style>
+          <a:lnRef idx="1">
+            <a:schemeClr val="accent1"/>
+          </a:lnRef>
+          <a:fillRef idx="0">
+            <a:schemeClr val="accent1"/>
+          </a:fillRef>
+          <a:effectRef idx="0">
+            <a:schemeClr val="accent1"/>
+          </a:effectRef>
+          <a:fontRef idx="minor">
+            <a:schemeClr val="tx1"/>
+          </a:fontRef>
+        </p:style>
+      </p:cxnSp>
+      <p:cxnSp>
+        <p:nvCxnSpPr>
+          <p:cNvPr id="44" name="Straight Arrow Connector 43">
+            <a:extLst>
+              <a:ext uri="{FF2B5EF4-FFF2-40B4-BE49-F238E27FC236}">
+                <a16:creationId xmlns:a16="http://schemas.microsoft.com/office/drawing/2014/main" id="{66FD9E5B-6100-5A1B-EC71-0DC637470681}"/>
+              </a:ext>
+            </a:extLst>
+          </p:cNvPr>
+          <p:cNvCxnSpPr>
+            <a:cxnSpLocks/>
+          </p:cNvCxnSpPr>
+          <p:nvPr/>
+        </p:nvCxnSpPr>
+        <p:spPr>
+          <a:xfrm>
+            <a:off x="4774548" y="3846305"/>
+            <a:ext cx="1039249" cy="1486236"/>
+          </a:xfrm>
+          <a:prstGeom prst="straightConnector1">
+            <a:avLst/>
+          </a:prstGeom>
+          <a:ln>
+            <a:solidFill>
+              <a:schemeClr val="accent4"/>
+            </a:solidFill>
+            <a:tailEnd type="triangle"/>
+          </a:ln>
+        </p:spPr>
+        <p:style>
+          <a:lnRef idx="1">
+            <a:schemeClr val="accent1"/>
+          </a:lnRef>
+          <a:fillRef idx="0">
+            <a:schemeClr val="accent1"/>
+          </a:fillRef>
+          <a:effectRef idx="0">
+            <a:schemeClr val="accent1"/>
+          </a:effectRef>
+          <a:fontRef idx="minor">
+            <a:schemeClr val="tx1"/>
+          </a:fontRef>
+        </p:style>
+      </p:cxnSp>
+      <p:cxnSp>
+        <p:nvCxnSpPr>
+          <p:cNvPr id="54" name="Straight Arrow Connector 53">
+            <a:extLst>
+              <a:ext uri="{FF2B5EF4-FFF2-40B4-BE49-F238E27FC236}">
+                <a16:creationId xmlns:a16="http://schemas.microsoft.com/office/drawing/2014/main" id="{A0BB4E15-B96A-130B-07AA-792C1AAC9F8C}"/>
+              </a:ext>
+            </a:extLst>
+          </p:cNvPr>
+          <p:cNvCxnSpPr>
+            <a:cxnSpLocks/>
+          </p:cNvCxnSpPr>
+          <p:nvPr/>
+        </p:nvCxnSpPr>
+        <p:spPr>
+          <a:xfrm flipH="1" flipV="1">
+            <a:off x="2425150" y="1256708"/>
+            <a:ext cx="5013004" cy="1843224"/>
+          </a:xfrm>
+          <a:prstGeom prst="straightConnector1">
+            <a:avLst/>
+          </a:prstGeom>
+          <a:ln w="12700">
+            <a:solidFill>
+              <a:schemeClr val="accent4"/>
+            </a:solidFill>
+            <a:prstDash val="solid"/>
+            <a:headEnd type="none"/>
+            <a:tailEnd type="triangle"/>
+          </a:ln>
+        </p:spPr>
+        <p:style>
+          <a:lnRef idx="1">
+            <a:schemeClr val="accent1"/>
+          </a:lnRef>
+          <a:fillRef idx="0">
+            <a:schemeClr val="accent1"/>
+          </a:fillRef>
+          <a:effectRef idx="0">
+            <a:schemeClr val="accent1"/>
+          </a:effectRef>
+          <a:fontRef idx="minor">
+            <a:schemeClr val="tx1"/>
+          </a:fontRef>
+        </p:style>
+      </p:cxnSp>
+      <p:sp>
+        <p:nvSpPr>
+          <p:cNvPr id="77" name="Rectangle 76">
+            <a:extLst>
+              <a:ext uri="{FF2B5EF4-FFF2-40B4-BE49-F238E27FC236}">
+                <a16:creationId xmlns:a16="http://schemas.microsoft.com/office/drawing/2014/main" id="{3D910747-FE90-810B-3BA3-F1C287B9008B}"/>
+              </a:ext>
+            </a:extLst>
+          </p:cNvPr>
+          <p:cNvSpPr/>
+          <p:nvPr/>
+        </p:nvSpPr>
+        <p:spPr>
+          <a:xfrm>
+            <a:off x="9274508" y="802446"/>
+            <a:ext cx="914400" cy="914400"/>
+          </a:xfrm>
+          <a:prstGeom prst="rect">
+            <a:avLst/>
+          </a:prstGeom>
+        </p:spPr>
+        <p:style>
+          <a:lnRef idx="2">
+            <a:schemeClr val="accent1">
+              <a:shade val="50000"/>
+            </a:schemeClr>
+          </a:lnRef>
+          <a:fillRef idx="1">
+            <a:schemeClr val="accent1"/>
+          </a:fillRef>
+          <a:effectRef idx="0">
+            <a:schemeClr val="accent1"/>
+          </a:effectRef>
+          <a:fontRef idx="minor">
+            <a:schemeClr val="lt1"/>
+          </a:fontRef>
+        </p:style>
+        <p:txBody>
+          <a:bodyPr rtlCol="0" anchor="ctr"/>
+          <a:lstStyle/>
+          <a:p>
+            <a:pPr algn="ctr"/>
+            <a:r>
+              <a:rPr lang="en-CH" dirty="0"/>
+              <a:t>Ri</a:t>
+            </a:r>
+            <a:r>
+              <a:rPr lang="en-CH" baseline="-25000" dirty="0"/>
+              <a:t>1</a:t>
+            </a:r>
+          </a:p>
+        </p:txBody>
+      </p:sp>
+      <p:sp>
+        <p:nvSpPr>
+          <p:cNvPr id="78" name="Rectangle 77">
+            <a:extLst>
+              <a:ext uri="{FF2B5EF4-FFF2-40B4-BE49-F238E27FC236}">
+                <a16:creationId xmlns:a16="http://schemas.microsoft.com/office/drawing/2014/main" id="{3AD3F629-999A-E1D1-CB08-72D3F08317B2}"/>
+              </a:ext>
+            </a:extLst>
+          </p:cNvPr>
+          <p:cNvSpPr/>
+          <p:nvPr/>
+        </p:nvSpPr>
+        <p:spPr>
+          <a:xfrm>
+            <a:off x="10491561" y="2897731"/>
+            <a:ext cx="914400" cy="914400"/>
+          </a:xfrm>
+          <a:prstGeom prst="rect">
+            <a:avLst/>
+          </a:prstGeom>
+        </p:spPr>
+        <p:style>
+          <a:lnRef idx="2">
+            <a:schemeClr val="accent1">
+              <a:shade val="50000"/>
+            </a:schemeClr>
+          </a:lnRef>
+          <a:fillRef idx="1">
+            <a:schemeClr val="accent1"/>
+          </a:fillRef>
+          <a:effectRef idx="0">
+            <a:schemeClr val="accent1"/>
+          </a:effectRef>
+          <a:fontRef idx="minor">
+            <a:schemeClr val="lt1"/>
+          </a:fontRef>
+        </p:style>
+        <p:txBody>
+          <a:bodyPr rtlCol="0" anchor="ctr"/>
+          <a:lstStyle/>
+          <a:p>
+            <a:pPr algn="ctr"/>
+            <a:r>
+              <a:rPr lang="en-CH" dirty="0"/>
+              <a:t>Wi</a:t>
+            </a:r>
+          </a:p>
+        </p:txBody>
+      </p:sp>
+      <p:sp>
+        <p:nvSpPr>
+          <p:cNvPr id="79" name="Rectangle 78">
+            <a:extLst>
+              <a:ext uri="{FF2B5EF4-FFF2-40B4-BE49-F238E27FC236}">
+                <a16:creationId xmlns:a16="http://schemas.microsoft.com/office/drawing/2014/main" id="{EF1DDAAD-7133-3781-981D-FCCB44FC6176}"/>
+              </a:ext>
+            </a:extLst>
+          </p:cNvPr>
+          <p:cNvSpPr/>
+          <p:nvPr/>
+        </p:nvSpPr>
+        <p:spPr>
+          <a:xfrm>
+            <a:off x="9276855" y="4910259"/>
+            <a:ext cx="914400" cy="914400"/>
+          </a:xfrm>
+          <a:prstGeom prst="rect">
+            <a:avLst/>
+          </a:prstGeom>
+        </p:spPr>
+        <p:style>
+          <a:lnRef idx="2">
+            <a:schemeClr val="accent1">
+              <a:shade val="50000"/>
+            </a:schemeClr>
+          </a:lnRef>
+          <a:fillRef idx="1">
+            <a:schemeClr val="accent1"/>
+          </a:fillRef>
+          <a:effectRef idx="0">
+            <a:schemeClr val="accent1"/>
+          </a:effectRef>
+          <a:fontRef idx="minor">
+            <a:schemeClr val="lt1"/>
+          </a:fontRef>
+        </p:style>
+        <p:txBody>
+          <a:bodyPr rtlCol="0" anchor="ctr"/>
+          <a:lstStyle/>
+          <a:p>
+            <a:pPr algn="ctr"/>
+            <a:r>
+              <a:rPr lang="en-CH" dirty="0"/>
+              <a:t>Ri</a:t>
+            </a:r>
+            <a:r>
+              <a:rPr lang="en-CH" baseline="-25000" dirty="0"/>
+              <a:t>2</a:t>
+            </a:r>
+          </a:p>
+        </p:txBody>
+      </p:sp>
+      <p:cxnSp>
+        <p:nvCxnSpPr>
+          <p:cNvPr id="83" name="Straight Arrow Connector 82">
+            <a:extLst>
+              <a:ext uri="{FF2B5EF4-FFF2-40B4-BE49-F238E27FC236}">
+                <a16:creationId xmlns:a16="http://schemas.microsoft.com/office/drawing/2014/main" id="{E9F27304-477A-7BEA-4D10-53B116EEFB6B}"/>
+              </a:ext>
+            </a:extLst>
+          </p:cNvPr>
+          <p:cNvCxnSpPr>
+            <a:cxnSpLocks/>
+          </p:cNvCxnSpPr>
+          <p:nvPr/>
+        </p:nvCxnSpPr>
+        <p:spPr>
+          <a:xfrm flipV="1">
+            <a:off x="8416895" y="1745092"/>
+            <a:ext cx="1209695" cy="1419715"/>
+          </a:xfrm>
+          <a:prstGeom prst="straightConnector1">
+            <a:avLst/>
+          </a:prstGeom>
+          <a:ln w="12700">
+            <a:solidFill>
+              <a:srgbClr val="FF0000"/>
+            </a:solidFill>
+            <a:tailEnd type="triangle"/>
+          </a:ln>
+        </p:spPr>
+        <p:style>
+          <a:lnRef idx="1">
+            <a:schemeClr val="accent1"/>
+          </a:lnRef>
+          <a:fillRef idx="0">
+            <a:schemeClr val="accent1"/>
+          </a:fillRef>
+          <a:effectRef idx="0">
+            <a:schemeClr val="accent1"/>
+          </a:effectRef>
+          <a:fontRef idx="minor">
+            <a:schemeClr val="tx1"/>
+          </a:fontRef>
+        </p:style>
+      </p:cxnSp>
+      <p:cxnSp>
+        <p:nvCxnSpPr>
+          <p:cNvPr id="86" name="Straight Arrow Connector 85">
+            <a:extLst>
+              <a:ext uri="{FF2B5EF4-FFF2-40B4-BE49-F238E27FC236}">
+                <a16:creationId xmlns:a16="http://schemas.microsoft.com/office/drawing/2014/main" id="{EB771F4F-7A63-FAB8-DC11-D0B2D6DEDE2C}"/>
+              </a:ext>
+            </a:extLst>
+          </p:cNvPr>
+          <p:cNvCxnSpPr>
+            <a:cxnSpLocks/>
+          </p:cNvCxnSpPr>
+          <p:nvPr/>
+        </p:nvCxnSpPr>
+        <p:spPr>
+          <a:xfrm>
+            <a:off x="8423330" y="3599531"/>
+            <a:ext cx="1209695" cy="1292486"/>
+          </a:xfrm>
+          <a:prstGeom prst="straightConnector1">
+            <a:avLst/>
+          </a:prstGeom>
+          <a:ln w="12700">
+            <a:solidFill>
+              <a:srgbClr val="FF0000"/>
+            </a:solidFill>
+            <a:tailEnd type="triangle"/>
+          </a:ln>
+        </p:spPr>
+        <p:style>
+          <a:lnRef idx="1">
+            <a:schemeClr val="accent1"/>
+          </a:lnRef>
+          <a:fillRef idx="0">
+            <a:schemeClr val="accent1"/>
+          </a:fillRef>
+          <a:effectRef idx="0">
+            <a:schemeClr val="accent1"/>
+          </a:effectRef>
+          <a:fontRef idx="minor">
+            <a:schemeClr val="tx1"/>
+          </a:fontRef>
+        </p:style>
+      </p:cxnSp>
+      <p:cxnSp>
+        <p:nvCxnSpPr>
+          <p:cNvPr id="89" name="Straight Arrow Connector 88">
+            <a:extLst>
+              <a:ext uri="{FF2B5EF4-FFF2-40B4-BE49-F238E27FC236}">
+                <a16:creationId xmlns:a16="http://schemas.microsoft.com/office/drawing/2014/main" id="{ED45F5ED-CB40-C80C-DECB-CBFE54D27D22}"/>
+              </a:ext>
+            </a:extLst>
+          </p:cNvPr>
+          <p:cNvCxnSpPr>
+            <a:cxnSpLocks/>
+          </p:cNvCxnSpPr>
+          <p:nvPr/>
+        </p:nvCxnSpPr>
+        <p:spPr>
+          <a:xfrm>
+            <a:off x="8449007" y="3459511"/>
+            <a:ext cx="1951865" cy="0"/>
+          </a:xfrm>
+          <a:prstGeom prst="straightConnector1">
+            <a:avLst/>
+          </a:prstGeom>
+          <a:ln w="12700">
+            <a:solidFill>
+              <a:srgbClr val="FF0000"/>
+            </a:solidFill>
+            <a:tailEnd type="triangle"/>
+          </a:ln>
+        </p:spPr>
+        <p:style>
+          <a:lnRef idx="1">
+            <a:schemeClr val="accent1"/>
+          </a:lnRef>
+          <a:fillRef idx="0">
+            <a:schemeClr val="accent1"/>
+          </a:fillRef>
+          <a:effectRef idx="0">
+            <a:schemeClr val="accent1"/>
+          </a:effectRef>
+          <a:fontRef idx="minor">
+            <a:schemeClr val="tx1"/>
+          </a:fontRef>
+        </p:style>
+      </p:cxnSp>
+      <p:cxnSp>
+        <p:nvCxnSpPr>
+          <p:cNvPr id="94" name="Straight Arrow Connector 93">
+            <a:extLst>
+              <a:ext uri="{FF2B5EF4-FFF2-40B4-BE49-F238E27FC236}">
+                <a16:creationId xmlns:a16="http://schemas.microsoft.com/office/drawing/2014/main" id="{3A18606E-69EC-3033-D56B-6C5CCFCEE5C5}"/>
+              </a:ext>
+            </a:extLst>
+          </p:cNvPr>
+          <p:cNvCxnSpPr>
+            <a:cxnSpLocks/>
+          </p:cNvCxnSpPr>
+          <p:nvPr/>
+        </p:nvCxnSpPr>
+        <p:spPr>
+          <a:xfrm flipH="1">
+            <a:off x="8471547" y="3345111"/>
+            <a:ext cx="1929325" cy="0"/>
+          </a:xfrm>
+          <a:prstGeom prst="straightConnector1">
+            <a:avLst/>
+          </a:prstGeom>
+          <a:ln>
+            <a:solidFill>
+              <a:schemeClr val="accent1"/>
+            </a:solidFill>
+            <a:tailEnd type="triangle"/>
+          </a:ln>
+        </p:spPr>
+        <p:style>
+          <a:lnRef idx="1">
+            <a:schemeClr val="accent1"/>
+          </a:lnRef>
+          <a:fillRef idx="0">
+            <a:schemeClr val="accent1"/>
+          </a:fillRef>
+          <a:effectRef idx="0">
+            <a:schemeClr val="accent1"/>
+          </a:effectRef>
+          <a:fontRef idx="minor">
+            <a:schemeClr val="tx1"/>
+          </a:fontRef>
+        </p:style>
+      </p:cxnSp>
+      <p:cxnSp>
+        <p:nvCxnSpPr>
+          <p:cNvPr id="107" name="Straight Arrow Connector 106">
+            <a:extLst>
+              <a:ext uri="{FF2B5EF4-FFF2-40B4-BE49-F238E27FC236}">
+                <a16:creationId xmlns:a16="http://schemas.microsoft.com/office/drawing/2014/main" id="{4E50A660-2068-13EB-2F48-F20099CA3710}"/>
+              </a:ext>
+            </a:extLst>
+          </p:cNvPr>
+          <p:cNvCxnSpPr>
+            <a:cxnSpLocks/>
+          </p:cNvCxnSpPr>
+          <p:nvPr/>
+        </p:nvCxnSpPr>
+        <p:spPr>
+          <a:xfrm>
+            <a:off x="8474139" y="3497243"/>
+            <a:ext cx="1256452" cy="1342443"/>
+          </a:xfrm>
+          <a:prstGeom prst="straightConnector1">
+            <a:avLst/>
+          </a:prstGeom>
+          <a:ln>
+            <a:solidFill>
+              <a:schemeClr val="accent1"/>
+            </a:solidFill>
+            <a:headEnd type="triangle"/>
+            <a:tailEnd type="none"/>
+          </a:ln>
+        </p:spPr>
+        <p:style>
+          <a:lnRef idx="1">
+            <a:schemeClr val="accent1"/>
+          </a:lnRef>
+          <a:fillRef idx="0">
+            <a:schemeClr val="accent1"/>
+          </a:fillRef>
+          <a:effectRef idx="0">
+            <a:schemeClr val="accent1"/>
+          </a:effectRef>
+          <a:fontRef idx="minor">
+            <a:schemeClr val="tx1"/>
+          </a:fontRef>
+        </p:style>
+      </p:cxnSp>
+      <p:cxnSp>
+        <p:nvCxnSpPr>
+          <p:cNvPr id="109" name="Straight Arrow Connector 108">
+            <a:extLst>
+              <a:ext uri="{FF2B5EF4-FFF2-40B4-BE49-F238E27FC236}">
+                <a16:creationId xmlns:a16="http://schemas.microsoft.com/office/drawing/2014/main" id="{99A5E974-013D-3B10-658B-2639ADA9E2BC}"/>
+              </a:ext>
+            </a:extLst>
+          </p:cNvPr>
+          <p:cNvCxnSpPr>
+            <a:cxnSpLocks/>
+          </p:cNvCxnSpPr>
+          <p:nvPr/>
+        </p:nvCxnSpPr>
+        <p:spPr>
+          <a:xfrm flipV="1">
+            <a:off x="8489278" y="1789447"/>
+            <a:ext cx="1257526" cy="1475850"/>
+          </a:xfrm>
+          <a:prstGeom prst="straightConnector1">
+            <a:avLst/>
+          </a:prstGeom>
+          <a:ln>
+            <a:solidFill>
+              <a:schemeClr val="accent1"/>
+            </a:solidFill>
+            <a:headEnd type="triangle"/>
+            <a:tailEnd type="none"/>
+          </a:ln>
+        </p:spPr>
+        <p:style>
+          <a:lnRef idx="1">
+            <a:schemeClr val="accent1"/>
+          </a:lnRef>
+          <a:fillRef idx="0">
+            <a:schemeClr val="accent1"/>
+          </a:fillRef>
+          <a:effectRef idx="0">
+            <a:schemeClr val="accent1"/>
+          </a:effectRef>
+          <a:fontRef idx="minor">
+            <a:schemeClr val="tx1"/>
+          </a:fontRef>
+        </p:style>
+      </p:cxnSp>
+      <p:sp>
+        <p:nvSpPr>
+          <p:cNvPr id="113" name="TextBox 112">
+            <a:extLst>
+              <a:ext uri="{FF2B5EF4-FFF2-40B4-BE49-F238E27FC236}">
+                <a16:creationId xmlns:a16="http://schemas.microsoft.com/office/drawing/2014/main" id="{7C3F5D16-8A1D-16B9-21D2-950CF8A4B6D0}"/>
+              </a:ext>
+            </a:extLst>
+          </p:cNvPr>
+          <p:cNvSpPr txBox="1"/>
+          <p:nvPr/>
+        </p:nvSpPr>
+        <p:spPr>
+          <a:xfrm>
+            <a:off x="3409867" y="5167426"/>
+            <a:ext cx="277640" cy="307777"/>
+          </a:xfrm>
+          <a:prstGeom prst="rect">
+            <a:avLst/>
+          </a:prstGeom>
+          <a:noFill/>
+        </p:spPr>
+        <p:txBody>
+          <a:bodyPr wrap="none" rtlCol="0">
+            <a:spAutoFit/>
+          </a:bodyPr>
+          <a:lstStyle/>
+          <a:p>
+            <a:r>
+              <a:rPr lang="en-GB" sz="1400" dirty="0">
+                <a:solidFill>
+                  <a:srgbClr val="7030A0"/>
+                </a:solidFill>
+                <a:sym typeface="Symbol" pitchFamily="2" charset="2"/>
+              </a:rPr>
+              <a:t></a:t>
+            </a:r>
+            <a:endParaRPr lang="en-CH" sz="1400" dirty="0">
+              <a:solidFill>
+                <a:srgbClr val="7030A0"/>
+              </a:solidFill>
+            </a:endParaRPr>
+          </a:p>
+        </p:txBody>
+      </p:sp>
+      <p:sp>
+        <p:nvSpPr>
+          <p:cNvPr id="116" name="TextBox 115">
+            <a:extLst>
+              <a:ext uri="{FF2B5EF4-FFF2-40B4-BE49-F238E27FC236}">
+                <a16:creationId xmlns:a16="http://schemas.microsoft.com/office/drawing/2014/main" id="{6C64CB59-7F81-23E7-4D27-A93954FB0056}"/>
+              </a:ext>
+            </a:extLst>
+          </p:cNvPr>
+          <p:cNvSpPr txBox="1"/>
+          <p:nvPr/>
+        </p:nvSpPr>
+        <p:spPr>
+          <a:xfrm>
+            <a:off x="7209161" y="4815831"/>
+            <a:ext cx="1431033" cy="307777"/>
+          </a:xfrm>
+          <a:prstGeom prst="rect">
+            <a:avLst/>
+          </a:prstGeom>
+          <a:noFill/>
+        </p:spPr>
+        <p:txBody>
+          <a:bodyPr wrap="none" rtlCol="0">
+            <a:spAutoFit/>
+          </a:bodyPr>
+          <a:lstStyle/>
+          <a:p>
+            <a:r>
+              <a:rPr lang="en-CH" sz="1400" dirty="0">
+                <a:solidFill>
+                  <a:srgbClr val="FF0000"/>
+                </a:solidFill>
+              </a:rPr>
+              <a:t>ßS(R</a:t>
+            </a:r>
+            <a:r>
+              <a:rPr lang="en-CH" sz="1400" baseline="-25000" dirty="0">
+                <a:solidFill>
+                  <a:srgbClr val="FF0000"/>
+                </a:solidFill>
+              </a:rPr>
+              <a:t>i2</a:t>
+            </a:r>
+            <a:r>
+              <a:rPr lang="en-CH" sz="1400" dirty="0">
+                <a:solidFill>
+                  <a:srgbClr val="FF0000"/>
+                </a:solidFill>
+              </a:rPr>
+              <a:t>+R</a:t>
+            </a:r>
+            <a:r>
+              <a:rPr lang="en-CH" sz="1400" baseline="-25000" dirty="0">
+                <a:solidFill>
+                  <a:srgbClr val="FF0000"/>
+                </a:solidFill>
+              </a:rPr>
+              <a:t>c2</a:t>
+            </a:r>
+            <a:r>
+              <a:rPr lang="en-CH" sz="1400" dirty="0">
+                <a:solidFill>
+                  <a:srgbClr val="FF0000"/>
+                </a:solidFill>
+              </a:rPr>
+              <a:t>)*</a:t>
+            </a:r>
+            <a:r>
+              <a:rPr lang="en-CH" sz="1400" dirty="0">
+                <a:solidFill>
+                  <a:srgbClr val="FF0000"/>
+                </a:solidFill>
+                <a:sym typeface="Symbol" pitchFamily="2" charset="2"/>
+              </a:rPr>
+              <a:t> </a:t>
+            </a:r>
+            <a:r>
+              <a:rPr lang="en-CH" sz="1400" dirty="0">
+                <a:solidFill>
+                  <a:srgbClr val="FF0000"/>
+                </a:solidFill>
+              </a:rPr>
+              <a:t>*f</a:t>
+            </a:r>
+            <a:r>
+              <a:rPr lang="en-CH" sz="1400" baseline="-25000" dirty="0">
+                <a:solidFill>
+                  <a:srgbClr val="FF0000"/>
+                </a:solidFill>
+              </a:rPr>
+              <a:t>c2</a:t>
+            </a:r>
+          </a:p>
+        </p:txBody>
+      </p:sp>
+      <p:sp>
+        <p:nvSpPr>
+          <p:cNvPr id="117" name="TextBox 116">
+            <a:extLst>
+              <a:ext uri="{FF2B5EF4-FFF2-40B4-BE49-F238E27FC236}">
+                <a16:creationId xmlns:a16="http://schemas.microsoft.com/office/drawing/2014/main" id="{8D5FE14E-8D6F-AC04-7423-1ABC75C867E8}"/>
+              </a:ext>
+            </a:extLst>
+          </p:cNvPr>
+          <p:cNvSpPr txBox="1"/>
+          <p:nvPr/>
+        </p:nvSpPr>
+        <p:spPr>
+          <a:xfrm>
+            <a:off x="5859236" y="3087611"/>
+            <a:ext cx="1158843" cy="307777"/>
+          </a:xfrm>
+          <a:prstGeom prst="rect">
+            <a:avLst/>
+          </a:prstGeom>
+          <a:noFill/>
+        </p:spPr>
+        <p:txBody>
+          <a:bodyPr wrap="none" rtlCol="0">
+            <a:spAutoFit/>
+          </a:bodyPr>
+          <a:lstStyle/>
+          <a:p>
+            <a:r>
+              <a:rPr lang="en-CH" sz="1400" dirty="0">
+                <a:solidFill>
+                  <a:srgbClr val="FF0000"/>
+                </a:solidFill>
+              </a:rPr>
+              <a:t>ßS(Wc+W</a:t>
+            </a:r>
+            <a:r>
+              <a:rPr lang="en-CH" sz="1400" baseline="-25000" dirty="0">
+                <a:solidFill>
+                  <a:srgbClr val="FF0000"/>
+                </a:solidFill>
+              </a:rPr>
+              <a:t>i</a:t>
+            </a:r>
+            <a:r>
+              <a:rPr lang="en-CH" sz="1400" dirty="0">
+                <a:solidFill>
+                  <a:srgbClr val="FF0000"/>
+                </a:solidFill>
+              </a:rPr>
+              <a:t>)*</a:t>
+            </a:r>
+            <a:r>
+              <a:rPr lang="en-CH" sz="1400" dirty="0">
+                <a:solidFill>
+                  <a:srgbClr val="FF0000"/>
+                </a:solidFill>
+                <a:sym typeface="Symbol" pitchFamily="2" charset="2"/>
+              </a:rPr>
+              <a:t></a:t>
+            </a:r>
+            <a:endParaRPr lang="en-CH" sz="1400" dirty="0">
+              <a:solidFill>
+                <a:srgbClr val="FF0000"/>
+              </a:solidFill>
+            </a:endParaRPr>
+          </a:p>
+        </p:txBody>
+      </p:sp>
+      <p:sp>
+        <p:nvSpPr>
+          <p:cNvPr id="118" name="TextBox 117">
+            <a:extLst>
+              <a:ext uri="{FF2B5EF4-FFF2-40B4-BE49-F238E27FC236}">
+                <a16:creationId xmlns:a16="http://schemas.microsoft.com/office/drawing/2014/main" id="{721C6ACE-F03D-7870-4D23-ADD79CB86C02}"/>
+              </a:ext>
+            </a:extLst>
+          </p:cNvPr>
+          <p:cNvSpPr txBox="1"/>
+          <p:nvPr/>
+        </p:nvSpPr>
+        <p:spPr>
+          <a:xfrm>
+            <a:off x="7517525" y="2175235"/>
+            <a:ext cx="1390958" cy="307777"/>
+          </a:xfrm>
+          <a:prstGeom prst="rect">
+            <a:avLst/>
+          </a:prstGeom>
+          <a:noFill/>
+        </p:spPr>
+        <p:txBody>
+          <a:bodyPr wrap="none" rtlCol="0">
+            <a:spAutoFit/>
+          </a:bodyPr>
+          <a:lstStyle/>
+          <a:p>
+            <a:r>
+              <a:rPr lang="en-CH" sz="1400" dirty="0">
+                <a:solidFill>
+                  <a:srgbClr val="FF0000"/>
+                </a:solidFill>
+              </a:rPr>
+              <a:t>ßS(R</a:t>
+            </a:r>
+            <a:r>
+              <a:rPr lang="en-CH" sz="1400" baseline="-25000" dirty="0">
+                <a:solidFill>
+                  <a:srgbClr val="FF0000"/>
+                </a:solidFill>
+              </a:rPr>
+              <a:t>i1</a:t>
+            </a:r>
+            <a:r>
+              <a:rPr lang="en-CH" sz="1400" dirty="0">
+                <a:solidFill>
+                  <a:srgbClr val="FF0000"/>
+                </a:solidFill>
+              </a:rPr>
+              <a:t>+R</a:t>
+            </a:r>
+            <a:r>
+              <a:rPr lang="en-CH" sz="1400" baseline="-25000" dirty="0">
+                <a:solidFill>
+                  <a:srgbClr val="FF0000"/>
+                </a:solidFill>
+              </a:rPr>
+              <a:t>c1</a:t>
+            </a:r>
+            <a:r>
+              <a:rPr lang="en-CH" sz="1400" dirty="0">
+                <a:solidFill>
+                  <a:srgbClr val="FF0000"/>
+                </a:solidFill>
+              </a:rPr>
+              <a:t>)*</a:t>
+            </a:r>
+            <a:r>
+              <a:rPr lang="en-CH" sz="1400" dirty="0">
+                <a:solidFill>
+                  <a:srgbClr val="FF0000"/>
+                </a:solidFill>
+                <a:sym typeface="Symbol" pitchFamily="2" charset="2"/>
+              </a:rPr>
+              <a:t></a:t>
+            </a:r>
+            <a:r>
+              <a:rPr lang="en-CH" sz="1400" dirty="0">
+                <a:solidFill>
+                  <a:srgbClr val="FF0000"/>
+                </a:solidFill>
+              </a:rPr>
+              <a:t>*f</a:t>
+            </a:r>
+            <a:r>
+              <a:rPr lang="en-CH" sz="1400" baseline="-25000" dirty="0">
+                <a:solidFill>
+                  <a:srgbClr val="FF0000"/>
+                </a:solidFill>
+              </a:rPr>
+              <a:t>c1</a:t>
+            </a:r>
+            <a:endParaRPr lang="en-CH" sz="1400" dirty="0">
+              <a:solidFill>
+                <a:srgbClr val="FF0000"/>
+              </a:solidFill>
+            </a:endParaRPr>
+          </a:p>
+        </p:txBody>
+      </p:sp>
+      <p:sp>
+        <p:nvSpPr>
+          <p:cNvPr id="119" name="TextBox 118">
+            <a:extLst>
+              <a:ext uri="{FF2B5EF4-FFF2-40B4-BE49-F238E27FC236}">
+                <a16:creationId xmlns:a16="http://schemas.microsoft.com/office/drawing/2014/main" id="{EFF02EE0-9546-1C31-6955-2D4F2CF1986D}"/>
+              </a:ext>
+            </a:extLst>
+          </p:cNvPr>
+          <p:cNvSpPr txBox="1"/>
+          <p:nvPr/>
+        </p:nvSpPr>
+        <p:spPr>
+          <a:xfrm>
+            <a:off x="7837268" y="1773516"/>
+            <a:ext cx="1645835" cy="307777"/>
+          </a:xfrm>
+          <a:prstGeom prst="rect">
+            <a:avLst/>
+          </a:prstGeom>
+          <a:noFill/>
+        </p:spPr>
+        <p:txBody>
+          <a:bodyPr wrap="none" rtlCol="0">
+            <a:spAutoFit/>
+          </a:bodyPr>
+          <a:lstStyle/>
+          <a:p>
+            <a:r>
+              <a:rPr lang="en-CH" sz="1400" dirty="0">
+                <a:solidFill>
+                  <a:srgbClr val="FF0000"/>
+                </a:solidFill>
+              </a:rPr>
+              <a:t>ßS(R</a:t>
+            </a:r>
+            <a:r>
+              <a:rPr lang="en-CH" sz="1400" baseline="-25000" dirty="0">
+                <a:solidFill>
+                  <a:srgbClr val="FF0000"/>
+                </a:solidFill>
+              </a:rPr>
+              <a:t>i1</a:t>
+            </a:r>
+            <a:r>
+              <a:rPr lang="en-CH" sz="1400" dirty="0">
+                <a:solidFill>
+                  <a:srgbClr val="FF0000"/>
+                </a:solidFill>
+              </a:rPr>
+              <a:t>+R</a:t>
+            </a:r>
+            <a:r>
+              <a:rPr lang="en-CH" sz="1400" baseline="-25000" dirty="0">
+                <a:solidFill>
+                  <a:srgbClr val="FF0000"/>
+                </a:solidFill>
+              </a:rPr>
+              <a:t>c1</a:t>
+            </a:r>
+            <a:r>
+              <a:rPr lang="en-CH" sz="1400" dirty="0">
+                <a:solidFill>
+                  <a:srgbClr val="FF0000"/>
+                </a:solidFill>
+              </a:rPr>
+              <a:t>)*(1-</a:t>
+            </a:r>
+            <a:r>
+              <a:rPr lang="en-CH" sz="1400" dirty="0">
+                <a:solidFill>
+                  <a:srgbClr val="FF0000"/>
+                </a:solidFill>
+                <a:sym typeface="Symbol" pitchFamily="2" charset="2"/>
+              </a:rPr>
+              <a:t></a:t>
+            </a:r>
+            <a:r>
+              <a:rPr lang="en-CH" sz="1400" dirty="0">
+                <a:solidFill>
+                  <a:srgbClr val="FF0000"/>
+                </a:solidFill>
+              </a:rPr>
+              <a:t>)*f</a:t>
+            </a:r>
+            <a:r>
+              <a:rPr lang="en-CH" sz="1400" baseline="-25000" dirty="0">
+                <a:solidFill>
+                  <a:srgbClr val="FF0000"/>
+                </a:solidFill>
+              </a:rPr>
+              <a:t>c1</a:t>
+            </a:r>
+            <a:endParaRPr lang="en-CH" sz="1400" dirty="0">
+              <a:solidFill>
+                <a:srgbClr val="FF0000"/>
+              </a:solidFill>
+            </a:endParaRPr>
+          </a:p>
+        </p:txBody>
+      </p:sp>
+      <p:sp>
+        <p:nvSpPr>
+          <p:cNvPr id="120" name="TextBox 119">
+            <a:extLst>
+              <a:ext uri="{FF2B5EF4-FFF2-40B4-BE49-F238E27FC236}">
+                <a16:creationId xmlns:a16="http://schemas.microsoft.com/office/drawing/2014/main" id="{9A06F263-0330-B1FF-FF27-45E4C36C4517}"/>
+              </a:ext>
+            </a:extLst>
+          </p:cNvPr>
+          <p:cNvSpPr txBox="1"/>
+          <p:nvPr/>
+        </p:nvSpPr>
+        <p:spPr>
+          <a:xfrm>
+            <a:off x="7673123" y="4340805"/>
+            <a:ext cx="1645835" cy="307777"/>
+          </a:xfrm>
+          <a:prstGeom prst="rect">
+            <a:avLst/>
+          </a:prstGeom>
+          <a:noFill/>
+        </p:spPr>
+        <p:txBody>
+          <a:bodyPr wrap="none" rtlCol="0">
+            <a:spAutoFit/>
+          </a:bodyPr>
+          <a:lstStyle/>
+          <a:p>
+            <a:r>
+              <a:rPr lang="en-CH" sz="1400" dirty="0">
+                <a:solidFill>
+                  <a:srgbClr val="FF0000"/>
+                </a:solidFill>
+              </a:rPr>
+              <a:t>ßS(R</a:t>
+            </a:r>
+            <a:r>
+              <a:rPr lang="en-CH" sz="1400" baseline="-25000" dirty="0">
+                <a:solidFill>
+                  <a:srgbClr val="FF0000"/>
+                </a:solidFill>
+              </a:rPr>
+              <a:t>i2</a:t>
+            </a:r>
+            <a:r>
+              <a:rPr lang="en-CH" sz="1400" dirty="0">
+                <a:solidFill>
+                  <a:srgbClr val="FF0000"/>
+                </a:solidFill>
+              </a:rPr>
+              <a:t>+R</a:t>
+            </a:r>
+            <a:r>
+              <a:rPr lang="en-CH" sz="1400" baseline="-25000" dirty="0">
+                <a:solidFill>
+                  <a:srgbClr val="FF0000"/>
+                </a:solidFill>
+              </a:rPr>
+              <a:t>c2</a:t>
+            </a:r>
+            <a:r>
+              <a:rPr lang="en-CH" sz="1400" dirty="0">
+                <a:solidFill>
+                  <a:srgbClr val="FF0000"/>
+                </a:solidFill>
+              </a:rPr>
+              <a:t>)*(1-</a:t>
+            </a:r>
+            <a:r>
+              <a:rPr lang="en-CH" sz="1400" dirty="0">
+                <a:solidFill>
+                  <a:srgbClr val="FF0000"/>
+                </a:solidFill>
+                <a:sym typeface="Symbol" pitchFamily="2" charset="2"/>
+              </a:rPr>
+              <a:t></a:t>
+            </a:r>
+            <a:r>
+              <a:rPr lang="en-CH" sz="1400" dirty="0">
+                <a:solidFill>
+                  <a:srgbClr val="FF0000"/>
+                </a:solidFill>
+              </a:rPr>
+              <a:t>)*f</a:t>
+            </a:r>
+            <a:r>
+              <a:rPr lang="en-CH" sz="1400" baseline="-25000" dirty="0">
+                <a:solidFill>
+                  <a:srgbClr val="FF0000"/>
+                </a:solidFill>
+              </a:rPr>
+              <a:t>c2</a:t>
+            </a:r>
+            <a:endParaRPr lang="en-CH" sz="1400" dirty="0">
+              <a:solidFill>
+                <a:srgbClr val="FF0000"/>
+              </a:solidFill>
+            </a:endParaRPr>
+          </a:p>
+        </p:txBody>
+      </p:sp>
+      <p:sp>
+        <p:nvSpPr>
+          <p:cNvPr id="122" name="TextBox 121">
+            <a:extLst>
+              <a:ext uri="{FF2B5EF4-FFF2-40B4-BE49-F238E27FC236}">
+                <a16:creationId xmlns:a16="http://schemas.microsoft.com/office/drawing/2014/main" id="{FF503BDB-5C01-FCDB-2FE1-C19B9258A8BE}"/>
+              </a:ext>
+            </a:extLst>
+          </p:cNvPr>
+          <p:cNvSpPr txBox="1"/>
+          <p:nvPr/>
+        </p:nvSpPr>
+        <p:spPr>
+          <a:xfrm>
+            <a:off x="8930868" y="3462122"/>
+            <a:ext cx="1453796" cy="307777"/>
+          </a:xfrm>
+          <a:prstGeom prst="rect">
+            <a:avLst/>
+          </a:prstGeom>
+          <a:noFill/>
+        </p:spPr>
+        <p:txBody>
+          <a:bodyPr wrap="none" rtlCol="0">
+            <a:spAutoFit/>
+          </a:bodyPr>
+          <a:lstStyle/>
+          <a:p>
+            <a:r>
+              <a:rPr lang="en-CH" sz="1400" dirty="0">
+                <a:solidFill>
+                  <a:srgbClr val="FF0000"/>
+                </a:solidFill>
+              </a:rPr>
+              <a:t>ßS(Wc+W</a:t>
+            </a:r>
+            <a:r>
+              <a:rPr lang="en-CH" sz="1400" baseline="-25000" dirty="0">
+                <a:solidFill>
+                  <a:srgbClr val="FF0000"/>
+                </a:solidFill>
+              </a:rPr>
+              <a:t>i</a:t>
+            </a:r>
+            <a:r>
+              <a:rPr lang="en-CH" sz="1400" dirty="0">
+                <a:solidFill>
+                  <a:srgbClr val="FF0000"/>
+                </a:solidFill>
+              </a:rPr>
+              <a:t>)*(1-</a:t>
+            </a:r>
+            <a:r>
+              <a:rPr lang="en-CH" sz="1400" dirty="0">
+                <a:solidFill>
+                  <a:srgbClr val="FF0000"/>
+                </a:solidFill>
+                <a:sym typeface="Symbol" pitchFamily="2" charset="2"/>
+              </a:rPr>
+              <a:t> </a:t>
+            </a:r>
+            <a:r>
+              <a:rPr lang="en-CH" sz="1400" dirty="0">
+                <a:solidFill>
+                  <a:srgbClr val="FF0000"/>
+                </a:solidFill>
+              </a:rPr>
+              <a:t>)</a:t>
+            </a:r>
+          </a:p>
+        </p:txBody>
+      </p:sp>
+      <p:cxnSp>
+        <p:nvCxnSpPr>
+          <p:cNvPr id="127" name="Straight Arrow Connector 126">
+            <a:extLst>
+              <a:ext uri="{FF2B5EF4-FFF2-40B4-BE49-F238E27FC236}">
+                <a16:creationId xmlns:a16="http://schemas.microsoft.com/office/drawing/2014/main" id="{DAC47A80-22E3-9FF0-6839-E37AA492A27B}"/>
+              </a:ext>
+            </a:extLst>
+          </p:cNvPr>
+          <p:cNvCxnSpPr>
+            <a:cxnSpLocks/>
+          </p:cNvCxnSpPr>
+          <p:nvPr/>
+        </p:nvCxnSpPr>
+        <p:spPr>
+          <a:xfrm flipH="1">
+            <a:off x="2420695" y="3654361"/>
+            <a:ext cx="4981154" cy="1759003"/>
+          </a:xfrm>
+          <a:prstGeom prst="straightConnector1">
+            <a:avLst/>
+          </a:prstGeom>
+          <a:ln w="12700">
+            <a:solidFill>
+              <a:schemeClr val="accent4"/>
+            </a:solidFill>
+            <a:prstDash val="solid"/>
+            <a:headEnd type="none"/>
+            <a:tailEnd type="triangle"/>
+          </a:ln>
+        </p:spPr>
+        <p:style>
+          <a:lnRef idx="1">
+            <a:schemeClr val="accent1"/>
+          </a:lnRef>
+          <a:fillRef idx="0">
+            <a:schemeClr val="accent1"/>
+          </a:fillRef>
+          <a:effectRef idx="0">
+            <a:schemeClr val="accent1"/>
+          </a:effectRef>
+          <a:fontRef idx="minor">
+            <a:schemeClr val="tx1"/>
+          </a:fontRef>
+        </p:style>
+      </p:cxnSp>
+      <p:cxnSp>
+        <p:nvCxnSpPr>
+          <p:cNvPr id="130" name="Straight Arrow Connector 129">
+            <a:extLst>
+              <a:ext uri="{FF2B5EF4-FFF2-40B4-BE49-F238E27FC236}">
+                <a16:creationId xmlns:a16="http://schemas.microsoft.com/office/drawing/2014/main" id="{5F377415-8E93-68A1-EE6E-65CAD751654B}"/>
+              </a:ext>
+            </a:extLst>
+          </p:cNvPr>
+          <p:cNvCxnSpPr>
+            <a:cxnSpLocks/>
+          </p:cNvCxnSpPr>
+          <p:nvPr/>
+        </p:nvCxnSpPr>
+        <p:spPr>
+          <a:xfrm flipH="1" flipV="1">
+            <a:off x="2401367" y="1383716"/>
+            <a:ext cx="5013004" cy="1843224"/>
+          </a:xfrm>
+          <a:prstGeom prst="straightConnector1">
+            <a:avLst/>
+          </a:prstGeom>
+          <a:ln w="12700">
+            <a:solidFill>
+              <a:srgbClr val="7030A0"/>
+            </a:solidFill>
+            <a:headEnd type="triangle"/>
+            <a:tailEnd type="none"/>
+          </a:ln>
+        </p:spPr>
+        <p:style>
+          <a:lnRef idx="1">
+            <a:schemeClr val="accent1"/>
+          </a:lnRef>
+          <a:fillRef idx="0">
+            <a:schemeClr val="accent1"/>
+          </a:fillRef>
+          <a:effectRef idx="0">
+            <a:schemeClr val="accent1"/>
+          </a:effectRef>
+          <a:fontRef idx="minor">
+            <a:schemeClr val="tx1"/>
+          </a:fontRef>
+        </p:style>
+      </p:cxnSp>
+      <p:cxnSp>
+        <p:nvCxnSpPr>
+          <p:cNvPr id="131" name="Straight Arrow Connector 130">
+            <a:extLst>
+              <a:ext uri="{FF2B5EF4-FFF2-40B4-BE49-F238E27FC236}">
+                <a16:creationId xmlns:a16="http://schemas.microsoft.com/office/drawing/2014/main" id="{CAAA2065-107E-F85A-0963-883358400ED0}"/>
+              </a:ext>
+            </a:extLst>
+          </p:cNvPr>
+          <p:cNvCxnSpPr>
+            <a:cxnSpLocks/>
+          </p:cNvCxnSpPr>
+          <p:nvPr/>
+        </p:nvCxnSpPr>
+        <p:spPr>
+          <a:xfrm flipH="1">
+            <a:off x="2436930" y="3767044"/>
+            <a:ext cx="4981573" cy="1769999"/>
+          </a:xfrm>
+          <a:prstGeom prst="straightConnector1">
+            <a:avLst/>
+          </a:prstGeom>
+          <a:ln w="12700">
+            <a:solidFill>
+              <a:srgbClr val="7030A0"/>
+            </a:solidFill>
+            <a:headEnd type="triangle"/>
+            <a:tailEnd type="none"/>
+          </a:ln>
+        </p:spPr>
+        <p:style>
+          <a:lnRef idx="1">
+            <a:schemeClr val="accent1"/>
+          </a:lnRef>
+          <a:fillRef idx="0">
+            <a:schemeClr val="accent1"/>
+          </a:fillRef>
+          <a:effectRef idx="0">
+            <a:schemeClr val="accent1"/>
+          </a:effectRef>
+          <a:fontRef idx="minor">
+            <a:schemeClr val="tx1"/>
+          </a:fontRef>
+        </p:style>
+      </p:cxnSp>
+      <p:sp>
+        <p:nvSpPr>
+          <p:cNvPr id="146" name="TextBox 145">
+            <a:extLst>
+              <a:ext uri="{FF2B5EF4-FFF2-40B4-BE49-F238E27FC236}">
+                <a16:creationId xmlns:a16="http://schemas.microsoft.com/office/drawing/2014/main" id="{76F0EEE7-0A1B-9C51-E308-2B1CAF6BBDEC}"/>
+              </a:ext>
+            </a:extLst>
+          </p:cNvPr>
+          <p:cNvSpPr txBox="1"/>
+          <p:nvPr/>
+        </p:nvSpPr>
+        <p:spPr>
+          <a:xfrm>
+            <a:off x="3419584" y="1327258"/>
+            <a:ext cx="1031051" cy="307777"/>
+          </a:xfrm>
+          <a:prstGeom prst="rect">
+            <a:avLst/>
+          </a:prstGeom>
+          <a:noFill/>
+        </p:spPr>
+        <p:txBody>
+          <a:bodyPr wrap="none" rtlCol="0">
+            <a:spAutoFit/>
+          </a:bodyPr>
+          <a:lstStyle/>
+          <a:p>
+            <a:r>
+              <a:rPr lang="en-CH" sz="1400" dirty="0">
+                <a:solidFill>
+                  <a:schemeClr val="accent4"/>
+                </a:solidFill>
+              </a:rPr>
+              <a:t>Pr*R</a:t>
+            </a:r>
+            <a:r>
+              <a:rPr lang="en-CH" sz="1400" baseline="-25000" dirty="0">
+                <a:solidFill>
+                  <a:schemeClr val="accent4"/>
+                </a:solidFill>
+              </a:rPr>
+              <a:t>1</a:t>
+            </a:r>
+            <a:r>
+              <a:rPr lang="en-GB" sz="1400" dirty="0">
+                <a:solidFill>
+                  <a:schemeClr val="accent4"/>
+                </a:solidFill>
+                <a:sym typeface="Symbol" pitchFamily="2" charset="2"/>
+              </a:rPr>
+              <a:t>*</a:t>
+            </a:r>
+            <a:r>
+              <a:rPr lang="el-GR" sz="1400" dirty="0">
+                <a:solidFill>
+                  <a:schemeClr val="accent4"/>
+                </a:solidFill>
+              </a:rPr>
+              <a:t>ρ</a:t>
+            </a:r>
+            <a:r>
+              <a:rPr lang="de-CH" sz="1400" dirty="0">
+                <a:solidFill>
+                  <a:schemeClr val="accent4"/>
+                </a:solidFill>
+              </a:rPr>
+              <a:t>*</a:t>
+            </a:r>
+            <a:r>
+              <a:rPr lang="en-GB" sz="1400" dirty="0">
+                <a:solidFill>
+                  <a:schemeClr val="accent4"/>
+                </a:solidFill>
+                <a:sym typeface="Symbol" pitchFamily="2" charset="2"/>
+              </a:rPr>
+              <a:t></a:t>
+            </a:r>
+            <a:r>
+              <a:rPr lang="en-CH" sz="1400" baseline="-25000" dirty="0">
+                <a:solidFill>
+                  <a:schemeClr val="accent4"/>
+                </a:solidFill>
+                <a:sym typeface="Symbol" pitchFamily="2" charset="2"/>
+              </a:rPr>
+              <a:t>1</a:t>
+            </a:r>
+            <a:endParaRPr lang="en-CH" sz="1400" baseline="-25000" dirty="0">
+              <a:solidFill>
+                <a:schemeClr val="accent4"/>
+              </a:solidFill>
+            </a:endParaRPr>
+          </a:p>
+        </p:txBody>
+      </p:sp>
+      <p:sp>
+        <p:nvSpPr>
+          <p:cNvPr id="149" name="TextBox 148">
+            <a:extLst>
+              <a:ext uri="{FF2B5EF4-FFF2-40B4-BE49-F238E27FC236}">
+                <a16:creationId xmlns:a16="http://schemas.microsoft.com/office/drawing/2014/main" id="{DA57CAD8-5D6E-8A6A-27A4-A7EF43EE5981}"/>
+              </a:ext>
+            </a:extLst>
+          </p:cNvPr>
+          <p:cNvSpPr txBox="1"/>
+          <p:nvPr/>
+        </p:nvSpPr>
+        <p:spPr>
+          <a:xfrm>
+            <a:off x="4674221" y="1334076"/>
+            <a:ext cx="1168910" cy="369332"/>
+          </a:xfrm>
+          <a:prstGeom prst="rect">
+            <a:avLst/>
+          </a:prstGeom>
+          <a:noFill/>
+        </p:spPr>
+        <p:txBody>
+          <a:bodyPr wrap="none" rtlCol="0">
+            <a:spAutoFit/>
+          </a:bodyPr>
+          <a:lstStyle/>
+          <a:p>
+            <a:r>
+              <a:rPr lang="en-CH" sz="1400" dirty="0">
+                <a:solidFill>
+                  <a:schemeClr val="accent4"/>
+                </a:solidFill>
+              </a:rPr>
+              <a:t>Pr</a:t>
+            </a:r>
+            <a:r>
+              <a:rPr lang="en-GB" sz="1400" dirty="0">
+                <a:solidFill>
+                  <a:schemeClr val="accent4"/>
+                </a:solidFill>
+                <a:sym typeface="Symbol" pitchFamily="2" charset="2"/>
+              </a:rPr>
+              <a:t>R</a:t>
+            </a:r>
+            <a:r>
+              <a:rPr lang="en-GB" sz="1400" baseline="-25000" dirty="0">
+                <a:solidFill>
+                  <a:schemeClr val="accent4"/>
+                </a:solidFill>
+                <a:sym typeface="Symbol" pitchFamily="2" charset="2"/>
+              </a:rPr>
+              <a:t>1</a:t>
+            </a:r>
+            <a:r>
+              <a:rPr lang="en-GB" sz="1400" dirty="0">
+                <a:solidFill>
+                  <a:schemeClr val="accent4"/>
+                </a:solidFill>
+                <a:sym typeface="Symbol" pitchFamily="2" charset="2"/>
+              </a:rPr>
+              <a:t>(1-</a:t>
+            </a:r>
+            <a:r>
+              <a:rPr lang="en-GB" b="1" dirty="0">
+                <a:sym typeface="Symbol" pitchFamily="2" charset="2"/>
+              </a:rPr>
+              <a:t></a:t>
+            </a:r>
+            <a:r>
+              <a:rPr lang="en-CH" sz="1400" dirty="0"/>
+              <a:t> </a:t>
+            </a:r>
+            <a:r>
+              <a:rPr lang="de-CH" sz="1400" dirty="0">
+                <a:solidFill>
+                  <a:schemeClr val="accent4"/>
+                </a:solidFill>
+              </a:rPr>
+              <a:t>)</a:t>
+            </a:r>
+            <a:r>
+              <a:rPr lang="en-GB" sz="1400" dirty="0">
+                <a:solidFill>
+                  <a:schemeClr val="accent4"/>
+                </a:solidFill>
+                <a:sym typeface="Symbol" pitchFamily="2" charset="2"/>
+              </a:rPr>
+              <a:t>*</a:t>
+            </a:r>
+            <a:r>
+              <a:rPr lang="en-CH" sz="1400" baseline="-25000" dirty="0">
+                <a:solidFill>
+                  <a:schemeClr val="accent4"/>
+                </a:solidFill>
+                <a:sym typeface="Symbol" pitchFamily="2" charset="2"/>
+              </a:rPr>
+              <a:t>1</a:t>
+            </a:r>
+            <a:endParaRPr lang="en-CH" sz="1400" baseline="-25000" dirty="0">
+              <a:solidFill>
+                <a:schemeClr val="accent4"/>
+              </a:solidFill>
+            </a:endParaRPr>
+          </a:p>
+        </p:txBody>
+      </p:sp>
+      <p:sp>
+        <p:nvSpPr>
+          <p:cNvPr id="153" name="TextBox 152">
+            <a:extLst>
+              <a:ext uri="{FF2B5EF4-FFF2-40B4-BE49-F238E27FC236}">
+                <a16:creationId xmlns:a16="http://schemas.microsoft.com/office/drawing/2014/main" id="{07120136-5EED-BD0F-0613-119DE777E3CF}"/>
+              </a:ext>
+            </a:extLst>
+          </p:cNvPr>
+          <p:cNvSpPr txBox="1"/>
+          <p:nvPr/>
+        </p:nvSpPr>
+        <p:spPr>
+          <a:xfrm>
+            <a:off x="9264587" y="2190383"/>
+            <a:ext cx="713657" cy="369332"/>
+          </a:xfrm>
+          <a:prstGeom prst="rect">
+            <a:avLst/>
+          </a:prstGeom>
+          <a:noFill/>
+        </p:spPr>
+        <p:txBody>
+          <a:bodyPr wrap="none" rtlCol="0">
+            <a:spAutoFit/>
+          </a:bodyPr>
+          <a:lstStyle/>
+          <a:p>
+            <a:r>
+              <a:rPr lang="en-GB" sz="1400" dirty="0">
+                <a:solidFill>
+                  <a:srgbClr val="0070C0"/>
+                </a:solidFill>
+                <a:sym typeface="Symbol" pitchFamily="2" charset="2"/>
+              </a:rPr>
+              <a:t>R</a:t>
+            </a:r>
+            <a:r>
+              <a:rPr lang="en-GB" sz="1400" baseline="-25000" dirty="0">
+                <a:solidFill>
+                  <a:srgbClr val="0070C0"/>
+                </a:solidFill>
+                <a:sym typeface="Symbol" pitchFamily="2" charset="2"/>
+              </a:rPr>
+              <a:t>2</a:t>
+            </a:r>
+            <a:r>
+              <a:rPr lang="en-GB" sz="1400" dirty="0">
+                <a:solidFill>
+                  <a:srgbClr val="0070C0"/>
+                </a:solidFill>
+                <a:sym typeface="Symbol" pitchFamily="2" charset="2"/>
+              </a:rPr>
+              <a:t>*</a:t>
+            </a:r>
+            <a:r>
+              <a:rPr lang="en-GB" dirty="0">
+                <a:solidFill>
+                  <a:srgbClr val="0070C0"/>
+                </a:solidFill>
+                <a:sym typeface="Symbol" pitchFamily="2" charset="2"/>
+              </a:rPr>
+              <a:t></a:t>
+            </a:r>
+            <a:r>
+              <a:rPr lang="en-CH" sz="1400" baseline="-25000" dirty="0">
+                <a:solidFill>
+                  <a:srgbClr val="0070C0"/>
+                </a:solidFill>
+                <a:sym typeface="Symbol" pitchFamily="2" charset="2"/>
+              </a:rPr>
+              <a:t>2</a:t>
+            </a:r>
+            <a:endParaRPr lang="en-CH" sz="1400" baseline="-25000" dirty="0">
+              <a:solidFill>
+                <a:srgbClr val="0070C0"/>
+              </a:solidFill>
+            </a:endParaRPr>
+          </a:p>
+        </p:txBody>
+      </p:sp>
+      <p:sp>
+        <p:nvSpPr>
+          <p:cNvPr id="156" name="TextBox 155">
+            <a:extLst>
+              <a:ext uri="{FF2B5EF4-FFF2-40B4-BE49-F238E27FC236}">
+                <a16:creationId xmlns:a16="http://schemas.microsoft.com/office/drawing/2014/main" id="{15CD4C29-F650-261F-1494-0258E7F13DE4}"/>
+              </a:ext>
+            </a:extLst>
+          </p:cNvPr>
+          <p:cNvSpPr txBox="1"/>
+          <p:nvPr/>
+        </p:nvSpPr>
+        <p:spPr>
+          <a:xfrm>
+            <a:off x="5513353" y="1860233"/>
+            <a:ext cx="282450" cy="307777"/>
+          </a:xfrm>
+          <a:prstGeom prst="rect">
+            <a:avLst/>
+          </a:prstGeom>
+          <a:noFill/>
+        </p:spPr>
+        <p:txBody>
+          <a:bodyPr wrap="none" rtlCol="0">
+            <a:spAutoFit/>
+          </a:bodyPr>
+          <a:lstStyle/>
+          <a:p>
+            <a:r>
+              <a:rPr lang="en-GB" sz="1400" dirty="0">
+                <a:solidFill>
+                  <a:schemeClr val="accent2"/>
+                </a:solidFill>
+                <a:sym typeface="Symbol" pitchFamily="2" charset="2"/>
+              </a:rPr>
+              <a:t></a:t>
+            </a:r>
+            <a:endParaRPr lang="en-CH" sz="1100" dirty="0">
+              <a:solidFill>
+                <a:schemeClr val="accent2"/>
+              </a:solidFill>
+            </a:endParaRPr>
+          </a:p>
+        </p:txBody>
+      </p:sp>
+      <p:cxnSp>
+        <p:nvCxnSpPr>
+          <p:cNvPr id="159" name="Straight Arrow Connector 158">
+            <a:extLst>
+              <a:ext uri="{FF2B5EF4-FFF2-40B4-BE49-F238E27FC236}">
+                <a16:creationId xmlns:a16="http://schemas.microsoft.com/office/drawing/2014/main" id="{38A1C82C-81BB-58F6-2659-B8D6601DE395}"/>
+              </a:ext>
+            </a:extLst>
+          </p:cNvPr>
+          <p:cNvCxnSpPr>
+            <a:cxnSpLocks/>
+          </p:cNvCxnSpPr>
+          <p:nvPr/>
+        </p:nvCxnSpPr>
+        <p:spPr>
+          <a:xfrm>
+            <a:off x="6969883" y="1236354"/>
+            <a:ext cx="2240962" cy="0"/>
+          </a:xfrm>
+          <a:prstGeom prst="straightConnector1">
+            <a:avLst/>
+          </a:prstGeom>
+          <a:ln>
+            <a:solidFill>
+              <a:srgbClr val="00B050"/>
+            </a:solidFill>
+            <a:headEnd type="triangle"/>
+            <a:tailEnd type="none"/>
+          </a:ln>
+        </p:spPr>
+        <p:style>
+          <a:lnRef idx="1">
+            <a:schemeClr val="accent1"/>
+          </a:lnRef>
+          <a:fillRef idx="0">
+            <a:schemeClr val="accent1"/>
+          </a:fillRef>
+          <a:effectRef idx="0">
+            <a:schemeClr val="accent1"/>
+          </a:effectRef>
+          <a:fontRef idx="minor">
+            <a:schemeClr val="tx1"/>
+          </a:fontRef>
+        </p:style>
+      </p:cxnSp>
+      <p:cxnSp>
+        <p:nvCxnSpPr>
+          <p:cNvPr id="162" name="Straight Arrow Connector 161">
+            <a:extLst>
+              <a:ext uri="{FF2B5EF4-FFF2-40B4-BE49-F238E27FC236}">
+                <a16:creationId xmlns:a16="http://schemas.microsoft.com/office/drawing/2014/main" id="{6BFF3D02-BFDF-9DA8-0849-CA25A5CE3F51}"/>
+              </a:ext>
+            </a:extLst>
+          </p:cNvPr>
+          <p:cNvCxnSpPr>
+            <a:cxnSpLocks/>
+          </p:cNvCxnSpPr>
+          <p:nvPr/>
+        </p:nvCxnSpPr>
+        <p:spPr>
+          <a:xfrm>
+            <a:off x="6932378" y="5458834"/>
+            <a:ext cx="2240962" cy="0"/>
+          </a:xfrm>
+          <a:prstGeom prst="straightConnector1">
+            <a:avLst/>
+          </a:prstGeom>
+          <a:ln>
+            <a:solidFill>
+              <a:srgbClr val="00B050"/>
+            </a:solidFill>
+            <a:headEnd type="triangle"/>
+            <a:tailEnd type="none"/>
+          </a:ln>
+        </p:spPr>
+        <p:style>
+          <a:lnRef idx="1">
+            <a:schemeClr val="accent1"/>
+          </a:lnRef>
+          <a:fillRef idx="0">
+            <a:schemeClr val="accent1"/>
+          </a:fillRef>
+          <a:effectRef idx="0">
+            <a:schemeClr val="accent1"/>
+          </a:effectRef>
+          <a:fontRef idx="minor">
+            <a:schemeClr val="tx1"/>
+          </a:fontRef>
+        </p:style>
+      </p:cxnSp>
+      <p:cxnSp>
+        <p:nvCxnSpPr>
+          <p:cNvPr id="163" name="Straight Arrow Connector 162">
+            <a:extLst>
+              <a:ext uri="{FF2B5EF4-FFF2-40B4-BE49-F238E27FC236}">
+                <a16:creationId xmlns:a16="http://schemas.microsoft.com/office/drawing/2014/main" id="{ECC3D2C6-6C82-40E9-34D6-3599E379E4D3}"/>
+              </a:ext>
+            </a:extLst>
+          </p:cNvPr>
+          <p:cNvCxnSpPr>
+            <a:cxnSpLocks/>
+          </p:cNvCxnSpPr>
+          <p:nvPr/>
+        </p:nvCxnSpPr>
+        <p:spPr>
+          <a:xfrm>
+            <a:off x="5369475" y="3044525"/>
+            <a:ext cx="5046196" cy="0"/>
+          </a:xfrm>
+          <a:prstGeom prst="straightConnector1">
+            <a:avLst/>
+          </a:prstGeom>
+          <a:ln>
+            <a:solidFill>
+              <a:srgbClr val="00B050"/>
+            </a:solidFill>
+            <a:headEnd type="triangle"/>
+            <a:tailEnd type="none"/>
+          </a:ln>
+        </p:spPr>
+        <p:style>
+          <a:lnRef idx="1">
+            <a:schemeClr val="accent1"/>
+          </a:lnRef>
+          <a:fillRef idx="0">
+            <a:schemeClr val="accent1"/>
+          </a:fillRef>
+          <a:effectRef idx="0">
+            <a:schemeClr val="accent1"/>
+          </a:effectRef>
+          <a:fontRef idx="minor">
+            <a:schemeClr val="tx1"/>
+          </a:fontRef>
+        </p:style>
+      </p:cxnSp>
+      <p:sp>
+        <p:nvSpPr>
+          <p:cNvPr id="167" name="TextBox 166">
+            <a:extLst>
+              <a:ext uri="{FF2B5EF4-FFF2-40B4-BE49-F238E27FC236}">
+                <a16:creationId xmlns:a16="http://schemas.microsoft.com/office/drawing/2014/main" id="{424209D7-71C8-33B8-F76C-F9743B5C35EE}"/>
+              </a:ext>
+            </a:extLst>
+          </p:cNvPr>
+          <p:cNvSpPr txBox="1"/>
+          <p:nvPr/>
+        </p:nvSpPr>
+        <p:spPr>
+          <a:xfrm>
+            <a:off x="7776726" y="863294"/>
+            <a:ext cx="444352" cy="369332"/>
+          </a:xfrm>
+          <a:prstGeom prst="rect">
+            <a:avLst/>
+          </a:prstGeom>
+          <a:noFill/>
+        </p:spPr>
+        <p:txBody>
+          <a:bodyPr wrap="none" rtlCol="0">
+            <a:spAutoFit/>
+          </a:bodyPr>
+          <a:lstStyle/>
+          <a:p>
+            <a:r>
+              <a:rPr lang="en-GB" dirty="0">
+                <a:solidFill>
+                  <a:srgbClr val="00B050"/>
+                </a:solidFill>
+                <a:sym typeface="Symbol" pitchFamily="2" charset="2"/>
+              </a:rPr>
+              <a:t></a:t>
+            </a:r>
+            <a:r>
+              <a:rPr lang="en-CH" sz="1400" baseline="-25000" dirty="0">
+                <a:solidFill>
+                  <a:srgbClr val="00B050"/>
+                </a:solidFill>
+                <a:effectLst/>
+              </a:rPr>
+              <a:t>R</a:t>
+            </a:r>
+            <a:r>
+              <a:rPr lang="en-CH" sz="1400" baseline="-25000" dirty="0">
+                <a:solidFill>
+                  <a:srgbClr val="00B050"/>
+                </a:solidFill>
+              </a:rPr>
+              <a:t>1</a:t>
+            </a:r>
+          </a:p>
+        </p:txBody>
+      </p:sp>
+      <p:sp>
+        <p:nvSpPr>
+          <p:cNvPr id="71" name="TextBox 70">
+            <a:extLst>
+              <a:ext uri="{FF2B5EF4-FFF2-40B4-BE49-F238E27FC236}">
+                <a16:creationId xmlns:a16="http://schemas.microsoft.com/office/drawing/2014/main" id="{724A481B-0D10-6B4D-9816-5374FD298797}"/>
+              </a:ext>
+            </a:extLst>
+          </p:cNvPr>
+          <p:cNvSpPr txBox="1"/>
+          <p:nvPr/>
+        </p:nvSpPr>
+        <p:spPr>
+          <a:xfrm>
+            <a:off x="3330239" y="1807604"/>
+            <a:ext cx="277640" cy="307777"/>
+          </a:xfrm>
+          <a:prstGeom prst="rect">
+            <a:avLst/>
+          </a:prstGeom>
+          <a:noFill/>
+        </p:spPr>
+        <p:txBody>
+          <a:bodyPr wrap="none" rtlCol="0">
+            <a:spAutoFit/>
+          </a:bodyPr>
+          <a:lstStyle/>
+          <a:p>
+            <a:r>
+              <a:rPr lang="en-GB" sz="1400" dirty="0">
+                <a:solidFill>
+                  <a:srgbClr val="7030A0"/>
+                </a:solidFill>
+                <a:sym typeface="Symbol" pitchFamily="2" charset="2"/>
+              </a:rPr>
+              <a:t></a:t>
+            </a:r>
+            <a:endParaRPr lang="en-CH" sz="1400" dirty="0">
+              <a:solidFill>
+                <a:srgbClr val="7030A0"/>
+              </a:solidFill>
+            </a:endParaRPr>
+          </a:p>
+        </p:txBody>
+      </p:sp>
+      <p:sp>
+        <p:nvSpPr>
+          <p:cNvPr id="76" name="TextBox 75">
+            <a:extLst>
+              <a:ext uri="{FF2B5EF4-FFF2-40B4-BE49-F238E27FC236}">
+                <a16:creationId xmlns:a16="http://schemas.microsoft.com/office/drawing/2014/main" id="{BC03FB97-B3A4-044E-4AC0-77C206FCAF53}"/>
+              </a:ext>
+            </a:extLst>
+          </p:cNvPr>
+          <p:cNvSpPr txBox="1"/>
+          <p:nvPr/>
+        </p:nvSpPr>
+        <p:spPr>
+          <a:xfrm>
+            <a:off x="5477463" y="3339065"/>
+            <a:ext cx="1821332" cy="369332"/>
+          </a:xfrm>
+          <a:prstGeom prst="rect">
+            <a:avLst/>
+          </a:prstGeom>
+          <a:noFill/>
+        </p:spPr>
+        <p:txBody>
+          <a:bodyPr wrap="none" rtlCol="0">
+            <a:spAutoFit/>
+          </a:bodyPr>
+          <a:lstStyle/>
+          <a:p>
+            <a:r>
+              <a:rPr lang="en-CH" sz="1400" dirty="0">
+                <a:solidFill>
+                  <a:schemeClr val="accent4"/>
+                </a:solidFill>
+              </a:rPr>
+              <a:t>Pr*</a:t>
+            </a:r>
+            <a:r>
+              <a:rPr lang="en-GB" b="1" dirty="0">
+                <a:sym typeface="Symbol" pitchFamily="2" charset="2"/>
+              </a:rPr>
+              <a:t></a:t>
+            </a:r>
+            <a:r>
+              <a:rPr lang="en-CH" sz="1400" dirty="0"/>
+              <a:t> </a:t>
+            </a:r>
+            <a:r>
+              <a:rPr lang="en-GB" sz="1400" dirty="0">
+                <a:solidFill>
+                  <a:schemeClr val="accent4"/>
+                </a:solidFill>
+                <a:sym typeface="Symbol" pitchFamily="2" charset="2"/>
+              </a:rPr>
+              <a:t>*(R</a:t>
+            </a:r>
+            <a:r>
+              <a:rPr lang="en-GB" sz="1400" baseline="-25000" dirty="0">
+                <a:solidFill>
+                  <a:schemeClr val="accent4"/>
+                </a:solidFill>
+                <a:sym typeface="Symbol" pitchFamily="2" charset="2"/>
+              </a:rPr>
+              <a:t>1</a:t>
+            </a:r>
+            <a:r>
+              <a:rPr lang="en-GB" sz="1400" dirty="0">
+                <a:solidFill>
+                  <a:schemeClr val="accent4"/>
+                </a:solidFill>
+                <a:sym typeface="Symbol" pitchFamily="2" charset="2"/>
+              </a:rPr>
+              <a:t>*</a:t>
+            </a:r>
+            <a:r>
+              <a:rPr lang="en-CH" sz="1400" baseline="-25000" dirty="0">
+                <a:solidFill>
+                  <a:schemeClr val="accent4"/>
+                </a:solidFill>
+                <a:sym typeface="Symbol" pitchFamily="2" charset="2"/>
+              </a:rPr>
+              <a:t>1</a:t>
+            </a:r>
+            <a:r>
+              <a:rPr lang="en-CH" sz="1400" dirty="0">
+                <a:solidFill>
+                  <a:schemeClr val="accent4"/>
+                </a:solidFill>
+                <a:sym typeface="Symbol" pitchFamily="2" charset="2"/>
+              </a:rPr>
+              <a:t>)+</a:t>
+            </a:r>
+            <a:r>
+              <a:rPr lang="en-GB" sz="1400" dirty="0">
+                <a:solidFill>
+                  <a:schemeClr val="accent4"/>
+                </a:solidFill>
+                <a:sym typeface="Symbol" pitchFamily="2" charset="2"/>
+              </a:rPr>
+              <a:t>(R</a:t>
+            </a:r>
+            <a:r>
+              <a:rPr lang="en-GB" sz="1400" baseline="-25000" dirty="0">
+                <a:solidFill>
+                  <a:schemeClr val="accent4"/>
+                </a:solidFill>
+                <a:sym typeface="Symbol" pitchFamily="2" charset="2"/>
+              </a:rPr>
+              <a:t>2</a:t>
+            </a:r>
+            <a:r>
+              <a:rPr lang="en-GB" sz="1400" dirty="0">
+                <a:solidFill>
+                  <a:schemeClr val="accent4"/>
+                </a:solidFill>
+                <a:sym typeface="Symbol" pitchFamily="2" charset="2"/>
+              </a:rPr>
+              <a:t>*</a:t>
+            </a:r>
+            <a:r>
+              <a:rPr lang="en-CH" sz="1400" baseline="-25000" dirty="0">
+                <a:solidFill>
+                  <a:schemeClr val="accent4"/>
+                </a:solidFill>
+                <a:sym typeface="Symbol" pitchFamily="2" charset="2"/>
+              </a:rPr>
+              <a:t>2</a:t>
+            </a:r>
+            <a:r>
+              <a:rPr lang="en-CH" sz="1400" dirty="0">
+                <a:solidFill>
+                  <a:schemeClr val="accent4"/>
+                </a:solidFill>
+                <a:sym typeface="Symbol" pitchFamily="2" charset="2"/>
+              </a:rPr>
+              <a:t>)</a:t>
+            </a:r>
+            <a:endParaRPr lang="en-CH" sz="1400" dirty="0">
+              <a:solidFill>
+                <a:schemeClr val="accent4"/>
+              </a:solidFill>
+            </a:endParaRPr>
+          </a:p>
+        </p:txBody>
+      </p:sp>
+      <p:sp>
+        <p:nvSpPr>
+          <p:cNvPr id="72" name="TextBox 71">
+            <a:extLst>
+              <a:ext uri="{FF2B5EF4-FFF2-40B4-BE49-F238E27FC236}">
+                <a16:creationId xmlns:a16="http://schemas.microsoft.com/office/drawing/2014/main" id="{EBFE6473-D617-77E3-6522-0986990901ED}"/>
+              </a:ext>
+            </a:extLst>
+          </p:cNvPr>
+          <p:cNvSpPr txBox="1"/>
+          <p:nvPr/>
+        </p:nvSpPr>
+        <p:spPr>
+          <a:xfrm>
+            <a:off x="4560469" y="4914858"/>
+            <a:ext cx="1168910" cy="369332"/>
+          </a:xfrm>
+          <a:prstGeom prst="rect">
+            <a:avLst/>
+          </a:prstGeom>
+          <a:noFill/>
+        </p:spPr>
+        <p:txBody>
+          <a:bodyPr wrap="none" rtlCol="0">
+            <a:spAutoFit/>
+          </a:bodyPr>
+          <a:lstStyle/>
+          <a:p>
+            <a:r>
+              <a:rPr lang="en-CH" sz="1400" dirty="0">
+                <a:solidFill>
+                  <a:schemeClr val="accent4"/>
+                </a:solidFill>
+              </a:rPr>
+              <a:t>Pr</a:t>
+            </a:r>
+            <a:r>
+              <a:rPr lang="en-GB" sz="1400" dirty="0">
+                <a:solidFill>
+                  <a:schemeClr val="accent4"/>
+                </a:solidFill>
+                <a:sym typeface="Symbol" pitchFamily="2" charset="2"/>
+              </a:rPr>
+              <a:t>R</a:t>
+            </a:r>
+            <a:r>
+              <a:rPr lang="en-GB" sz="1400" baseline="-25000" dirty="0">
+                <a:solidFill>
+                  <a:schemeClr val="accent4"/>
+                </a:solidFill>
+                <a:sym typeface="Symbol" pitchFamily="2" charset="2"/>
+              </a:rPr>
+              <a:t>2</a:t>
+            </a:r>
+            <a:r>
+              <a:rPr lang="en-GB" sz="1400" dirty="0">
+                <a:solidFill>
+                  <a:schemeClr val="accent4"/>
+                </a:solidFill>
+                <a:sym typeface="Symbol" pitchFamily="2" charset="2"/>
+              </a:rPr>
+              <a:t>(1-</a:t>
+            </a:r>
+            <a:r>
+              <a:rPr lang="en-GB" b="1" dirty="0">
+                <a:sym typeface="Symbol" pitchFamily="2" charset="2"/>
+              </a:rPr>
+              <a:t></a:t>
+            </a:r>
+            <a:r>
+              <a:rPr lang="de-CH" sz="1400" dirty="0">
+                <a:solidFill>
+                  <a:schemeClr val="accent4"/>
+                </a:solidFill>
+              </a:rPr>
+              <a:t>)</a:t>
+            </a:r>
+            <a:r>
+              <a:rPr lang="en-GB" sz="1400" dirty="0">
+                <a:solidFill>
+                  <a:schemeClr val="accent4"/>
+                </a:solidFill>
+                <a:sym typeface="Symbol" pitchFamily="2" charset="2"/>
+              </a:rPr>
+              <a:t>*</a:t>
+            </a:r>
+            <a:r>
+              <a:rPr lang="en-CH" sz="1400" baseline="-25000" dirty="0">
+                <a:solidFill>
+                  <a:schemeClr val="accent4"/>
+                </a:solidFill>
+                <a:sym typeface="Symbol" pitchFamily="2" charset="2"/>
+              </a:rPr>
+              <a:t>2</a:t>
+            </a:r>
+            <a:endParaRPr lang="en-CH" sz="1400" baseline="-25000" dirty="0">
+              <a:solidFill>
+                <a:schemeClr val="accent4"/>
+              </a:solidFill>
+            </a:endParaRPr>
+          </a:p>
+        </p:txBody>
+      </p:sp>
+      <p:sp>
+        <p:nvSpPr>
+          <p:cNvPr id="73" name="TextBox 72">
+            <a:extLst>
+              <a:ext uri="{FF2B5EF4-FFF2-40B4-BE49-F238E27FC236}">
+                <a16:creationId xmlns:a16="http://schemas.microsoft.com/office/drawing/2014/main" id="{55F03267-0C9D-9BDC-88AE-C6828C34D50C}"/>
+              </a:ext>
+            </a:extLst>
+          </p:cNvPr>
+          <p:cNvSpPr txBox="1"/>
+          <p:nvPr/>
+        </p:nvSpPr>
+        <p:spPr>
+          <a:xfrm>
+            <a:off x="7137063" y="4473759"/>
+            <a:ext cx="873957" cy="369332"/>
+          </a:xfrm>
+          <a:prstGeom prst="rect">
+            <a:avLst/>
+          </a:prstGeom>
+          <a:noFill/>
+        </p:spPr>
+        <p:txBody>
+          <a:bodyPr wrap="none" rtlCol="0">
+            <a:spAutoFit/>
+          </a:bodyPr>
+          <a:lstStyle/>
+          <a:p>
+            <a:r>
+              <a:rPr lang="en-CH" sz="1400" dirty="0">
+                <a:solidFill>
+                  <a:schemeClr val="accent4"/>
+                </a:solidFill>
+              </a:rPr>
+              <a:t>Pr</a:t>
+            </a:r>
+            <a:r>
+              <a:rPr lang="en-GB" sz="1400" dirty="0">
+                <a:solidFill>
+                  <a:schemeClr val="accent4"/>
+                </a:solidFill>
+                <a:sym typeface="Symbol" pitchFamily="2" charset="2"/>
+              </a:rPr>
+              <a:t>R</a:t>
+            </a:r>
+            <a:r>
+              <a:rPr lang="en-GB" sz="1400" baseline="-25000" dirty="0">
+                <a:solidFill>
+                  <a:schemeClr val="accent4"/>
+                </a:solidFill>
+                <a:sym typeface="Symbol" pitchFamily="2" charset="2"/>
+              </a:rPr>
+              <a:t>1</a:t>
+            </a:r>
+            <a:r>
+              <a:rPr lang="en-GB" b="1" dirty="0">
+                <a:sym typeface="Symbol" pitchFamily="2" charset="2"/>
+              </a:rPr>
+              <a:t></a:t>
+            </a:r>
+            <a:r>
+              <a:rPr lang="en-GB" sz="1400" dirty="0">
+                <a:solidFill>
+                  <a:schemeClr val="accent4"/>
+                </a:solidFill>
+                <a:sym typeface="Symbol" pitchFamily="2" charset="2"/>
+              </a:rPr>
+              <a:t>*</a:t>
+            </a:r>
+            <a:r>
+              <a:rPr lang="en-CH" sz="1400" baseline="-25000" dirty="0">
+                <a:solidFill>
+                  <a:schemeClr val="accent4"/>
+                </a:solidFill>
+                <a:sym typeface="Symbol" pitchFamily="2" charset="2"/>
+              </a:rPr>
+              <a:t>1</a:t>
+            </a:r>
+            <a:endParaRPr lang="en-CH" sz="1400" baseline="-25000" dirty="0">
+              <a:solidFill>
+                <a:schemeClr val="accent4"/>
+              </a:solidFill>
+            </a:endParaRPr>
+          </a:p>
+        </p:txBody>
+      </p:sp>
+      <p:sp>
+        <p:nvSpPr>
+          <p:cNvPr id="74" name="TextBox 73">
+            <a:extLst>
+              <a:ext uri="{FF2B5EF4-FFF2-40B4-BE49-F238E27FC236}">
+                <a16:creationId xmlns:a16="http://schemas.microsoft.com/office/drawing/2014/main" id="{719E5B7F-DC89-2834-E7A0-A0CB662F70B2}"/>
+              </a:ext>
+            </a:extLst>
+          </p:cNvPr>
+          <p:cNvSpPr txBox="1"/>
+          <p:nvPr/>
+        </p:nvSpPr>
+        <p:spPr>
+          <a:xfrm>
+            <a:off x="7378465" y="2442558"/>
+            <a:ext cx="914033" cy="369332"/>
+          </a:xfrm>
+          <a:prstGeom prst="rect">
+            <a:avLst/>
+          </a:prstGeom>
+          <a:noFill/>
+        </p:spPr>
+        <p:txBody>
+          <a:bodyPr wrap="none" rtlCol="0">
+            <a:spAutoFit/>
+          </a:bodyPr>
+          <a:lstStyle/>
+          <a:p>
+            <a:r>
+              <a:rPr lang="en-CH" sz="1400" dirty="0">
+                <a:solidFill>
+                  <a:schemeClr val="accent4"/>
+                </a:solidFill>
+              </a:rPr>
+              <a:t>Pr</a:t>
+            </a:r>
+            <a:r>
+              <a:rPr lang="en-GB" sz="1400" dirty="0">
+                <a:solidFill>
+                  <a:schemeClr val="accent4"/>
+                </a:solidFill>
+                <a:sym typeface="Symbol" pitchFamily="2" charset="2"/>
+              </a:rPr>
+              <a:t>R</a:t>
+            </a:r>
+            <a:r>
+              <a:rPr lang="en-GB" sz="1400" baseline="-25000" dirty="0">
+                <a:solidFill>
+                  <a:schemeClr val="accent4"/>
+                </a:solidFill>
+                <a:sym typeface="Symbol" pitchFamily="2" charset="2"/>
+              </a:rPr>
+              <a:t>2</a:t>
+            </a:r>
+            <a:r>
+              <a:rPr lang="en-GB" b="1" dirty="0">
+                <a:sym typeface="Symbol" pitchFamily="2" charset="2"/>
+              </a:rPr>
+              <a:t></a:t>
+            </a:r>
+            <a:r>
+              <a:rPr lang="en-CH" sz="1400" dirty="0"/>
+              <a:t> </a:t>
+            </a:r>
+            <a:r>
+              <a:rPr lang="en-GB" sz="1400" dirty="0">
+                <a:solidFill>
+                  <a:schemeClr val="accent4"/>
+                </a:solidFill>
+                <a:sym typeface="Symbol" pitchFamily="2" charset="2"/>
+              </a:rPr>
+              <a:t>*</a:t>
+            </a:r>
+            <a:r>
+              <a:rPr lang="en-CH" sz="1400" baseline="-25000" dirty="0">
+                <a:solidFill>
+                  <a:schemeClr val="accent4"/>
+                </a:solidFill>
+                <a:sym typeface="Symbol" pitchFamily="2" charset="2"/>
+              </a:rPr>
+              <a:t>2</a:t>
+            </a:r>
+            <a:endParaRPr lang="en-CH" sz="1400" baseline="-25000" dirty="0">
+              <a:solidFill>
+                <a:schemeClr val="accent4"/>
+              </a:solidFill>
+            </a:endParaRPr>
+          </a:p>
+        </p:txBody>
+      </p:sp>
+      <p:sp>
+        <p:nvSpPr>
+          <p:cNvPr id="75" name="TextBox 74">
+            <a:extLst>
+              <a:ext uri="{FF2B5EF4-FFF2-40B4-BE49-F238E27FC236}">
+                <a16:creationId xmlns:a16="http://schemas.microsoft.com/office/drawing/2014/main" id="{26E089BD-C8FE-60EF-037E-E4C5DCE3251D}"/>
+              </a:ext>
+            </a:extLst>
+          </p:cNvPr>
+          <p:cNvSpPr txBox="1"/>
+          <p:nvPr/>
+        </p:nvSpPr>
+        <p:spPr>
+          <a:xfrm>
+            <a:off x="3321020" y="4530259"/>
+            <a:ext cx="1031051" cy="307777"/>
+          </a:xfrm>
+          <a:prstGeom prst="rect">
+            <a:avLst/>
+          </a:prstGeom>
+          <a:noFill/>
+        </p:spPr>
+        <p:txBody>
+          <a:bodyPr wrap="none" rtlCol="0">
+            <a:spAutoFit/>
+          </a:bodyPr>
+          <a:lstStyle/>
+          <a:p>
+            <a:r>
+              <a:rPr lang="en-CH" sz="1400" dirty="0">
+                <a:solidFill>
+                  <a:schemeClr val="accent4"/>
+                </a:solidFill>
+              </a:rPr>
+              <a:t>Pr*R</a:t>
+            </a:r>
+            <a:r>
+              <a:rPr lang="en-CH" sz="1400" baseline="-25000" dirty="0">
+                <a:solidFill>
+                  <a:schemeClr val="accent4"/>
+                </a:solidFill>
+              </a:rPr>
+              <a:t>2</a:t>
+            </a:r>
+            <a:r>
+              <a:rPr lang="en-GB" sz="1400" dirty="0">
+                <a:solidFill>
+                  <a:schemeClr val="accent4"/>
+                </a:solidFill>
+                <a:sym typeface="Symbol" pitchFamily="2" charset="2"/>
+              </a:rPr>
+              <a:t>*</a:t>
+            </a:r>
+            <a:r>
+              <a:rPr lang="el-GR" sz="1400" dirty="0">
+                <a:solidFill>
+                  <a:schemeClr val="accent4"/>
+                </a:solidFill>
+              </a:rPr>
+              <a:t>ρ</a:t>
+            </a:r>
+            <a:r>
+              <a:rPr lang="de-CH" sz="1400" dirty="0">
+                <a:solidFill>
+                  <a:schemeClr val="accent4"/>
+                </a:solidFill>
+              </a:rPr>
+              <a:t>*</a:t>
+            </a:r>
+            <a:r>
+              <a:rPr lang="en-GB" sz="1400" dirty="0">
+                <a:solidFill>
+                  <a:schemeClr val="accent4"/>
+                </a:solidFill>
+                <a:sym typeface="Symbol" pitchFamily="2" charset="2"/>
+              </a:rPr>
+              <a:t></a:t>
+            </a:r>
+            <a:r>
+              <a:rPr lang="en-CH" sz="1400" baseline="-25000" dirty="0">
+                <a:solidFill>
+                  <a:schemeClr val="accent4"/>
+                </a:solidFill>
+                <a:sym typeface="Symbol" pitchFamily="2" charset="2"/>
+              </a:rPr>
+              <a:t>2</a:t>
+            </a:r>
+            <a:endParaRPr lang="en-CH" sz="1400" baseline="-25000" dirty="0">
+              <a:solidFill>
+                <a:schemeClr val="accent4"/>
+              </a:solidFill>
+            </a:endParaRPr>
+          </a:p>
+        </p:txBody>
+      </p:sp>
+      <p:sp>
+        <p:nvSpPr>
+          <p:cNvPr id="81" name="TextBox 80">
+            <a:extLst>
+              <a:ext uri="{FF2B5EF4-FFF2-40B4-BE49-F238E27FC236}">
+                <a16:creationId xmlns:a16="http://schemas.microsoft.com/office/drawing/2014/main" id="{2DCBE626-BB6C-E9CA-D395-7AF97BD31883}"/>
+              </a:ext>
+            </a:extLst>
+          </p:cNvPr>
+          <p:cNvSpPr txBox="1"/>
+          <p:nvPr/>
+        </p:nvSpPr>
+        <p:spPr>
+          <a:xfrm>
+            <a:off x="7131342" y="1627578"/>
+            <a:ext cx="675185" cy="369332"/>
+          </a:xfrm>
+          <a:prstGeom prst="rect">
+            <a:avLst/>
+          </a:prstGeom>
+          <a:noFill/>
+        </p:spPr>
+        <p:txBody>
+          <a:bodyPr wrap="none" rtlCol="0">
+            <a:spAutoFit/>
+          </a:bodyPr>
+          <a:lstStyle/>
+          <a:p>
+            <a:r>
+              <a:rPr lang="en-GB" dirty="0">
+                <a:solidFill>
+                  <a:srgbClr val="00B050"/>
+                </a:solidFill>
+                <a:sym typeface="Symbol" pitchFamily="2" charset="2"/>
+              </a:rPr>
+              <a:t></a:t>
+            </a:r>
+            <a:r>
+              <a:rPr lang="en-CH" sz="1400" dirty="0">
+                <a:solidFill>
+                  <a:srgbClr val="00B050"/>
+                </a:solidFill>
+                <a:effectLst/>
+              </a:rPr>
+              <a:t>R</a:t>
+            </a:r>
+            <a:r>
+              <a:rPr lang="en-CH" sz="1400" baseline="-25000" dirty="0">
+                <a:solidFill>
+                  <a:srgbClr val="00B050"/>
+                </a:solidFill>
+              </a:rPr>
+              <a:t>1</a:t>
+            </a:r>
+            <a:r>
+              <a:rPr lang="en-CH" sz="1400" dirty="0">
+                <a:solidFill>
+                  <a:srgbClr val="00B050"/>
+                </a:solidFill>
+              </a:rPr>
+              <a:t>*</a:t>
+            </a:r>
+            <a:r>
+              <a:rPr lang="en-GB" sz="1400" dirty="0">
+                <a:solidFill>
+                  <a:srgbClr val="00B050"/>
+                </a:solidFill>
+                <a:sym typeface="Symbol" pitchFamily="2" charset="2"/>
+              </a:rPr>
+              <a:t></a:t>
+            </a:r>
+            <a:endParaRPr lang="en-CH" sz="1400" dirty="0">
+              <a:solidFill>
+                <a:srgbClr val="00B050"/>
+              </a:solidFill>
+            </a:endParaRPr>
+          </a:p>
+        </p:txBody>
+      </p:sp>
+      <p:sp>
+        <p:nvSpPr>
+          <p:cNvPr id="82" name="TextBox 81">
+            <a:extLst>
+              <a:ext uri="{FF2B5EF4-FFF2-40B4-BE49-F238E27FC236}">
+                <a16:creationId xmlns:a16="http://schemas.microsoft.com/office/drawing/2014/main" id="{04AAC104-8B11-CC08-46B6-A2A3C16A547B}"/>
+              </a:ext>
+            </a:extLst>
+          </p:cNvPr>
+          <p:cNvSpPr txBox="1"/>
+          <p:nvPr/>
+        </p:nvSpPr>
+        <p:spPr>
+          <a:xfrm>
+            <a:off x="7887909" y="5085879"/>
+            <a:ext cx="444352" cy="369332"/>
+          </a:xfrm>
+          <a:prstGeom prst="rect">
+            <a:avLst/>
+          </a:prstGeom>
+          <a:noFill/>
+        </p:spPr>
+        <p:txBody>
+          <a:bodyPr wrap="none" rtlCol="0">
+            <a:spAutoFit/>
+          </a:bodyPr>
+          <a:lstStyle/>
+          <a:p>
+            <a:r>
+              <a:rPr lang="en-GB" dirty="0">
+                <a:solidFill>
+                  <a:srgbClr val="00B050"/>
+                </a:solidFill>
+                <a:sym typeface="Symbol" pitchFamily="2" charset="2"/>
+              </a:rPr>
+              <a:t></a:t>
+            </a:r>
+            <a:r>
+              <a:rPr lang="en-CH" sz="1400" baseline="-25000" dirty="0">
+                <a:solidFill>
+                  <a:srgbClr val="00B050"/>
+                </a:solidFill>
+                <a:effectLst/>
+              </a:rPr>
+              <a:t>R2</a:t>
+            </a:r>
+            <a:endParaRPr lang="en-CH" sz="1400" baseline="-25000" dirty="0">
+              <a:solidFill>
+                <a:srgbClr val="00B050"/>
+              </a:solidFill>
+            </a:endParaRPr>
+          </a:p>
+        </p:txBody>
+      </p:sp>
+      <p:sp>
+        <p:nvSpPr>
+          <p:cNvPr id="84" name="TextBox 83">
+            <a:extLst>
+              <a:ext uri="{FF2B5EF4-FFF2-40B4-BE49-F238E27FC236}">
+                <a16:creationId xmlns:a16="http://schemas.microsoft.com/office/drawing/2014/main" id="{16C8D9D9-99AD-F8F0-A3CF-BC0F2451F920}"/>
+              </a:ext>
+            </a:extLst>
+          </p:cNvPr>
+          <p:cNvSpPr txBox="1"/>
+          <p:nvPr/>
+        </p:nvSpPr>
+        <p:spPr>
+          <a:xfrm>
+            <a:off x="7606018" y="3951098"/>
+            <a:ext cx="643125" cy="369332"/>
+          </a:xfrm>
+          <a:prstGeom prst="rect">
+            <a:avLst/>
+          </a:prstGeom>
+          <a:noFill/>
+        </p:spPr>
+        <p:txBody>
+          <a:bodyPr wrap="none" rtlCol="0">
+            <a:spAutoFit/>
+          </a:bodyPr>
+          <a:lstStyle/>
+          <a:p>
+            <a:r>
+              <a:rPr lang="en-GB" dirty="0">
+                <a:solidFill>
+                  <a:srgbClr val="00B050"/>
+                </a:solidFill>
+                <a:sym typeface="Symbol" pitchFamily="2" charset="2"/>
+              </a:rPr>
+              <a:t></a:t>
+            </a:r>
+            <a:r>
+              <a:rPr lang="en-CH" sz="1400" baseline="-25000" dirty="0">
+                <a:solidFill>
+                  <a:srgbClr val="00B050"/>
+                </a:solidFill>
+                <a:effectLst/>
+              </a:rPr>
+              <a:t>R2</a:t>
+            </a:r>
+            <a:r>
+              <a:rPr lang="en-CH" sz="1400" dirty="0">
+                <a:solidFill>
+                  <a:srgbClr val="00B050"/>
+                </a:solidFill>
+              </a:rPr>
+              <a:t>*</a:t>
+            </a:r>
+            <a:r>
+              <a:rPr lang="en-GB" sz="1400" dirty="0">
+                <a:solidFill>
+                  <a:srgbClr val="00B050"/>
+                </a:solidFill>
+                <a:sym typeface="Symbol" pitchFamily="2" charset="2"/>
+              </a:rPr>
+              <a:t></a:t>
+            </a:r>
+            <a:endParaRPr lang="en-CH" sz="1400" dirty="0">
+              <a:solidFill>
+                <a:srgbClr val="00B050"/>
+              </a:solidFill>
+            </a:endParaRPr>
+          </a:p>
+        </p:txBody>
+      </p:sp>
+      <p:sp>
+        <p:nvSpPr>
+          <p:cNvPr id="85" name="TextBox 84">
+            <a:extLst>
+              <a:ext uri="{FF2B5EF4-FFF2-40B4-BE49-F238E27FC236}">
+                <a16:creationId xmlns:a16="http://schemas.microsoft.com/office/drawing/2014/main" id="{427BD754-CA84-EBEF-5C84-CD5F91E7C381}"/>
+              </a:ext>
+            </a:extLst>
+          </p:cNvPr>
+          <p:cNvSpPr txBox="1"/>
+          <p:nvPr/>
+        </p:nvSpPr>
+        <p:spPr>
+          <a:xfrm>
+            <a:off x="9191811" y="2695555"/>
+            <a:ext cx="481222" cy="369332"/>
+          </a:xfrm>
+          <a:prstGeom prst="rect">
+            <a:avLst/>
+          </a:prstGeom>
+          <a:noFill/>
+        </p:spPr>
+        <p:txBody>
+          <a:bodyPr wrap="none" rtlCol="0">
+            <a:spAutoFit/>
+          </a:bodyPr>
+          <a:lstStyle/>
+          <a:p>
+            <a:r>
+              <a:rPr lang="en-GB" dirty="0">
+                <a:solidFill>
+                  <a:srgbClr val="00B050"/>
+                </a:solidFill>
+                <a:sym typeface="Symbol" pitchFamily="2" charset="2"/>
+              </a:rPr>
+              <a:t></a:t>
+            </a:r>
+            <a:r>
+              <a:rPr lang="en-CH" sz="1400" baseline="-25000" dirty="0">
+                <a:solidFill>
+                  <a:srgbClr val="00B050"/>
+                </a:solidFill>
+                <a:sym typeface="Symbol" pitchFamily="2" charset="2"/>
+              </a:rPr>
+              <a:t>WT</a:t>
+            </a:r>
+            <a:endParaRPr lang="en-CH" sz="1400" baseline="-25000" dirty="0">
+              <a:solidFill>
+                <a:srgbClr val="00B050"/>
+              </a:solidFill>
+            </a:endParaRPr>
+          </a:p>
+        </p:txBody>
+      </p:sp>
+      <p:sp>
+        <p:nvSpPr>
+          <p:cNvPr id="87" name="TextBox 86">
+            <a:extLst>
+              <a:ext uri="{FF2B5EF4-FFF2-40B4-BE49-F238E27FC236}">
+                <a16:creationId xmlns:a16="http://schemas.microsoft.com/office/drawing/2014/main" id="{7A4D9E40-4862-4BBD-2155-F6A38DCEA233}"/>
+              </a:ext>
+            </a:extLst>
+          </p:cNvPr>
+          <p:cNvSpPr txBox="1"/>
+          <p:nvPr/>
+        </p:nvSpPr>
+        <p:spPr>
+          <a:xfrm>
+            <a:off x="5883799" y="3552021"/>
+            <a:ext cx="679994" cy="369332"/>
+          </a:xfrm>
+          <a:prstGeom prst="rect">
+            <a:avLst/>
+          </a:prstGeom>
+          <a:noFill/>
+        </p:spPr>
+        <p:txBody>
+          <a:bodyPr wrap="none" rtlCol="0">
+            <a:spAutoFit/>
+          </a:bodyPr>
+          <a:lstStyle/>
+          <a:p>
+            <a:r>
+              <a:rPr lang="en-GB" dirty="0">
+                <a:solidFill>
+                  <a:srgbClr val="00B050"/>
+                </a:solidFill>
+                <a:sym typeface="Symbol" pitchFamily="2" charset="2"/>
+              </a:rPr>
+              <a:t></a:t>
+            </a:r>
+            <a:r>
+              <a:rPr lang="en-CH" sz="1400" baseline="-25000" dirty="0">
+                <a:solidFill>
+                  <a:srgbClr val="00B050"/>
+                </a:solidFill>
+                <a:sym typeface="Symbol" pitchFamily="2" charset="2"/>
+              </a:rPr>
+              <a:t>WT</a:t>
+            </a:r>
+            <a:r>
+              <a:rPr lang="en-CH" sz="1400" dirty="0">
+                <a:solidFill>
+                  <a:srgbClr val="00B050"/>
+                </a:solidFill>
+                <a:sym typeface="Symbol" pitchFamily="2" charset="2"/>
+              </a:rPr>
+              <a:t>*</a:t>
+            </a:r>
+            <a:r>
+              <a:rPr lang="en-GB" sz="1400" dirty="0">
+                <a:solidFill>
+                  <a:srgbClr val="00B050"/>
+                </a:solidFill>
+                <a:sym typeface="Symbol" pitchFamily="2" charset="2"/>
+              </a:rPr>
+              <a:t></a:t>
+            </a:r>
+            <a:endParaRPr lang="en-CH" sz="1400" dirty="0">
+              <a:solidFill>
+                <a:srgbClr val="00B050"/>
+              </a:solidFill>
+            </a:endParaRPr>
+          </a:p>
+        </p:txBody>
+      </p:sp>
+      <p:sp>
+        <p:nvSpPr>
+          <p:cNvPr id="88" name="TextBox 87">
+            <a:extLst>
+              <a:ext uri="{FF2B5EF4-FFF2-40B4-BE49-F238E27FC236}">
+                <a16:creationId xmlns:a16="http://schemas.microsoft.com/office/drawing/2014/main" id="{CF19CA23-F3EF-5AB7-7078-194E45AADFD5}"/>
+              </a:ext>
+            </a:extLst>
+          </p:cNvPr>
+          <p:cNvSpPr txBox="1"/>
+          <p:nvPr/>
+        </p:nvSpPr>
+        <p:spPr>
+          <a:xfrm>
+            <a:off x="9248717" y="4129120"/>
+            <a:ext cx="683200" cy="307777"/>
+          </a:xfrm>
+          <a:prstGeom prst="rect">
+            <a:avLst/>
+          </a:prstGeom>
+          <a:noFill/>
+        </p:spPr>
+        <p:txBody>
+          <a:bodyPr wrap="none" rtlCol="0">
+            <a:spAutoFit/>
+          </a:bodyPr>
+          <a:lstStyle/>
+          <a:p>
+            <a:r>
+              <a:rPr lang="en-GB" sz="1400" dirty="0">
+                <a:solidFill>
+                  <a:srgbClr val="0070C0"/>
+                </a:solidFill>
+                <a:sym typeface="Symbol" pitchFamily="2" charset="2"/>
+              </a:rPr>
+              <a:t>R</a:t>
+            </a:r>
+            <a:r>
+              <a:rPr lang="en-GB" sz="1400" baseline="-25000" dirty="0">
+                <a:solidFill>
+                  <a:srgbClr val="0070C0"/>
+                </a:solidFill>
+                <a:sym typeface="Symbol" pitchFamily="2" charset="2"/>
+              </a:rPr>
+              <a:t>1</a:t>
+            </a:r>
+            <a:r>
+              <a:rPr lang="en-GB" sz="1400" dirty="0">
+                <a:solidFill>
+                  <a:srgbClr val="0070C0"/>
+                </a:solidFill>
+                <a:sym typeface="Symbol" pitchFamily="2" charset="2"/>
+              </a:rPr>
+              <a:t>*</a:t>
+            </a:r>
+            <a:r>
+              <a:rPr lang="en-CH" sz="1400" baseline="-25000" dirty="0">
+                <a:solidFill>
+                  <a:srgbClr val="0070C0"/>
+                </a:solidFill>
+                <a:sym typeface="Symbol" pitchFamily="2" charset="2"/>
+              </a:rPr>
+              <a:t>1</a:t>
+            </a:r>
+            <a:endParaRPr lang="en-CH" sz="1400" baseline="-25000" dirty="0">
+              <a:solidFill>
+                <a:srgbClr val="0070C0"/>
+              </a:solidFill>
+            </a:endParaRPr>
+          </a:p>
+        </p:txBody>
+      </p:sp>
+      <p:sp>
+        <p:nvSpPr>
+          <p:cNvPr id="90" name="TextBox 89">
+            <a:extLst>
+              <a:ext uri="{FF2B5EF4-FFF2-40B4-BE49-F238E27FC236}">
+                <a16:creationId xmlns:a16="http://schemas.microsoft.com/office/drawing/2014/main" id="{92E398A6-B30D-1CC2-BBBF-27854874DF72}"/>
+              </a:ext>
+            </a:extLst>
+          </p:cNvPr>
+          <p:cNvSpPr txBox="1"/>
+          <p:nvPr/>
+        </p:nvSpPr>
+        <p:spPr>
+          <a:xfrm>
+            <a:off x="8812118" y="3090379"/>
+            <a:ext cx="1451038" cy="307777"/>
+          </a:xfrm>
+          <a:prstGeom prst="rect">
+            <a:avLst/>
+          </a:prstGeom>
+          <a:noFill/>
+        </p:spPr>
+        <p:txBody>
+          <a:bodyPr wrap="none" rtlCol="0">
+            <a:spAutoFit/>
+          </a:bodyPr>
+          <a:lstStyle/>
+          <a:p>
+            <a:r>
+              <a:rPr lang="en-GB" sz="1400" dirty="0">
+                <a:solidFill>
+                  <a:srgbClr val="0070C0"/>
+                </a:solidFill>
+                <a:sym typeface="Symbol" pitchFamily="2" charset="2"/>
+              </a:rPr>
+              <a:t> (R</a:t>
+            </a:r>
+            <a:r>
+              <a:rPr lang="en-GB" sz="1400" baseline="-25000" dirty="0">
+                <a:solidFill>
+                  <a:srgbClr val="0070C0"/>
+                </a:solidFill>
+                <a:sym typeface="Symbol" pitchFamily="2" charset="2"/>
+              </a:rPr>
+              <a:t>1</a:t>
+            </a:r>
+            <a:r>
+              <a:rPr lang="en-GB" sz="1400" dirty="0">
+                <a:solidFill>
+                  <a:srgbClr val="0070C0"/>
+                </a:solidFill>
+                <a:sym typeface="Symbol" pitchFamily="2" charset="2"/>
+              </a:rPr>
+              <a:t>*</a:t>
+            </a:r>
+            <a:r>
+              <a:rPr lang="en-CH" sz="1400" baseline="-25000" dirty="0">
+                <a:solidFill>
+                  <a:srgbClr val="0070C0"/>
+                </a:solidFill>
+                <a:sym typeface="Symbol" pitchFamily="2" charset="2"/>
+              </a:rPr>
+              <a:t>1</a:t>
+            </a:r>
+            <a:r>
+              <a:rPr lang="en-CH" sz="1400" dirty="0">
+                <a:solidFill>
+                  <a:srgbClr val="0070C0"/>
+                </a:solidFill>
+                <a:sym typeface="Symbol" pitchFamily="2" charset="2"/>
+              </a:rPr>
+              <a:t>)+</a:t>
+            </a:r>
+            <a:r>
+              <a:rPr lang="en-GB" sz="1400" dirty="0">
+                <a:solidFill>
+                  <a:srgbClr val="0070C0"/>
+                </a:solidFill>
+                <a:sym typeface="Symbol" pitchFamily="2" charset="2"/>
+              </a:rPr>
+              <a:t>(R</a:t>
+            </a:r>
+            <a:r>
+              <a:rPr lang="en-GB" sz="1400" baseline="-25000" dirty="0">
+                <a:solidFill>
+                  <a:srgbClr val="0070C0"/>
+                </a:solidFill>
+                <a:sym typeface="Symbol" pitchFamily="2" charset="2"/>
+              </a:rPr>
+              <a:t>2</a:t>
+            </a:r>
+            <a:r>
+              <a:rPr lang="en-GB" sz="1400" dirty="0">
+                <a:solidFill>
+                  <a:srgbClr val="0070C0"/>
+                </a:solidFill>
+                <a:sym typeface="Symbol" pitchFamily="2" charset="2"/>
+              </a:rPr>
+              <a:t>*</a:t>
+            </a:r>
+            <a:r>
+              <a:rPr lang="en-CH" sz="1400" baseline="-25000" dirty="0">
+                <a:solidFill>
+                  <a:srgbClr val="0070C0"/>
+                </a:solidFill>
+                <a:sym typeface="Symbol" pitchFamily="2" charset="2"/>
+              </a:rPr>
+              <a:t>2</a:t>
+            </a:r>
+            <a:r>
+              <a:rPr lang="en-CH" sz="1400" dirty="0">
+                <a:solidFill>
+                  <a:srgbClr val="0070C0"/>
+                </a:solidFill>
+                <a:sym typeface="Symbol" pitchFamily="2" charset="2"/>
+              </a:rPr>
+              <a:t>)</a:t>
+            </a:r>
+            <a:endParaRPr lang="en-CH" sz="1400" dirty="0">
+              <a:solidFill>
+                <a:srgbClr val="0070C0"/>
+              </a:solidFill>
+            </a:endParaRPr>
+          </a:p>
+        </p:txBody>
+      </p:sp>
+      <p:sp>
+        <p:nvSpPr>
+          <p:cNvPr id="91" name="TextBox 90">
+            <a:extLst>
+              <a:ext uri="{FF2B5EF4-FFF2-40B4-BE49-F238E27FC236}">
+                <a16:creationId xmlns:a16="http://schemas.microsoft.com/office/drawing/2014/main" id="{645C342F-CCB9-1596-864B-FD5A3CA27982}"/>
+              </a:ext>
+            </a:extLst>
+          </p:cNvPr>
+          <p:cNvSpPr txBox="1"/>
+          <p:nvPr/>
+        </p:nvSpPr>
+        <p:spPr>
+          <a:xfrm>
+            <a:off x="5479072" y="4473759"/>
+            <a:ext cx="282450" cy="307777"/>
+          </a:xfrm>
+          <a:prstGeom prst="rect">
+            <a:avLst/>
+          </a:prstGeom>
+          <a:noFill/>
+        </p:spPr>
+        <p:txBody>
+          <a:bodyPr wrap="none" rtlCol="0">
+            <a:spAutoFit/>
+          </a:bodyPr>
+          <a:lstStyle/>
+          <a:p>
+            <a:r>
+              <a:rPr lang="en-GB" sz="1400" dirty="0">
+                <a:solidFill>
+                  <a:schemeClr val="accent2"/>
+                </a:solidFill>
+                <a:sym typeface="Symbol" pitchFamily="2" charset="2"/>
+              </a:rPr>
+              <a:t></a:t>
+            </a:r>
+            <a:endParaRPr lang="en-CH" sz="1100" dirty="0">
+              <a:solidFill>
+                <a:schemeClr val="accent2"/>
+              </a:solidFill>
+            </a:endParaRPr>
+          </a:p>
+        </p:txBody>
+      </p:sp>
+      <p:cxnSp>
+        <p:nvCxnSpPr>
+          <p:cNvPr id="92" name="Straight Arrow Connector 91">
+            <a:extLst>
+              <a:ext uri="{FF2B5EF4-FFF2-40B4-BE49-F238E27FC236}">
+                <a16:creationId xmlns:a16="http://schemas.microsoft.com/office/drawing/2014/main" id="{CAFD8D45-387C-2EC5-03D6-3E27BC49807C}"/>
+              </a:ext>
+            </a:extLst>
+          </p:cNvPr>
+          <p:cNvCxnSpPr>
+            <a:cxnSpLocks/>
+          </p:cNvCxnSpPr>
+          <p:nvPr/>
+        </p:nvCxnSpPr>
+        <p:spPr>
+          <a:xfrm>
+            <a:off x="5470238" y="3646905"/>
+            <a:ext cx="1936840" cy="0"/>
+          </a:xfrm>
+          <a:prstGeom prst="straightConnector1">
+            <a:avLst/>
+          </a:prstGeom>
+          <a:ln>
+            <a:solidFill>
+              <a:srgbClr val="00B050"/>
+            </a:solidFill>
+            <a:headEnd type="none"/>
+            <a:tailEnd type="triangle"/>
+          </a:ln>
+        </p:spPr>
+        <p:style>
+          <a:lnRef idx="1">
+            <a:schemeClr val="accent1"/>
+          </a:lnRef>
+          <a:fillRef idx="0">
+            <a:schemeClr val="accent1"/>
+          </a:fillRef>
+          <a:effectRef idx="0">
+            <a:schemeClr val="accent1"/>
+          </a:effectRef>
+          <a:fontRef idx="minor">
+            <a:schemeClr val="tx1"/>
+          </a:fontRef>
+        </p:style>
+      </p:cxnSp>
+      <p:cxnSp>
+        <p:nvCxnSpPr>
+          <p:cNvPr id="93" name="Straight Arrow Connector 92">
+            <a:extLst>
+              <a:ext uri="{FF2B5EF4-FFF2-40B4-BE49-F238E27FC236}">
+                <a16:creationId xmlns:a16="http://schemas.microsoft.com/office/drawing/2014/main" id="{1EBF8684-C908-6CB9-5C62-39CBB9FDB091}"/>
+              </a:ext>
+            </a:extLst>
+          </p:cNvPr>
+          <p:cNvCxnSpPr>
+            <a:cxnSpLocks/>
+          </p:cNvCxnSpPr>
+          <p:nvPr/>
+        </p:nvCxnSpPr>
+        <p:spPr>
+          <a:xfrm flipH="1">
+            <a:off x="6841003" y="3855863"/>
+            <a:ext cx="845580" cy="1228121"/>
+          </a:xfrm>
+          <a:prstGeom prst="straightConnector1">
+            <a:avLst/>
+          </a:prstGeom>
+          <a:ln>
+            <a:solidFill>
+              <a:schemeClr val="accent4"/>
+            </a:solidFill>
+            <a:headEnd type="triangle"/>
+            <a:tailEnd type="none"/>
+          </a:ln>
+        </p:spPr>
+        <p:style>
+          <a:lnRef idx="1">
+            <a:schemeClr val="accent1"/>
+          </a:lnRef>
+          <a:fillRef idx="0">
+            <a:schemeClr val="accent1"/>
+          </a:fillRef>
+          <a:effectRef idx="0">
+            <a:schemeClr val="accent1"/>
+          </a:effectRef>
+          <a:fontRef idx="minor">
+            <a:schemeClr val="tx1"/>
+          </a:fontRef>
+        </p:style>
+      </p:cxnSp>
+      <p:cxnSp>
+        <p:nvCxnSpPr>
+          <p:cNvPr id="95" name="Straight Arrow Connector 94">
+            <a:extLst>
+              <a:ext uri="{FF2B5EF4-FFF2-40B4-BE49-F238E27FC236}">
+                <a16:creationId xmlns:a16="http://schemas.microsoft.com/office/drawing/2014/main" id="{63A26A68-6740-3098-E09D-7E2D25ACA249}"/>
+              </a:ext>
+            </a:extLst>
+          </p:cNvPr>
+          <p:cNvCxnSpPr>
+            <a:cxnSpLocks/>
+          </p:cNvCxnSpPr>
+          <p:nvPr/>
+        </p:nvCxnSpPr>
+        <p:spPr>
+          <a:xfrm flipH="1" flipV="1">
+            <a:off x="6926767" y="1713814"/>
+            <a:ext cx="646354" cy="1166130"/>
+          </a:xfrm>
+          <a:prstGeom prst="straightConnector1">
+            <a:avLst/>
+          </a:prstGeom>
+          <a:ln>
+            <a:solidFill>
+              <a:schemeClr val="accent4"/>
+            </a:solidFill>
+            <a:headEnd type="triangle"/>
+            <a:tailEnd type="none"/>
+          </a:ln>
+        </p:spPr>
+        <p:style>
+          <a:lnRef idx="1">
+            <a:schemeClr val="accent1"/>
+          </a:lnRef>
+          <a:fillRef idx="0">
+            <a:schemeClr val="accent1"/>
+          </a:fillRef>
+          <a:effectRef idx="0">
+            <a:schemeClr val="accent1"/>
+          </a:effectRef>
+          <a:fontRef idx="minor">
+            <a:schemeClr val="tx1"/>
+          </a:fontRef>
+        </p:style>
+      </p:cxnSp>
+      <p:sp>
+        <p:nvSpPr>
+          <p:cNvPr id="64" name="TextBox 63">
+            <a:extLst>
+              <a:ext uri="{FF2B5EF4-FFF2-40B4-BE49-F238E27FC236}">
+                <a16:creationId xmlns:a16="http://schemas.microsoft.com/office/drawing/2014/main" id="{55F167BF-502C-4FA4-9747-848A23C1B47E}"/>
+              </a:ext>
+            </a:extLst>
+          </p:cNvPr>
+          <p:cNvSpPr txBox="1"/>
+          <p:nvPr/>
+        </p:nvSpPr>
+        <p:spPr>
+          <a:xfrm>
+            <a:off x="5969299" y="2068616"/>
+            <a:ext cx="1106393" cy="307777"/>
+          </a:xfrm>
+          <a:prstGeom prst="rect">
+            <a:avLst/>
+          </a:prstGeom>
+          <a:noFill/>
+        </p:spPr>
+        <p:txBody>
+          <a:bodyPr wrap="none" rtlCol="0">
+            <a:spAutoFit/>
+          </a:bodyPr>
+          <a:lstStyle/>
+          <a:p>
+            <a:r>
+              <a:rPr lang="en-CH" sz="1400" dirty="0">
+                <a:solidFill>
+                  <a:schemeClr val="accent4"/>
+                </a:solidFill>
+              </a:rPr>
+              <a:t>PrR</a:t>
+            </a:r>
+            <a:r>
+              <a:rPr lang="en-CH" sz="1400" baseline="-25000" dirty="0">
+                <a:solidFill>
+                  <a:schemeClr val="accent4"/>
+                </a:solidFill>
+              </a:rPr>
+              <a:t>1</a:t>
+            </a:r>
+            <a:r>
+              <a:rPr lang="en-GB" sz="1400" dirty="0">
+                <a:solidFill>
+                  <a:schemeClr val="accent4"/>
+                </a:solidFill>
+                <a:sym typeface="Symbol" pitchFamily="2" charset="2"/>
+              </a:rPr>
+              <a:t>(1-</a:t>
+            </a:r>
+            <a:r>
+              <a:rPr lang="el-GR" sz="1400" dirty="0">
+                <a:solidFill>
+                  <a:schemeClr val="accent4"/>
+                </a:solidFill>
+              </a:rPr>
+              <a:t>ρ</a:t>
+            </a:r>
+            <a:r>
+              <a:rPr lang="de-CH" sz="1400" dirty="0">
+                <a:solidFill>
+                  <a:schemeClr val="accent4"/>
+                </a:solidFill>
+              </a:rPr>
+              <a:t>)*</a:t>
+            </a:r>
+            <a:r>
+              <a:rPr lang="en-GB" sz="1400" dirty="0">
+                <a:solidFill>
+                  <a:schemeClr val="accent4"/>
+                </a:solidFill>
+                <a:sym typeface="Symbol" pitchFamily="2" charset="2"/>
+              </a:rPr>
+              <a:t></a:t>
+            </a:r>
+            <a:r>
+              <a:rPr lang="en-CH" sz="1400" baseline="-25000" dirty="0">
+                <a:solidFill>
+                  <a:schemeClr val="accent4"/>
+                </a:solidFill>
+                <a:sym typeface="Symbol" pitchFamily="2" charset="2"/>
+              </a:rPr>
+              <a:t>1</a:t>
+            </a:r>
+            <a:endParaRPr lang="en-CH" sz="1400" baseline="-25000" dirty="0">
+              <a:solidFill>
+                <a:schemeClr val="accent4"/>
+              </a:solidFill>
+            </a:endParaRPr>
+          </a:p>
+        </p:txBody>
+      </p:sp>
+      <p:sp>
+        <p:nvSpPr>
+          <p:cNvPr id="65" name="TextBox 64">
+            <a:extLst>
+              <a:ext uri="{FF2B5EF4-FFF2-40B4-BE49-F238E27FC236}">
+                <a16:creationId xmlns:a16="http://schemas.microsoft.com/office/drawing/2014/main" id="{8255D1BF-DE0F-CD56-B296-C9093A9AB00C}"/>
+              </a:ext>
+            </a:extLst>
+          </p:cNvPr>
+          <p:cNvSpPr txBox="1"/>
+          <p:nvPr/>
+        </p:nvSpPr>
+        <p:spPr>
+          <a:xfrm>
+            <a:off x="4403205" y="5227201"/>
+            <a:ext cx="1285929" cy="307777"/>
+          </a:xfrm>
+          <a:prstGeom prst="rect">
+            <a:avLst/>
+          </a:prstGeom>
+          <a:noFill/>
+        </p:spPr>
+        <p:txBody>
+          <a:bodyPr wrap="none" rtlCol="0">
+            <a:spAutoFit/>
+          </a:bodyPr>
+          <a:lstStyle/>
+          <a:p>
+            <a:r>
+              <a:rPr lang="en-CH" sz="1400" dirty="0">
+                <a:solidFill>
+                  <a:schemeClr val="accent4"/>
+                </a:solidFill>
+              </a:rPr>
+              <a:t>Pr*R</a:t>
+            </a:r>
+            <a:r>
+              <a:rPr lang="en-CH" sz="1400" baseline="-25000" dirty="0">
+                <a:solidFill>
+                  <a:schemeClr val="accent4"/>
+                </a:solidFill>
+              </a:rPr>
+              <a:t>2</a:t>
+            </a:r>
+            <a:r>
+              <a:rPr lang="en-GB" sz="1400" dirty="0">
+                <a:solidFill>
+                  <a:schemeClr val="accent4"/>
+                </a:solidFill>
+                <a:sym typeface="Symbol" pitchFamily="2" charset="2"/>
+              </a:rPr>
+              <a:t>*(1-</a:t>
+            </a:r>
+            <a:r>
+              <a:rPr lang="el-GR" sz="1400" dirty="0">
+                <a:solidFill>
+                  <a:schemeClr val="accent4"/>
+                </a:solidFill>
+              </a:rPr>
+              <a:t>ρ</a:t>
+            </a:r>
+            <a:r>
+              <a:rPr lang="de-CH" sz="1400" dirty="0">
+                <a:solidFill>
+                  <a:schemeClr val="accent4"/>
+                </a:solidFill>
+              </a:rPr>
+              <a:t>)*</a:t>
+            </a:r>
+            <a:r>
+              <a:rPr lang="en-GB" sz="1400" dirty="0">
+                <a:solidFill>
+                  <a:schemeClr val="accent4"/>
+                </a:solidFill>
+                <a:sym typeface="Symbol" pitchFamily="2" charset="2"/>
+              </a:rPr>
+              <a:t></a:t>
+            </a:r>
+            <a:r>
+              <a:rPr lang="en-CH" sz="1400" baseline="-25000" dirty="0">
+                <a:solidFill>
+                  <a:schemeClr val="accent4"/>
+                </a:solidFill>
+                <a:sym typeface="Symbol" pitchFamily="2" charset="2"/>
+              </a:rPr>
+              <a:t>2</a:t>
+            </a:r>
+            <a:endParaRPr lang="en-CH" sz="1400" baseline="-25000" dirty="0">
+              <a:solidFill>
+                <a:schemeClr val="accent4"/>
+              </a:solidFill>
+            </a:endParaRPr>
+          </a:p>
+        </p:txBody>
+      </p:sp>
+      <p:cxnSp>
+        <p:nvCxnSpPr>
+          <p:cNvPr id="67" name="Straight Arrow Connector 66">
+            <a:extLst>
+              <a:ext uri="{FF2B5EF4-FFF2-40B4-BE49-F238E27FC236}">
+                <a16:creationId xmlns:a16="http://schemas.microsoft.com/office/drawing/2014/main" id="{35BF6440-BA6E-B9ED-605E-71BD2ADCDD96}"/>
+              </a:ext>
+            </a:extLst>
+          </p:cNvPr>
+          <p:cNvCxnSpPr>
+            <a:cxnSpLocks/>
+          </p:cNvCxnSpPr>
+          <p:nvPr/>
+        </p:nvCxnSpPr>
+        <p:spPr>
+          <a:xfrm flipH="1" flipV="1">
+            <a:off x="6797002" y="1831335"/>
+            <a:ext cx="593443" cy="1066066"/>
+          </a:xfrm>
+          <a:prstGeom prst="straightConnector1">
+            <a:avLst/>
+          </a:prstGeom>
+          <a:ln w="12700">
+            <a:solidFill>
+              <a:schemeClr val="accent4"/>
+            </a:solidFill>
+            <a:prstDash val="solid"/>
+            <a:headEnd type="none"/>
+            <a:tailEnd type="triangle"/>
+          </a:ln>
+        </p:spPr>
+        <p:style>
+          <a:lnRef idx="1">
+            <a:schemeClr val="accent1"/>
+          </a:lnRef>
+          <a:fillRef idx="0">
+            <a:schemeClr val="accent1"/>
+          </a:fillRef>
+          <a:effectRef idx="0">
+            <a:schemeClr val="accent1"/>
+          </a:effectRef>
+          <a:fontRef idx="minor">
+            <a:schemeClr val="tx1"/>
+          </a:fontRef>
+        </p:style>
+      </p:cxnSp>
+      <p:cxnSp>
+        <p:nvCxnSpPr>
+          <p:cNvPr id="96" name="Straight Arrow Connector 95">
+            <a:extLst>
+              <a:ext uri="{FF2B5EF4-FFF2-40B4-BE49-F238E27FC236}">
+                <a16:creationId xmlns:a16="http://schemas.microsoft.com/office/drawing/2014/main" id="{34CB3543-967D-2E59-A38B-12897BBA801C}"/>
+              </a:ext>
+            </a:extLst>
+          </p:cNvPr>
+          <p:cNvCxnSpPr>
+            <a:cxnSpLocks/>
+          </p:cNvCxnSpPr>
+          <p:nvPr/>
+        </p:nvCxnSpPr>
+        <p:spPr>
+          <a:xfrm flipH="1">
+            <a:off x="6807366" y="3911972"/>
+            <a:ext cx="747545" cy="970737"/>
+          </a:xfrm>
+          <a:prstGeom prst="straightConnector1">
+            <a:avLst/>
+          </a:prstGeom>
+          <a:ln w="12700">
+            <a:solidFill>
+              <a:schemeClr val="accent4"/>
+            </a:solidFill>
+            <a:prstDash val="solid"/>
+            <a:headEnd type="none"/>
+            <a:tailEnd type="triangle"/>
+          </a:ln>
+        </p:spPr>
+        <p:style>
+          <a:lnRef idx="1">
+            <a:schemeClr val="accent1"/>
+          </a:lnRef>
+          <a:fillRef idx="0">
+            <a:schemeClr val="accent1"/>
+          </a:fillRef>
+          <a:effectRef idx="0">
+            <a:schemeClr val="accent1"/>
+          </a:effectRef>
+          <a:fontRef idx="minor">
+            <a:schemeClr val="tx1"/>
+          </a:fontRef>
+        </p:style>
+      </p:cxnSp>
+      <p:sp>
+        <p:nvSpPr>
+          <p:cNvPr id="97" name="TextBox 96">
+            <a:extLst>
+              <a:ext uri="{FF2B5EF4-FFF2-40B4-BE49-F238E27FC236}">
+                <a16:creationId xmlns:a16="http://schemas.microsoft.com/office/drawing/2014/main" id="{3DF63322-4582-6F28-C02C-7D94FF7D14D1}"/>
+              </a:ext>
+            </a:extLst>
+          </p:cNvPr>
+          <p:cNvSpPr txBox="1"/>
+          <p:nvPr/>
+        </p:nvSpPr>
+        <p:spPr>
+          <a:xfrm>
+            <a:off x="6064316" y="4372129"/>
+            <a:ext cx="1106393" cy="307777"/>
+          </a:xfrm>
+          <a:prstGeom prst="rect">
+            <a:avLst/>
+          </a:prstGeom>
+          <a:noFill/>
+        </p:spPr>
+        <p:txBody>
+          <a:bodyPr wrap="none" rtlCol="0">
+            <a:spAutoFit/>
+          </a:bodyPr>
+          <a:lstStyle/>
+          <a:p>
+            <a:r>
+              <a:rPr lang="en-CH" sz="1400" dirty="0">
+                <a:solidFill>
+                  <a:schemeClr val="accent4"/>
+                </a:solidFill>
+              </a:rPr>
+              <a:t>PrR</a:t>
+            </a:r>
+            <a:r>
+              <a:rPr lang="en-CH" sz="1400" baseline="-25000" dirty="0">
+                <a:solidFill>
+                  <a:schemeClr val="accent4"/>
+                </a:solidFill>
+              </a:rPr>
+              <a:t>2</a:t>
+            </a:r>
+            <a:r>
+              <a:rPr lang="en-GB" sz="1400" dirty="0">
+                <a:solidFill>
+                  <a:schemeClr val="accent4"/>
+                </a:solidFill>
+                <a:sym typeface="Symbol" pitchFamily="2" charset="2"/>
+              </a:rPr>
+              <a:t>(1-</a:t>
+            </a:r>
+            <a:r>
+              <a:rPr lang="el-GR" sz="1400" dirty="0">
+                <a:solidFill>
+                  <a:schemeClr val="accent4"/>
+                </a:solidFill>
+              </a:rPr>
+              <a:t>ρ</a:t>
+            </a:r>
+            <a:r>
+              <a:rPr lang="de-CH" sz="1400" dirty="0">
+                <a:solidFill>
+                  <a:schemeClr val="accent4"/>
+                </a:solidFill>
+              </a:rPr>
+              <a:t>)*</a:t>
+            </a:r>
+            <a:r>
+              <a:rPr lang="en-GB" sz="1400" dirty="0">
+                <a:solidFill>
+                  <a:schemeClr val="accent4"/>
+                </a:solidFill>
+                <a:sym typeface="Symbol" pitchFamily="2" charset="2"/>
+              </a:rPr>
+              <a:t></a:t>
+            </a:r>
+            <a:r>
+              <a:rPr lang="en-CH" sz="1400" baseline="-25000" dirty="0">
+                <a:solidFill>
+                  <a:schemeClr val="accent4"/>
+                </a:solidFill>
+                <a:sym typeface="Symbol" pitchFamily="2" charset="2"/>
+              </a:rPr>
+              <a:t>2</a:t>
+            </a:r>
+            <a:endParaRPr lang="en-CH" sz="1400" baseline="-25000" dirty="0">
+              <a:solidFill>
+                <a:schemeClr val="accent4"/>
+              </a:solidFill>
+            </a:endParaRPr>
+          </a:p>
+        </p:txBody>
+      </p:sp>
+    </p:spTree>
+    <p:extLst>
+      <p:ext uri="{BB962C8B-B14F-4D97-AF65-F5344CB8AC3E}">
+        <p14:creationId xmlns:p14="http://schemas.microsoft.com/office/powerpoint/2010/main" val="1468576675"/>
+      </p:ext>
+    </p:extLst>
+  </p:cSld>
+  <p:clrMapOvr>
+    <a:masterClrMapping/>
+  </p:clrMapOvr>
+</p:sld>
+</file>
+
+<file path=ppt/slides/slide6.xml><?xml version="1.0" encoding="utf-8"?>
+<p:sld xmlns:a="http://schemas.openxmlformats.org/drawingml/2006/main" xmlns:r="http://schemas.openxmlformats.org/officeDocument/2006/relationships" xmlns:p="http://schemas.openxmlformats.org/presentationml/2006/main">
+  <p:cSld>
+    <p:spTree>
+      <p:nvGrpSpPr>
+        <p:cNvPr id="1" name=""/>
+        <p:cNvGrpSpPr/>
+        <p:nvPr/>
+      </p:nvGrpSpPr>
+      <p:grpSpPr>
+        <a:xfrm>
+          <a:off x="0" y="0"/>
+          <a:ext cx="0" cy="0"/>
+          <a:chOff x="0" y="0"/>
+          <a:chExt cx="0" cy="0"/>
+        </a:xfrm>
+      </p:grpSpPr>
+      <p:sp>
+        <p:nvSpPr>
           <p:cNvPr id="2" name="Title 1">
             <a:extLst>
               <a:ext uri="{FF2B5EF4-FFF2-40B4-BE49-F238E27FC236}">
@@ -15533,7 +19834,7 @@
 </p:sld>
 </file>
 
-<file path=ppt/slides/slide6.xml><?xml version="1.0" encoding="utf-8"?>
+<file path=ppt/slides/slide7.xml><?xml version="1.0" encoding="utf-8"?>
 <p:sld xmlns:a="http://schemas.openxmlformats.org/drawingml/2006/main" xmlns:r="http://schemas.openxmlformats.org/officeDocument/2006/relationships" xmlns:p="http://schemas.openxmlformats.org/presentationml/2006/main">
   <p:cSld>
     <p:spTree>

</xml_diff>

<commit_message>
alterations and update to MDR
</commit_message>
<xml_diff>
--- a/Formalised_Anal/Prophylaxis_Model.pptx
+++ b/Formalised_Anal/Prophylaxis_Model.pptx
@@ -5,7 +5,7 @@
     <p:sldMasterId id="2147483648" r:id="rId1"/>
   </p:sldMasterIdLst>
   <p:notesMasterIdLst>
-    <p:notesMasterId r:id="rId9"/>
+    <p:notesMasterId r:id="rId10"/>
   </p:notesMasterIdLst>
   <p:sldIdLst>
     <p:sldId id="256" r:id="rId2"/>
@@ -13,8 +13,9 @@
     <p:sldId id="261" r:id="rId4"/>
     <p:sldId id="262" r:id="rId5"/>
     <p:sldId id="263" r:id="rId6"/>
-    <p:sldId id="258" r:id="rId7"/>
-    <p:sldId id="259" r:id="rId8"/>
+    <p:sldId id="264" r:id="rId7"/>
+    <p:sldId id="258" r:id="rId8"/>
+    <p:sldId id="259" r:id="rId9"/>
   </p:sldIdLst>
   <p:sldSz cx="12192000" cy="6858000"/>
   <p:notesSz cx="6858000" cy="9144000"/>
@@ -203,7 +204,7 @@
           <a:p>
             <a:fld id="{EEE6165F-F878-B74C-A9CB-1D93544D2133}" type="datetimeFigureOut">
               <a:rPr lang="en-CH" smtClean="0"/>
-              <a:t>29.06.22</a:t>
+              <a:t>05.07.22</a:t>
             </a:fld>
             <a:endParaRPr lang="en-CH"/>
           </a:p>
@@ -887,6 +888,110 @@
 </p:notes>
 </file>
 
+<file path=ppt/notesSlides/notesSlide5.xml><?xml version="1.0" encoding="utf-8"?>
+<p:notes xmlns:a="http://schemas.openxmlformats.org/drawingml/2006/main" xmlns:r="http://schemas.openxmlformats.org/officeDocument/2006/relationships" xmlns:p="http://schemas.openxmlformats.org/presentationml/2006/main">
+  <p:cSld>
+    <p:spTree>
+      <p:nvGrpSpPr>
+        <p:cNvPr id="1" name=""/>
+        <p:cNvGrpSpPr/>
+        <p:nvPr/>
+      </p:nvGrpSpPr>
+      <p:grpSpPr>
+        <a:xfrm>
+          <a:off x="0" y="0"/>
+          <a:ext cx="0" cy="0"/>
+          <a:chOff x="0" y="0"/>
+          <a:chExt cx="0" cy="0"/>
+        </a:xfrm>
+      </p:grpSpPr>
+      <p:sp>
+        <p:nvSpPr>
+          <p:cNvPr id="2" name="Slide Image Placeholder 1"/>
+          <p:cNvSpPr>
+            <a:spLocks noGrp="1" noRot="1" noChangeAspect="1"/>
+          </p:cNvSpPr>
+          <p:nvPr>
+            <p:ph type="sldImg"/>
+          </p:nvPr>
+        </p:nvSpPr>
+        <p:spPr/>
+      </p:sp>
+      <p:sp>
+        <p:nvSpPr>
+          <p:cNvPr id="3" name="Notes Placeholder 2"/>
+          <p:cNvSpPr>
+            <a:spLocks noGrp="1"/>
+          </p:cNvSpPr>
+          <p:nvPr>
+            <p:ph type="body" idx="1"/>
+          </p:nvPr>
+        </p:nvSpPr>
+        <p:spPr/>
+        <p:txBody>
+          <a:bodyPr/>
+          <a:lstStyle/>
+          <a:p>
+            <a:r>
+              <a:rPr lang="en-CH" dirty="0"/>
+              <a:t>Things to consider</a:t>
+            </a:r>
+          </a:p>
+          <a:p>
+            <a:pPr marL="171450" indent="-171450">
+              <a:buFont typeface="Arial" panose="020B0604020202020204" pitchFamily="34" charset="0"/>
+              <a:buChar char="•"/>
+            </a:pPr>
+            <a:r>
+              <a:rPr lang="en-CH" dirty="0"/>
+              <a:t>Differential recovery rates for those who are colonised or clinically infected</a:t>
+            </a:r>
+          </a:p>
+          <a:p>
+            <a:pPr marL="171450" indent="-171450">
+              <a:buFont typeface="Arial" panose="020B0604020202020204" pitchFamily="34" charset="0"/>
+              <a:buChar char="•"/>
+            </a:pPr>
+            <a:endParaRPr lang="en-CH" dirty="0"/>
+          </a:p>
+        </p:txBody>
+      </p:sp>
+      <p:sp>
+        <p:nvSpPr>
+          <p:cNvPr id="4" name="Slide Number Placeholder 3"/>
+          <p:cNvSpPr>
+            <a:spLocks noGrp="1"/>
+          </p:cNvSpPr>
+          <p:nvPr>
+            <p:ph type="sldNum" sz="quarter" idx="5"/>
+          </p:nvPr>
+        </p:nvSpPr>
+        <p:spPr/>
+        <p:txBody>
+          <a:bodyPr/>
+          <a:lstStyle/>
+          <a:p>
+            <a:fld id="{6BC073EA-12D6-9A48-90AF-A5442583D523}" type="slidenum">
+              <a:rPr lang="en-CH" smtClean="0"/>
+              <a:t>6</a:t>
+            </a:fld>
+            <a:endParaRPr lang="en-CH"/>
+          </a:p>
+        </p:txBody>
+      </p:sp>
+    </p:spTree>
+    <p:extLst>
+      <p:ext uri="{BB962C8B-B14F-4D97-AF65-F5344CB8AC3E}">
+        <p14:creationId xmlns:p14="http://schemas.microsoft.com/office/powerpoint/2010/main" val="3216529164"/>
+      </p:ext>
+    </p:extLst>
+  </p:cSld>
+  <p:clrMapOvr>
+    <a:masterClrMapping/>
+  </p:clrMapOvr>
+</p:notes>
+</file>
+
 <file path=ppt/slideLayouts/slideLayout1.xml><?xml version="1.0" encoding="utf-8"?>
 <p:sldLayout xmlns:a="http://schemas.openxmlformats.org/drawingml/2006/main" xmlns:r="http://schemas.openxmlformats.org/officeDocument/2006/relationships" xmlns:p="http://schemas.openxmlformats.org/presentationml/2006/main" type="title" preserve="1">
   <p:cSld name="Title Slide">
@@ -1036,7 +1141,7 @@
           <a:p>
             <a:fld id="{6B0AB520-85C3-3F4A-BBF1-568BB9EDF9C7}" type="datetimeFigureOut">
               <a:rPr lang="en-CH" smtClean="0"/>
-              <a:t>29.06.22</a:t>
+              <a:t>05.07.22</a:t>
             </a:fld>
             <a:endParaRPr lang="en-CH"/>
           </a:p>
@@ -1236,7 +1341,7 @@
           <a:p>
             <a:fld id="{6B0AB520-85C3-3F4A-BBF1-568BB9EDF9C7}" type="datetimeFigureOut">
               <a:rPr lang="en-CH" smtClean="0"/>
-              <a:t>29.06.22</a:t>
+              <a:t>05.07.22</a:t>
             </a:fld>
             <a:endParaRPr lang="en-CH"/>
           </a:p>
@@ -1446,7 +1551,7 @@
           <a:p>
             <a:fld id="{6B0AB520-85C3-3F4A-BBF1-568BB9EDF9C7}" type="datetimeFigureOut">
               <a:rPr lang="en-CH" smtClean="0"/>
-              <a:t>29.06.22</a:t>
+              <a:t>05.07.22</a:t>
             </a:fld>
             <a:endParaRPr lang="en-CH"/>
           </a:p>
@@ -1646,7 +1751,7 @@
           <a:p>
             <a:fld id="{6B0AB520-85C3-3F4A-BBF1-568BB9EDF9C7}" type="datetimeFigureOut">
               <a:rPr lang="en-CH" smtClean="0"/>
-              <a:t>29.06.22</a:t>
+              <a:t>05.07.22</a:t>
             </a:fld>
             <a:endParaRPr lang="en-CH"/>
           </a:p>
@@ -1922,7 +2027,7 @@
           <a:p>
             <a:fld id="{6B0AB520-85C3-3F4A-BBF1-568BB9EDF9C7}" type="datetimeFigureOut">
               <a:rPr lang="en-CH" smtClean="0"/>
-              <a:t>29.06.22</a:t>
+              <a:t>05.07.22</a:t>
             </a:fld>
             <a:endParaRPr lang="en-CH"/>
           </a:p>
@@ -2190,7 +2295,7 @@
           <a:p>
             <a:fld id="{6B0AB520-85C3-3F4A-BBF1-568BB9EDF9C7}" type="datetimeFigureOut">
               <a:rPr lang="en-CH" smtClean="0"/>
-              <a:t>29.06.22</a:t>
+              <a:t>05.07.22</a:t>
             </a:fld>
             <a:endParaRPr lang="en-CH"/>
           </a:p>
@@ -2605,7 +2710,7 @@
           <a:p>
             <a:fld id="{6B0AB520-85C3-3F4A-BBF1-568BB9EDF9C7}" type="datetimeFigureOut">
               <a:rPr lang="en-CH" smtClean="0"/>
-              <a:t>29.06.22</a:t>
+              <a:t>05.07.22</a:t>
             </a:fld>
             <a:endParaRPr lang="en-CH"/>
           </a:p>
@@ -2747,7 +2852,7 @@
           <a:p>
             <a:fld id="{6B0AB520-85C3-3F4A-BBF1-568BB9EDF9C7}" type="datetimeFigureOut">
               <a:rPr lang="en-CH" smtClean="0"/>
-              <a:t>29.06.22</a:t>
+              <a:t>05.07.22</a:t>
             </a:fld>
             <a:endParaRPr lang="en-CH"/>
           </a:p>
@@ -2860,7 +2965,7 @@
           <a:p>
             <a:fld id="{6B0AB520-85C3-3F4A-BBF1-568BB9EDF9C7}" type="datetimeFigureOut">
               <a:rPr lang="en-CH" smtClean="0"/>
-              <a:t>29.06.22</a:t>
+              <a:t>05.07.22</a:t>
             </a:fld>
             <a:endParaRPr lang="en-CH"/>
           </a:p>
@@ -3173,7 +3278,7 @@
           <a:p>
             <a:fld id="{6B0AB520-85C3-3F4A-BBF1-568BB9EDF9C7}" type="datetimeFigureOut">
               <a:rPr lang="en-CH" smtClean="0"/>
-              <a:t>29.06.22</a:t>
+              <a:t>05.07.22</a:t>
             </a:fld>
             <a:endParaRPr lang="en-CH"/>
           </a:p>
@@ -3462,7 +3567,7 @@
           <a:p>
             <a:fld id="{6B0AB520-85C3-3F4A-BBF1-568BB9EDF9C7}" type="datetimeFigureOut">
               <a:rPr lang="en-CH" smtClean="0"/>
-              <a:t>29.06.22</a:t>
+              <a:t>05.07.22</a:t>
             </a:fld>
             <a:endParaRPr lang="en-CH"/>
           </a:p>
@@ -3705,7 +3810,7 @@
           <a:p>
             <a:fld id="{6B0AB520-85C3-3F4A-BBF1-568BB9EDF9C7}" type="datetimeFigureOut">
               <a:rPr lang="en-CH" smtClean="0"/>
-              <a:t>29.06.22</a:t>
+              <a:t>05.07.22</a:t>
             </a:fld>
             <a:endParaRPr lang="en-CH"/>
           </a:p>
@@ -13407,7 +13512,7 @@
         <p:spPr>
           <a:xfrm>
             <a:off x="4674221" y="1334076"/>
-            <a:ext cx="1136850" cy="307777"/>
+            <a:ext cx="1143262" cy="307777"/>
           </a:xfrm>
           <a:prstGeom prst="rect">
             <a:avLst/>
@@ -13456,12 +13561,13 @@
               <a:t>(1-</a:t>
             </a:r>
             <a:r>
-              <a:rPr lang="el-GR" sz="1400" dirty="0">
-                <a:solidFill>
-                  <a:schemeClr val="accent4"/>
-                </a:solidFill>
-              </a:rPr>
-              <a:t>ρ</a:t>
+              <a:rPr lang="en-GB" sz="1400" b="1" dirty="0">
+                <a:solidFill>
+                  <a:srgbClr val="FFC000"/>
+                </a:solidFill>
+                <a:sym typeface="Symbol" pitchFamily="2" charset="2"/>
+              </a:rPr>
+              <a:t></a:t>
             </a:r>
             <a:r>
               <a:rPr lang="de-CH" sz="1400" dirty="0">
@@ -13593,7 +13699,7 @@
         <p:spPr>
           <a:xfrm>
             <a:off x="5513353" y="1860233"/>
-            <a:ext cx="282450" cy="307777"/>
+            <a:ext cx="1034257" cy="307777"/>
           </a:xfrm>
           <a:prstGeom prst="rect">
             <a:avLst/>
@@ -13613,7 +13719,43 @@
                 </a:solidFill>
                 <a:sym typeface="Symbol" pitchFamily="2" charset="2"/>
               </a:rPr>
-              <a:t></a:t>
+              <a:t>*(1-R</a:t>
+            </a:r>
+            <a:r>
+              <a:rPr lang="en-GB" sz="1400" baseline="-25000" dirty="0">
+                <a:solidFill>
+                  <a:schemeClr val="accent2"/>
+                </a:solidFill>
+                <a:sym typeface="Symbol" pitchFamily="2" charset="2"/>
+              </a:rPr>
+              <a:t>1</a:t>
+            </a:r>
+            <a:r>
+              <a:rPr lang="en-GB" sz="1400" dirty="0">
+                <a:solidFill>
+                  <a:schemeClr val="accent2"/>
+                </a:solidFill>
+                <a:sym typeface="Symbol" pitchFamily="2" charset="2"/>
+              </a:rPr>
+              <a:t>+R</a:t>
+            </a:r>
+            <a:r>
+              <a:rPr lang="en-GB" sz="1400" baseline="-25000" dirty="0">
+                <a:solidFill>
+                  <a:schemeClr val="accent2"/>
+                </a:solidFill>
+                <a:sym typeface="Symbol" pitchFamily="2" charset="2"/>
+              </a:rPr>
+              <a:t>2</a:t>
+            </a:r>
+            <a:r>
+              <a:rPr lang="en-GB" sz="1400" dirty="0">
+                <a:solidFill>
+                  <a:schemeClr val="accent2"/>
+                </a:solidFill>
+                <a:sym typeface="Symbol" pitchFamily="2" charset="2"/>
+              </a:rPr>
+              <a:t>)</a:t>
             </a:r>
             <a:endParaRPr lang="en-CH" sz="1100" dirty="0">
               <a:solidFill>
@@ -13875,7 +14017,7 @@
         <p:spPr>
           <a:xfrm>
             <a:off x="5477463" y="3339065"/>
-            <a:ext cx="1758815" cy="307777"/>
+            <a:ext cx="1755609" cy="307777"/>
           </a:xfrm>
           <a:prstGeom prst="rect">
             <a:avLst/>
@@ -13897,12 +14039,13 @@
               <a:t>Pr*</a:t>
             </a:r>
             <a:r>
-              <a:rPr lang="el-GR" sz="1400" dirty="0">
-                <a:solidFill>
-                  <a:schemeClr val="accent4"/>
-                </a:solidFill>
-              </a:rPr>
-              <a:t>ρ</a:t>
+              <a:rPr lang="en-GB" sz="1400" b="1" dirty="0">
+                <a:solidFill>
+                  <a:srgbClr val="FFC000"/>
+                </a:solidFill>
+                <a:sym typeface="Symbol" pitchFamily="2" charset="2"/>
+              </a:rPr>
+              <a:t></a:t>
             </a:r>
             <a:r>
               <a:rPr lang="en-GB" sz="1400" dirty="0">
@@ -14017,7 +14160,7 @@
         <p:spPr>
           <a:xfrm>
             <a:off x="4560469" y="4914858"/>
-            <a:ext cx="1136850" cy="307777"/>
+            <a:ext cx="1143262" cy="307777"/>
           </a:xfrm>
           <a:prstGeom prst="rect">
             <a:avLst/>
@@ -14066,12 +14209,13 @@
               <a:t>(1-</a:t>
             </a:r>
             <a:r>
-              <a:rPr lang="el-GR" sz="1400" dirty="0">
-                <a:solidFill>
-                  <a:schemeClr val="accent4"/>
-                </a:solidFill>
-              </a:rPr>
-              <a:t>ρ</a:t>
+              <a:rPr lang="en-GB" sz="1400" b="1" dirty="0">
+                <a:solidFill>
+                  <a:srgbClr val="FFC000"/>
+                </a:solidFill>
+                <a:sym typeface="Symbol" pitchFamily="2" charset="2"/>
+              </a:rPr>
+              <a:t></a:t>
             </a:r>
             <a:r>
               <a:rPr lang="de-CH" sz="1400" dirty="0">
@@ -14122,7 +14266,7 @@
         <p:spPr>
           <a:xfrm>
             <a:off x="7137063" y="4473759"/>
-            <a:ext cx="851515" cy="307777"/>
+            <a:ext cx="848309" cy="307777"/>
           </a:xfrm>
           <a:prstGeom prst="rect">
             <a:avLst/>
@@ -14162,12 +14306,13 @@
               <a:t>1</a:t>
             </a:r>
             <a:r>
-              <a:rPr lang="el-GR" sz="1400" dirty="0">
-                <a:solidFill>
-                  <a:schemeClr val="accent4"/>
-                </a:solidFill>
-              </a:rPr>
-              <a:t>ρ</a:t>
+              <a:rPr lang="en-GB" sz="1400" b="1" dirty="0">
+                <a:solidFill>
+                  <a:srgbClr val="FFC000"/>
+                </a:solidFill>
+                <a:sym typeface="Symbol" pitchFamily="2" charset="2"/>
+              </a:rPr>
+              <a:t></a:t>
             </a:r>
             <a:r>
               <a:rPr lang="en-GB" sz="1400" dirty="0">
@@ -14210,7 +14355,7 @@
         <p:spPr>
           <a:xfrm>
             <a:off x="7378465" y="2442558"/>
-            <a:ext cx="851515" cy="307777"/>
+            <a:ext cx="888385" cy="307777"/>
           </a:xfrm>
           <a:prstGeom prst="rect">
             <a:avLst/>
@@ -14250,12 +14395,22 @@
               <a:t>2</a:t>
             </a:r>
             <a:r>
-              <a:rPr lang="el-GR" sz="1400" dirty="0">
-                <a:solidFill>
-                  <a:schemeClr val="accent4"/>
-                </a:solidFill>
-              </a:rPr>
-              <a:t>ρ</a:t>
+              <a:rPr lang="en-GB" sz="1400" b="1" dirty="0">
+                <a:solidFill>
+                  <a:srgbClr val="FFC000"/>
+                </a:solidFill>
+                <a:sym typeface="Symbol" pitchFamily="2" charset="2"/>
+              </a:rPr>
+              <a:t></a:t>
+            </a:r>
+            <a:r>
+              <a:rPr lang="en-GB" sz="1400" b="1" dirty="0">
+                <a:solidFill>
+                  <a:srgbClr val="FF0000"/>
+                </a:solidFill>
+                <a:sym typeface="Symbol" pitchFamily="2" charset="2"/>
+              </a:rPr>
+              <a:t> </a:t>
             </a:r>
             <a:r>
               <a:rPr lang="en-GB" sz="1400" dirty="0">
@@ -14901,51 +15056,6 @@
             <a:endParaRPr lang="en-CH" sz="1400" dirty="0">
               <a:solidFill>
                 <a:srgbClr val="0070C0"/>
-              </a:solidFill>
-            </a:endParaRPr>
-          </a:p>
-        </p:txBody>
-      </p:sp>
-      <p:sp>
-        <p:nvSpPr>
-          <p:cNvPr id="91" name="TextBox 90">
-            <a:extLst>
-              <a:ext uri="{FF2B5EF4-FFF2-40B4-BE49-F238E27FC236}">
-                <a16:creationId xmlns:a16="http://schemas.microsoft.com/office/drawing/2014/main" id="{645C342F-CCB9-1596-864B-FD5A3CA27982}"/>
-              </a:ext>
-            </a:extLst>
-          </p:cNvPr>
-          <p:cNvSpPr txBox="1"/>
-          <p:nvPr/>
-        </p:nvSpPr>
-        <p:spPr>
-          <a:xfrm>
-            <a:off x="5479072" y="4473759"/>
-            <a:ext cx="282450" cy="307777"/>
-          </a:xfrm>
-          <a:prstGeom prst="rect">
-            <a:avLst/>
-          </a:prstGeom>
-          <a:noFill/>
-        </p:spPr>
-        <p:txBody>
-          <a:bodyPr wrap="none" rtlCol="0">
-            <a:spAutoFit/>
-          </a:bodyPr>
-          <a:lstStyle/>
-          <a:p>
-            <a:r>
-              <a:rPr lang="en-GB" sz="1400" dirty="0">
-                <a:solidFill>
-                  <a:schemeClr val="accent2"/>
-                </a:solidFill>
-                <a:sym typeface="Symbol" pitchFamily="2" charset="2"/>
-              </a:rPr>
-              <a:t></a:t>
-            </a:r>
-            <a:endParaRPr lang="en-CH" sz="1100" dirty="0">
-              <a:solidFill>
-                <a:schemeClr val="accent2"/>
               </a:solidFill>
             </a:endParaRPr>
           </a:p>
@@ -15181,101 +15291,6 @@
           </a:p>
         </p:txBody>
       </p:sp>
-      <p:sp>
-        <p:nvSpPr>
-          <p:cNvPr id="65" name="TextBox 64">
-            <a:extLst>
-              <a:ext uri="{FF2B5EF4-FFF2-40B4-BE49-F238E27FC236}">
-                <a16:creationId xmlns:a16="http://schemas.microsoft.com/office/drawing/2014/main" id="{8255D1BF-DE0F-CD56-B296-C9093A9AB00C}"/>
-              </a:ext>
-            </a:extLst>
-          </p:cNvPr>
-          <p:cNvSpPr txBox="1"/>
-          <p:nvPr/>
-        </p:nvSpPr>
-        <p:spPr>
-          <a:xfrm>
-            <a:off x="4393537" y="5167425"/>
-            <a:ext cx="1285929" cy="307777"/>
-          </a:xfrm>
-          <a:prstGeom prst="rect">
-            <a:avLst/>
-          </a:prstGeom>
-          <a:noFill/>
-        </p:spPr>
-        <p:txBody>
-          <a:bodyPr wrap="none" rtlCol="0">
-            <a:spAutoFit/>
-          </a:bodyPr>
-          <a:lstStyle/>
-          <a:p>
-            <a:r>
-              <a:rPr lang="en-CH" sz="1400" dirty="0">
-                <a:solidFill>
-                  <a:schemeClr val="accent4"/>
-                </a:solidFill>
-              </a:rPr>
-              <a:t>Pr*R</a:t>
-            </a:r>
-            <a:r>
-              <a:rPr lang="en-CH" sz="1400" baseline="-25000" dirty="0">
-                <a:solidFill>
-                  <a:schemeClr val="accent4"/>
-                </a:solidFill>
-              </a:rPr>
-              <a:t>2</a:t>
-            </a:r>
-            <a:r>
-              <a:rPr lang="en-GB" sz="1400" dirty="0">
-                <a:solidFill>
-                  <a:schemeClr val="accent4"/>
-                </a:solidFill>
-                <a:sym typeface="Symbol" pitchFamily="2" charset="2"/>
-              </a:rPr>
-              <a:t>*(1-</a:t>
-            </a:r>
-            <a:r>
-              <a:rPr lang="el-GR" sz="1400" dirty="0">
-                <a:solidFill>
-                  <a:schemeClr val="accent4"/>
-                </a:solidFill>
-              </a:rPr>
-              <a:t>ρ</a:t>
-            </a:r>
-            <a:r>
-              <a:rPr lang="de-CH" sz="1400" dirty="0">
-                <a:solidFill>
-                  <a:schemeClr val="accent4"/>
-                </a:solidFill>
-              </a:rPr>
-              <a:t>)*</a:t>
-            </a:r>
-            <a:r>
-              <a:rPr lang="en-GB" sz="1400" dirty="0">
-                <a:solidFill>
-                  <a:schemeClr val="accent4"/>
-                </a:solidFill>
-                <a:sym typeface="Symbol" pitchFamily="2" charset="2"/>
-              </a:rPr>
-              <a:t></a:t>
-            </a:r>
-            <a:r>
-              <a:rPr lang="en-CH" sz="1400" baseline="-25000" dirty="0">
-                <a:solidFill>
-                  <a:schemeClr val="accent4"/>
-                </a:solidFill>
-                <a:sym typeface="Symbol" pitchFamily="2" charset="2"/>
-              </a:rPr>
-              <a:t>2</a:t>
-            </a:r>
-            <a:endParaRPr lang="en-CH" sz="1400" baseline="-25000" dirty="0">
-              <a:solidFill>
-                <a:schemeClr val="accent4"/>
-              </a:solidFill>
-            </a:endParaRPr>
-          </a:p>
-        </p:txBody>
-      </p:sp>
       <p:cxnSp>
         <p:nvCxnSpPr>
           <p:cNvPr id="67" name="Straight Arrow Connector 66">
@@ -15458,6 +15473,87 @@
             <a:endParaRPr lang="en-CH" sz="1400" baseline="-25000" dirty="0">
               <a:solidFill>
                 <a:schemeClr val="accent4"/>
+              </a:solidFill>
+            </a:endParaRPr>
+          </a:p>
+        </p:txBody>
+      </p:sp>
+      <p:sp>
+        <p:nvSpPr>
+          <p:cNvPr id="69" name="TextBox 68">
+            <a:extLst>
+              <a:ext uri="{FF2B5EF4-FFF2-40B4-BE49-F238E27FC236}">
+                <a16:creationId xmlns:a16="http://schemas.microsoft.com/office/drawing/2014/main" id="{DA11813E-C2A0-1789-F840-C0A5B04E4CF9}"/>
+              </a:ext>
+            </a:extLst>
+          </p:cNvPr>
+          <p:cNvSpPr txBox="1"/>
+          <p:nvPr/>
+        </p:nvSpPr>
+        <p:spPr>
+          <a:xfrm>
+            <a:off x="5470935" y="4559935"/>
+            <a:ext cx="1034257" cy="307777"/>
+          </a:xfrm>
+          <a:prstGeom prst="rect">
+            <a:avLst/>
+          </a:prstGeom>
+          <a:noFill/>
+        </p:spPr>
+        <p:txBody>
+          <a:bodyPr wrap="none" rtlCol="0">
+            <a:spAutoFit/>
+          </a:bodyPr>
+          <a:lstStyle/>
+          <a:p>
+            <a:r>
+              <a:rPr lang="en-GB" sz="1400" dirty="0">
+                <a:solidFill>
+                  <a:schemeClr val="accent2"/>
+                </a:solidFill>
+                <a:sym typeface="Symbol" pitchFamily="2" charset="2"/>
+              </a:rPr>
+              <a:t>*(1-R</a:t>
+            </a:r>
+            <a:r>
+              <a:rPr lang="en-GB" sz="1400" baseline="-25000" dirty="0">
+                <a:solidFill>
+                  <a:schemeClr val="accent2"/>
+                </a:solidFill>
+                <a:sym typeface="Symbol" pitchFamily="2" charset="2"/>
+              </a:rPr>
+              <a:t>1</a:t>
+            </a:r>
+            <a:r>
+              <a:rPr lang="en-GB" sz="1400" dirty="0">
+                <a:solidFill>
+                  <a:schemeClr val="accent2"/>
+                </a:solidFill>
+                <a:sym typeface="Symbol" pitchFamily="2" charset="2"/>
+              </a:rPr>
+              <a:t>+R</a:t>
+            </a:r>
+            <a:r>
+              <a:rPr lang="en-GB" sz="1400" baseline="-25000" dirty="0">
+                <a:solidFill>
+                  <a:schemeClr val="accent2"/>
+                </a:solidFill>
+                <a:sym typeface="Symbol" pitchFamily="2" charset="2"/>
+              </a:rPr>
+              <a:t>2</a:t>
+            </a:r>
+            <a:r>
+              <a:rPr lang="en-GB" sz="1400" dirty="0">
+                <a:solidFill>
+                  <a:schemeClr val="accent2"/>
+                </a:solidFill>
+                <a:sym typeface="Symbol" pitchFamily="2" charset="2"/>
+              </a:rPr>
+              <a:t>)</a:t>
+            </a:r>
+            <a:endParaRPr lang="en-CH" sz="1100" dirty="0">
+              <a:solidFill>
+                <a:schemeClr val="accent2"/>
               </a:solidFill>
             </a:endParaRPr>
           </a:p>
@@ -15507,8 +15603,8 @@
         </p:nvSpPr>
         <p:spPr>
           <a:xfrm>
-            <a:off x="865986" y="541575"/>
-            <a:ext cx="10796631" cy="5679347"/>
+            <a:off x="798022" y="541575"/>
+            <a:ext cx="10864595" cy="5684658"/>
           </a:xfrm>
           <a:prstGeom prst="rect">
             <a:avLst/>
@@ -15561,8 +15657,8 @@
         </p:nvSpPr>
         <p:spPr>
           <a:xfrm>
-            <a:off x="4398875" y="2897731"/>
-            <a:ext cx="914400" cy="914400"/>
+            <a:off x="4393119" y="2897730"/>
+            <a:ext cx="920156" cy="915255"/>
           </a:xfrm>
           <a:prstGeom prst="rect">
             <a:avLst/>
@@ -15610,8 +15706,8 @@
         </p:nvSpPr>
         <p:spPr>
           <a:xfrm>
-            <a:off x="1476495" y="774189"/>
-            <a:ext cx="914400" cy="914400"/>
+            <a:off x="1470739" y="774188"/>
+            <a:ext cx="920156" cy="915255"/>
           </a:xfrm>
           <a:prstGeom prst="rect">
             <a:avLst/>
@@ -15663,8 +15759,8 @@
         </p:nvSpPr>
         <p:spPr>
           <a:xfrm>
-            <a:off x="1476495" y="5001634"/>
-            <a:ext cx="914400" cy="914400"/>
+            <a:off x="1470739" y="5001633"/>
+            <a:ext cx="920156" cy="915255"/>
           </a:xfrm>
           <a:prstGeom prst="rect">
             <a:avLst/>
@@ -15716,8 +15812,8 @@
         </p:nvSpPr>
         <p:spPr>
           <a:xfrm>
-            <a:off x="7484189" y="2897731"/>
-            <a:ext cx="914400" cy="914400"/>
+            <a:off x="7478433" y="2897730"/>
+            <a:ext cx="920156" cy="915255"/>
           </a:xfrm>
           <a:prstGeom prst="rect">
             <a:avLst/>
@@ -15765,8 +15861,8 @@
         </p:nvSpPr>
         <p:spPr>
           <a:xfrm>
-            <a:off x="5963414" y="804810"/>
-            <a:ext cx="914400" cy="914400"/>
+            <a:off x="5957658" y="804809"/>
+            <a:ext cx="920156" cy="915255"/>
           </a:xfrm>
           <a:prstGeom prst="rect">
             <a:avLst/>
@@ -15818,8 +15914,8 @@
         </p:nvSpPr>
         <p:spPr>
           <a:xfrm>
-            <a:off x="5853556" y="4882709"/>
-            <a:ext cx="914400" cy="914400"/>
+            <a:off x="5847800" y="4882708"/>
+            <a:ext cx="920156" cy="915255"/>
           </a:xfrm>
           <a:prstGeom prst="rect">
             <a:avLst/>
@@ -15873,8 +15969,8 @@
         </p:nvCxnSpPr>
         <p:spPr>
           <a:xfrm>
-            <a:off x="5375420" y="3354931"/>
-            <a:ext cx="1955707" cy="0"/>
+            <a:off x="5363109" y="3354931"/>
+            <a:ext cx="1968018" cy="0"/>
           </a:xfrm>
           <a:prstGeom prst="straightConnector1">
             <a:avLst/>
@@ -15918,8 +16014,8 @@
         </p:nvCxnSpPr>
         <p:spPr>
           <a:xfrm>
-            <a:off x="5394287" y="3472577"/>
-            <a:ext cx="1936840" cy="0"/>
+            <a:off x="5382095" y="3472577"/>
+            <a:ext cx="1949032" cy="0"/>
           </a:xfrm>
           <a:prstGeom prst="straightConnector1">
             <a:avLst/>
@@ -16363,8 +16459,8 @@
         </p:nvSpPr>
         <p:spPr>
           <a:xfrm>
-            <a:off x="9274508" y="802446"/>
-            <a:ext cx="914400" cy="914400"/>
+            <a:off x="9268752" y="802445"/>
+            <a:ext cx="920156" cy="915255"/>
           </a:xfrm>
           <a:prstGeom prst="rect">
             <a:avLst/>
@@ -16416,8 +16512,8 @@
         </p:nvSpPr>
         <p:spPr>
           <a:xfrm>
-            <a:off x="10491561" y="2897731"/>
-            <a:ext cx="914400" cy="914400"/>
+            <a:off x="10485805" y="2897730"/>
+            <a:ext cx="920156" cy="915255"/>
           </a:xfrm>
           <a:prstGeom prst="rect">
             <a:avLst/>
@@ -16465,8 +16561,8 @@
         </p:nvSpPr>
         <p:spPr>
           <a:xfrm>
-            <a:off x="9276855" y="4910259"/>
-            <a:ext cx="914400" cy="914400"/>
+            <a:off x="9271099" y="4910258"/>
+            <a:ext cx="920156" cy="915255"/>
           </a:xfrm>
           <a:prstGeom prst="rect">
             <a:avLst/>
@@ -16608,8 +16704,8 @@
         </p:nvCxnSpPr>
         <p:spPr>
           <a:xfrm>
-            <a:off x="8449007" y="3459511"/>
-            <a:ext cx="1951865" cy="0"/>
+            <a:off x="8436720" y="3459511"/>
+            <a:ext cx="1964152" cy="0"/>
           </a:xfrm>
           <a:prstGeom prst="straightConnector1">
             <a:avLst/>
@@ -16651,9 +16747,9 @@
           <p:nvPr/>
         </p:nvCxnSpPr>
         <p:spPr>
-          <a:xfrm flipH="1">
-            <a:off x="8471547" y="3345111"/>
-            <a:ext cx="1929325" cy="0"/>
+          <a:xfrm>
+            <a:off x="8459402" y="3345111"/>
+            <a:ext cx="12145" cy="0"/>
           </a:xfrm>
           <a:prstGeom prst="straightConnector1">
             <a:avLst/>
@@ -16784,8 +16880,8 @@
         </p:nvSpPr>
         <p:spPr>
           <a:xfrm>
-            <a:off x="3409867" y="5167426"/>
-            <a:ext cx="277640" cy="307777"/>
+            <a:off x="3408119" y="5167426"/>
+            <a:ext cx="279388" cy="308065"/>
           </a:xfrm>
           <a:prstGeom prst="rect">
             <a:avLst/>
@@ -16793,7 +16889,7 @@
           <a:noFill/>
         </p:spPr>
         <p:txBody>
-          <a:bodyPr wrap="none" rtlCol="0">
+          <a:bodyPr wrap="square" rtlCol="0">
             <a:spAutoFit/>
           </a:bodyPr>
           <a:lstStyle/>
@@ -16829,8 +16925,8 @@
         </p:nvSpPr>
         <p:spPr>
           <a:xfrm>
-            <a:off x="7209161" y="4815831"/>
-            <a:ext cx="1431033" cy="307777"/>
+            <a:off x="7200153" y="4815831"/>
+            <a:ext cx="1440041" cy="308065"/>
           </a:xfrm>
           <a:prstGeom prst="rect">
             <a:avLst/>
@@ -16838,7 +16934,7 @@
           <a:noFill/>
         </p:spPr>
         <p:txBody>
-          <a:bodyPr wrap="none" rtlCol="0">
+          <a:bodyPr wrap="square" rtlCol="0">
             <a:spAutoFit/>
           </a:bodyPr>
           <a:lstStyle/>
@@ -16925,8 +17021,8 @@
         </p:nvSpPr>
         <p:spPr>
           <a:xfrm>
-            <a:off x="5859236" y="3087611"/>
-            <a:ext cx="1158843" cy="307777"/>
+            <a:off x="5851942" y="3087611"/>
+            <a:ext cx="1166138" cy="308065"/>
           </a:xfrm>
           <a:prstGeom prst="rect">
             <a:avLst/>
@@ -16934,7 +17030,7 @@
           <a:noFill/>
         </p:spPr>
         <p:txBody>
-          <a:bodyPr wrap="none" rtlCol="0">
+          <a:bodyPr wrap="square" rtlCol="0">
             <a:spAutoFit/>
           </a:bodyPr>
           <a:lstStyle/>
@@ -16994,8 +17090,8 @@
         </p:nvSpPr>
         <p:spPr>
           <a:xfrm>
-            <a:off x="7517525" y="2175235"/>
-            <a:ext cx="1390958" cy="307777"/>
+            <a:off x="7508769" y="2175235"/>
+            <a:ext cx="1399714" cy="308065"/>
           </a:xfrm>
           <a:prstGeom prst="rect">
             <a:avLst/>
@@ -17003,7 +17099,7 @@
           <a:noFill/>
         </p:spPr>
         <p:txBody>
-          <a:bodyPr wrap="none" rtlCol="0">
+          <a:bodyPr wrap="square" rtlCol="0">
             <a:spAutoFit/>
           </a:bodyPr>
           <a:lstStyle/>
@@ -17095,8 +17191,8 @@
         </p:nvSpPr>
         <p:spPr>
           <a:xfrm>
-            <a:off x="7837268" y="1773516"/>
-            <a:ext cx="1645835" cy="307777"/>
+            <a:off x="7826908" y="1773516"/>
+            <a:ext cx="1656195" cy="308065"/>
           </a:xfrm>
           <a:prstGeom prst="rect">
             <a:avLst/>
@@ -17104,7 +17200,7 @@
           <a:noFill/>
         </p:spPr>
         <p:txBody>
-          <a:bodyPr wrap="none" rtlCol="0">
+          <a:bodyPr wrap="square" rtlCol="0">
             <a:spAutoFit/>
           </a:bodyPr>
           <a:lstStyle/>
@@ -17196,8 +17292,8 @@
         </p:nvSpPr>
         <p:spPr>
           <a:xfrm>
-            <a:off x="7673123" y="4340805"/>
-            <a:ext cx="1645835" cy="307777"/>
+            <a:off x="7662763" y="4340805"/>
+            <a:ext cx="1656195" cy="308065"/>
           </a:xfrm>
           <a:prstGeom prst="rect">
             <a:avLst/>
@@ -17205,7 +17301,7 @@
           <a:noFill/>
         </p:spPr>
         <p:txBody>
-          <a:bodyPr wrap="none" rtlCol="0">
+          <a:bodyPr wrap="square" rtlCol="0">
             <a:spAutoFit/>
           </a:bodyPr>
           <a:lstStyle/>
@@ -17297,8 +17393,8 @@
         </p:nvSpPr>
         <p:spPr>
           <a:xfrm>
-            <a:off x="8930868" y="3462122"/>
-            <a:ext cx="1453796" cy="307777"/>
+            <a:off x="8921716" y="3462122"/>
+            <a:ext cx="1462948" cy="308065"/>
           </a:xfrm>
           <a:prstGeom prst="rect">
             <a:avLst/>
@@ -17306,7 +17402,7 @@
           <a:noFill/>
         </p:spPr>
         <p:txBody>
-          <a:bodyPr wrap="none" rtlCol="0">
+          <a:bodyPr wrap="square" rtlCol="0">
             <a:spAutoFit/>
           </a:bodyPr>
           <a:lstStyle/>
@@ -17505,8 +17601,8 @@
         </p:nvSpPr>
         <p:spPr>
           <a:xfrm>
-            <a:off x="3419584" y="1327258"/>
-            <a:ext cx="1031051" cy="307777"/>
+            <a:off x="3413094" y="1327258"/>
+            <a:ext cx="1037541" cy="308065"/>
           </a:xfrm>
           <a:prstGeom prst="rect">
             <a:avLst/>
@@ -17514,7 +17610,7 @@
           <a:noFill/>
         </p:spPr>
         <p:txBody>
-          <a:bodyPr wrap="none" rtlCol="0">
+          <a:bodyPr wrap="square" rtlCol="0">
             <a:spAutoFit/>
           </a:bodyPr>
           <a:lstStyle/>
@@ -17600,8 +17696,8 @@
         </p:nvSpPr>
         <p:spPr>
           <a:xfrm>
-            <a:off x="4674221" y="1334076"/>
-            <a:ext cx="1168910" cy="369332"/>
+            <a:off x="4666863" y="1334075"/>
+            <a:ext cx="1176268" cy="369677"/>
           </a:xfrm>
           <a:prstGeom prst="rect">
             <a:avLst/>
@@ -17609,7 +17705,7 @@
           <a:noFill/>
         </p:spPr>
         <p:txBody>
-          <a:bodyPr wrap="none" rtlCol="0">
+          <a:bodyPr wrap="square" rtlCol="0">
             <a:spAutoFit/>
           </a:bodyPr>
           <a:lstStyle/>
@@ -17707,8 +17803,8 @@
         </p:nvSpPr>
         <p:spPr>
           <a:xfrm>
-            <a:off x="9264587" y="2190383"/>
-            <a:ext cx="713657" cy="369332"/>
+            <a:off x="9260095" y="2190382"/>
+            <a:ext cx="718149" cy="369677"/>
           </a:xfrm>
           <a:prstGeom prst="rect">
             <a:avLst/>
@@ -17716,7 +17812,7 @@
           <a:noFill/>
         </p:spPr>
         <p:txBody>
-          <a:bodyPr wrap="none" rtlCol="0">
+          <a:bodyPr wrap="square" rtlCol="0">
             <a:spAutoFit/>
           </a:bodyPr>
           <a:lstStyle/>
@@ -17788,8 +17884,8 @@
         </p:nvSpPr>
         <p:spPr>
           <a:xfrm>
-            <a:off x="5513353" y="1860233"/>
-            <a:ext cx="282450" cy="307777"/>
+            <a:off x="5511575" y="1860233"/>
+            <a:ext cx="284228" cy="308065"/>
           </a:xfrm>
           <a:prstGeom prst="rect">
             <a:avLst/>
@@ -17797,7 +17893,7 @@
           <a:noFill/>
         </p:spPr>
         <p:txBody>
-          <a:bodyPr wrap="none" rtlCol="0">
+          <a:bodyPr wrap="square" rtlCol="0">
             <a:spAutoFit/>
           </a:bodyPr>
           <a:lstStyle/>
@@ -17835,8 +17931,8 @@
         </p:nvCxnSpPr>
         <p:spPr>
           <a:xfrm>
-            <a:off x="6969883" y="1236354"/>
-            <a:ext cx="2240962" cy="0"/>
+            <a:off x="6955776" y="1236354"/>
+            <a:ext cx="2255069" cy="0"/>
           </a:xfrm>
           <a:prstGeom prst="straightConnector1">
             <a:avLst/>
@@ -17880,8 +17976,8 @@
         </p:nvCxnSpPr>
         <p:spPr>
           <a:xfrm>
-            <a:off x="6932378" y="5458834"/>
-            <a:ext cx="2240962" cy="0"/>
+            <a:off x="6918271" y="5458834"/>
+            <a:ext cx="2255069" cy="0"/>
           </a:xfrm>
           <a:prstGeom prst="straightConnector1">
             <a:avLst/>
@@ -17925,8 +18021,8 @@
         </p:nvCxnSpPr>
         <p:spPr>
           <a:xfrm>
-            <a:off x="5369475" y="3044525"/>
-            <a:ext cx="5046196" cy="0"/>
+            <a:off x="5337710" y="3044525"/>
+            <a:ext cx="5077961" cy="0"/>
           </a:xfrm>
           <a:prstGeom prst="straightConnector1">
             <a:avLst/>
@@ -17968,8 +18064,8 @@
         </p:nvSpPr>
         <p:spPr>
           <a:xfrm>
-            <a:off x="7776726" y="863294"/>
-            <a:ext cx="444352" cy="369332"/>
+            <a:off x="7773929" y="863293"/>
+            <a:ext cx="447149" cy="369677"/>
           </a:xfrm>
           <a:prstGeom prst="rect">
             <a:avLst/>
@@ -17977,7 +18073,7 @@
           <a:noFill/>
         </p:spPr>
         <p:txBody>
-          <a:bodyPr wrap="none" rtlCol="0">
+          <a:bodyPr wrap="square" rtlCol="0">
             <a:spAutoFit/>
           </a:bodyPr>
           <a:lstStyle/>
@@ -18025,8 +18121,8 @@
         </p:nvSpPr>
         <p:spPr>
           <a:xfrm>
-            <a:off x="3330239" y="1807604"/>
-            <a:ext cx="277640" cy="307777"/>
+            <a:off x="3328491" y="1807604"/>
+            <a:ext cx="279388" cy="308065"/>
           </a:xfrm>
           <a:prstGeom prst="rect">
             <a:avLst/>
@@ -18034,7 +18130,7 @@
           <a:noFill/>
         </p:spPr>
         <p:txBody>
-          <a:bodyPr wrap="none" rtlCol="0">
+          <a:bodyPr wrap="square" rtlCol="0">
             <a:spAutoFit/>
           </a:bodyPr>
           <a:lstStyle/>
@@ -18070,8 +18166,8 @@
         </p:nvSpPr>
         <p:spPr>
           <a:xfrm>
-            <a:off x="5477463" y="3339065"/>
-            <a:ext cx="1821332" cy="369332"/>
+            <a:off x="5465998" y="3339064"/>
+            <a:ext cx="1832797" cy="369677"/>
           </a:xfrm>
           <a:prstGeom prst="rect">
             <a:avLst/>
@@ -18079,7 +18175,7 @@
           <a:noFill/>
         </p:spPr>
         <p:txBody>
-          <a:bodyPr wrap="none" rtlCol="0">
+          <a:bodyPr wrap="square" rtlCol="0">
             <a:spAutoFit/>
           </a:bodyPr>
           <a:lstStyle/>
@@ -18214,8 +18310,8 @@
         </p:nvSpPr>
         <p:spPr>
           <a:xfrm>
-            <a:off x="4560469" y="4914858"/>
-            <a:ext cx="1168910" cy="369332"/>
+            <a:off x="4553111" y="4914857"/>
+            <a:ext cx="1176268" cy="369677"/>
           </a:xfrm>
           <a:prstGeom prst="rect">
             <a:avLst/>
@@ -18223,7 +18319,7 @@
           <a:noFill/>
         </p:spPr>
         <p:txBody>
-          <a:bodyPr wrap="none" rtlCol="0">
+          <a:bodyPr wrap="square" rtlCol="0">
             <a:spAutoFit/>
           </a:bodyPr>
           <a:lstStyle/>
@@ -18317,8 +18413,8 @@
         </p:nvSpPr>
         <p:spPr>
           <a:xfrm>
-            <a:off x="7137063" y="4473759"/>
-            <a:ext cx="873957" cy="369332"/>
+            <a:off x="7131563" y="4473758"/>
+            <a:ext cx="879458" cy="369677"/>
           </a:xfrm>
           <a:prstGeom prst="rect">
             <a:avLst/>
@@ -18326,7 +18422,7 @@
           <a:noFill/>
         </p:spPr>
         <p:txBody>
-          <a:bodyPr wrap="none" rtlCol="0">
+          <a:bodyPr wrap="square" rtlCol="0">
             <a:spAutoFit/>
           </a:bodyPr>
           <a:lstStyle/>
@@ -18403,8 +18499,8 @@
         </p:nvSpPr>
         <p:spPr>
           <a:xfrm>
-            <a:off x="7378465" y="2442558"/>
-            <a:ext cx="914033" cy="369332"/>
+            <a:off x="7372711" y="2442557"/>
+            <a:ext cx="919787" cy="369677"/>
           </a:xfrm>
           <a:prstGeom prst="rect">
             <a:avLst/>
@@ -18412,7 +18508,7 @@
           <a:noFill/>
         </p:spPr>
         <p:txBody>
-          <a:bodyPr wrap="none" rtlCol="0">
+          <a:bodyPr wrap="square" rtlCol="0">
             <a:spAutoFit/>
           </a:bodyPr>
           <a:lstStyle/>
@@ -18493,8 +18589,8 @@
         </p:nvSpPr>
         <p:spPr>
           <a:xfrm>
-            <a:off x="3321020" y="4530259"/>
-            <a:ext cx="1031051" cy="307777"/>
+            <a:off x="3314530" y="4530259"/>
+            <a:ext cx="1037541" cy="308065"/>
           </a:xfrm>
           <a:prstGeom prst="rect">
             <a:avLst/>
@@ -18502,7 +18598,7 @@
           <a:noFill/>
         </p:spPr>
         <p:txBody>
-          <a:bodyPr wrap="none" rtlCol="0">
+          <a:bodyPr wrap="square" rtlCol="0">
             <a:spAutoFit/>
           </a:bodyPr>
           <a:lstStyle/>
@@ -18588,8 +18684,8 @@
         </p:nvSpPr>
         <p:spPr>
           <a:xfrm>
-            <a:off x="7131342" y="1627578"/>
-            <a:ext cx="675185" cy="369332"/>
+            <a:off x="7127092" y="1627577"/>
+            <a:ext cx="679435" cy="369677"/>
           </a:xfrm>
           <a:prstGeom prst="rect">
             <a:avLst/>
@@ -18597,7 +18693,7 @@
           <a:noFill/>
         </p:spPr>
         <p:txBody>
-          <a:bodyPr wrap="none" rtlCol="0">
+          <a:bodyPr wrap="square" rtlCol="0">
             <a:spAutoFit/>
           </a:bodyPr>
           <a:lstStyle/>
@@ -18667,8 +18763,8 @@
         </p:nvSpPr>
         <p:spPr>
           <a:xfrm>
-            <a:off x="7887909" y="5085879"/>
-            <a:ext cx="444352" cy="369332"/>
+            <a:off x="7885112" y="5085878"/>
+            <a:ext cx="447149" cy="369677"/>
           </a:xfrm>
           <a:prstGeom prst="rect">
             <a:avLst/>
@@ -18676,7 +18772,7 @@
           <a:noFill/>
         </p:spPr>
         <p:txBody>
-          <a:bodyPr wrap="none" rtlCol="0">
+          <a:bodyPr wrap="square" rtlCol="0">
             <a:spAutoFit/>
           </a:bodyPr>
           <a:lstStyle/>
@@ -18721,8 +18817,8 @@
         </p:nvSpPr>
         <p:spPr>
           <a:xfrm>
-            <a:off x="7606018" y="3951098"/>
-            <a:ext cx="643125" cy="369332"/>
+            <a:off x="7601970" y="3951097"/>
+            <a:ext cx="647173" cy="369677"/>
           </a:xfrm>
           <a:prstGeom prst="rect">
             <a:avLst/>
@@ -18730,7 +18826,7 @@
           <a:noFill/>
         </p:spPr>
         <p:txBody>
-          <a:bodyPr wrap="none" rtlCol="0">
+          <a:bodyPr wrap="square" rtlCol="0">
             <a:spAutoFit/>
           </a:bodyPr>
           <a:lstStyle/>
@@ -18792,8 +18888,8 @@
         </p:nvSpPr>
         <p:spPr>
           <a:xfrm>
-            <a:off x="9191811" y="2695555"/>
-            <a:ext cx="481222" cy="369332"/>
+            <a:off x="9188782" y="2695554"/>
+            <a:ext cx="484251" cy="369677"/>
           </a:xfrm>
           <a:prstGeom prst="rect">
             <a:avLst/>
@@ -18801,7 +18897,7 @@
           <a:noFill/>
         </p:spPr>
         <p:txBody>
-          <a:bodyPr wrap="none" rtlCol="0">
+          <a:bodyPr wrap="square" rtlCol="0">
             <a:spAutoFit/>
           </a:bodyPr>
           <a:lstStyle/>
@@ -18846,8 +18942,8 @@
         </p:nvSpPr>
         <p:spPr>
           <a:xfrm>
-            <a:off x="5883799" y="3552021"/>
-            <a:ext cx="679994" cy="369332"/>
+            <a:off x="5879518" y="3552020"/>
+            <a:ext cx="684275" cy="369677"/>
           </a:xfrm>
           <a:prstGeom prst="rect">
             <a:avLst/>
@@ -18855,7 +18951,7 @@
           <a:noFill/>
         </p:spPr>
         <p:txBody>
-          <a:bodyPr wrap="none" rtlCol="0">
+          <a:bodyPr wrap="square" rtlCol="0">
             <a:spAutoFit/>
           </a:bodyPr>
           <a:lstStyle/>
@@ -18918,8 +19014,8 @@
         </p:nvSpPr>
         <p:spPr>
           <a:xfrm>
-            <a:off x="9248717" y="4129120"/>
-            <a:ext cx="683200" cy="307777"/>
+            <a:off x="9244416" y="4129120"/>
+            <a:ext cx="687501" cy="308065"/>
           </a:xfrm>
           <a:prstGeom prst="rect">
             <a:avLst/>
@@ -18927,7 +19023,7 @@
           <a:noFill/>
         </p:spPr>
         <p:txBody>
-          <a:bodyPr wrap="none" rtlCol="0">
+          <a:bodyPr wrap="square" rtlCol="0">
             <a:spAutoFit/>
           </a:bodyPr>
           <a:lstStyle/>
@@ -18990,8 +19086,8 @@
         </p:nvSpPr>
         <p:spPr>
           <a:xfrm>
-            <a:off x="8812118" y="3090379"/>
-            <a:ext cx="1451038" cy="307777"/>
+            <a:off x="8802984" y="3090379"/>
+            <a:ext cx="1460172" cy="308065"/>
           </a:xfrm>
           <a:prstGeom prst="rect">
             <a:avLst/>
@@ -18999,7 +19095,7 @@
           <a:noFill/>
         </p:spPr>
         <p:txBody>
-          <a:bodyPr wrap="none" rtlCol="0">
+          <a:bodyPr wrap="square" rtlCol="0">
             <a:spAutoFit/>
           </a:bodyPr>
           <a:lstStyle/>
@@ -19116,8 +19212,8 @@
         </p:nvSpPr>
         <p:spPr>
           <a:xfrm>
-            <a:off x="5479072" y="4473759"/>
-            <a:ext cx="282450" cy="307777"/>
+            <a:off x="5477294" y="4473759"/>
+            <a:ext cx="284228" cy="308065"/>
           </a:xfrm>
           <a:prstGeom prst="rect">
             <a:avLst/>
@@ -19125,7 +19221,7 @@
           <a:noFill/>
         </p:spPr>
         <p:txBody>
-          <a:bodyPr wrap="none" rtlCol="0">
+          <a:bodyPr wrap="square" rtlCol="0">
             <a:spAutoFit/>
           </a:bodyPr>
           <a:lstStyle/>
@@ -19163,8 +19259,8 @@
         </p:nvCxnSpPr>
         <p:spPr>
           <a:xfrm>
-            <a:off x="5470238" y="3646905"/>
-            <a:ext cx="1936840" cy="0"/>
+            <a:off x="5458046" y="3646905"/>
+            <a:ext cx="1949032" cy="0"/>
           </a:xfrm>
           <a:prstGeom prst="straightConnector1">
             <a:avLst/>
@@ -19296,8 +19392,8 @@
         </p:nvSpPr>
         <p:spPr>
           <a:xfrm>
-            <a:off x="5969299" y="2068616"/>
-            <a:ext cx="1106393" cy="307777"/>
+            <a:off x="5962335" y="2068616"/>
+            <a:ext cx="1113358" cy="308065"/>
           </a:xfrm>
           <a:prstGeom prst="rect">
             <a:avLst/>
@@ -19305,7 +19401,7 @@
           <a:noFill/>
         </p:spPr>
         <p:txBody>
-          <a:bodyPr wrap="none" rtlCol="0">
+          <a:bodyPr wrap="square" rtlCol="0">
             <a:spAutoFit/>
           </a:bodyPr>
           <a:lstStyle/>
@@ -19368,101 +19464,6 @@
                 <a:sym typeface="Symbol" pitchFamily="2" charset="2"/>
               </a:rPr>
               <a:t>1</a:t>
-            </a:r>
-            <a:endParaRPr lang="en-CH" sz="1400" baseline="-25000" dirty="0">
-              <a:solidFill>
-                <a:schemeClr val="accent4"/>
-              </a:solidFill>
-            </a:endParaRPr>
-          </a:p>
-        </p:txBody>
-      </p:sp>
-      <p:sp>
-        <p:nvSpPr>
-          <p:cNvPr id="65" name="TextBox 64">
-            <a:extLst>
-              <a:ext uri="{FF2B5EF4-FFF2-40B4-BE49-F238E27FC236}">
-                <a16:creationId xmlns:a16="http://schemas.microsoft.com/office/drawing/2014/main" id="{8255D1BF-DE0F-CD56-B296-C9093A9AB00C}"/>
-              </a:ext>
-            </a:extLst>
-          </p:cNvPr>
-          <p:cNvSpPr txBox="1"/>
-          <p:nvPr/>
-        </p:nvSpPr>
-        <p:spPr>
-          <a:xfrm>
-            <a:off x="4403205" y="5227201"/>
-            <a:ext cx="1285929" cy="307777"/>
-          </a:xfrm>
-          <a:prstGeom prst="rect">
-            <a:avLst/>
-          </a:prstGeom>
-          <a:noFill/>
-        </p:spPr>
-        <p:txBody>
-          <a:bodyPr wrap="none" rtlCol="0">
-            <a:spAutoFit/>
-          </a:bodyPr>
-          <a:lstStyle/>
-          <a:p>
-            <a:r>
-              <a:rPr lang="en-CH" sz="1400" dirty="0">
-                <a:solidFill>
-                  <a:schemeClr val="accent4"/>
-                </a:solidFill>
-              </a:rPr>
-              <a:t>Pr*R</a:t>
-            </a:r>
-            <a:r>
-              <a:rPr lang="en-CH" sz="1400" baseline="-25000" dirty="0">
-                <a:solidFill>
-                  <a:schemeClr val="accent4"/>
-                </a:solidFill>
-              </a:rPr>
-              <a:t>2</a:t>
-            </a:r>
-            <a:r>
-              <a:rPr lang="en-GB" sz="1400" dirty="0">
-                <a:solidFill>
-                  <a:schemeClr val="accent4"/>
-                </a:solidFill>
-                <a:sym typeface="Symbol" pitchFamily="2" charset="2"/>
-              </a:rPr>
-              <a:t>*(1-</a:t>
-            </a:r>
-            <a:r>
-              <a:rPr lang="el-GR" sz="1400" dirty="0">
-                <a:solidFill>
-                  <a:schemeClr val="accent4"/>
-                </a:solidFill>
-              </a:rPr>
-              <a:t>ρ</a:t>
-            </a:r>
-            <a:r>
-              <a:rPr lang="de-CH" sz="1400" dirty="0">
-                <a:solidFill>
-                  <a:schemeClr val="accent4"/>
-                </a:solidFill>
-              </a:rPr>
-              <a:t>)*</a:t>
-            </a:r>
-            <a:r>
-              <a:rPr lang="en-GB" sz="1400" dirty="0">
-                <a:solidFill>
-                  <a:schemeClr val="accent4"/>
-                </a:solidFill>
-                <a:sym typeface="Symbol" pitchFamily="2" charset="2"/>
-              </a:rPr>
-              <a:t></a:t>
-            </a:r>
-            <a:r>
-              <a:rPr lang="en-CH" sz="1400" baseline="-25000" dirty="0">
-                <a:solidFill>
-                  <a:schemeClr val="accent4"/>
-                </a:solidFill>
-                <a:sym typeface="Symbol" pitchFamily="2" charset="2"/>
-              </a:rPr>
-              <a:t>2</a:t>
             </a:r>
             <a:endParaRPr lang="en-CH" sz="1400" baseline="-25000" dirty="0">
               <a:solidFill>
@@ -19578,8 +19579,8 @@
         </p:nvSpPr>
         <p:spPr>
           <a:xfrm>
-            <a:off x="6064316" y="4372129"/>
-            <a:ext cx="1106393" cy="307777"/>
+            <a:off x="6057352" y="4372129"/>
+            <a:ext cx="1113358" cy="308065"/>
           </a:xfrm>
           <a:prstGeom prst="rect">
             <a:avLst/>
@@ -19587,7 +19588,7 @@
           <a:noFill/>
         </p:spPr>
         <p:txBody>
-          <a:bodyPr wrap="none" rtlCol="0">
+          <a:bodyPr wrap="square" rtlCol="0">
             <a:spAutoFit/>
           </a:bodyPr>
           <a:lstStyle/>
@@ -19691,6 +19692,1809 @@
       </p:grpSpPr>
       <p:sp>
         <p:nvSpPr>
+          <p:cNvPr id="170" name="Rectangle 169">
+            <a:extLst>
+              <a:ext uri="{FF2B5EF4-FFF2-40B4-BE49-F238E27FC236}">
+                <a16:creationId xmlns:a16="http://schemas.microsoft.com/office/drawing/2014/main" id="{312F67DA-41E0-B08E-A790-5B97121F79FD}"/>
+              </a:ext>
+            </a:extLst>
+          </p:cNvPr>
+          <p:cNvSpPr/>
+          <p:nvPr/>
+        </p:nvSpPr>
+        <p:spPr>
+          <a:xfrm>
+            <a:off x="196889" y="586671"/>
+            <a:ext cx="7939578" cy="5684658"/>
+          </a:xfrm>
+          <a:prstGeom prst="rect">
+            <a:avLst/>
+          </a:prstGeom>
+          <a:solidFill>
+            <a:schemeClr val="bg1"/>
+          </a:solidFill>
+          <a:ln>
+            <a:solidFill>
+              <a:schemeClr val="tx1"/>
+            </a:solidFill>
+          </a:ln>
+        </p:spPr>
+        <p:style>
+          <a:lnRef idx="2">
+            <a:schemeClr val="accent1">
+              <a:shade val="50000"/>
+            </a:schemeClr>
+          </a:lnRef>
+          <a:fillRef idx="1">
+            <a:schemeClr val="accent1"/>
+          </a:fillRef>
+          <a:effectRef idx="0">
+            <a:schemeClr val="accent1"/>
+          </a:effectRef>
+          <a:fontRef idx="minor">
+            <a:schemeClr val="lt1"/>
+          </a:fontRef>
+        </p:style>
+        <p:txBody>
+          <a:bodyPr rtlCol="0" anchor="ctr"/>
+          <a:lstStyle/>
+          <a:p>
+            <a:pPr algn="ctr"/>
+            <a:endParaRPr lang="en-CH"/>
+          </a:p>
+        </p:txBody>
+      </p:sp>
+      <p:sp>
+        <p:nvSpPr>
+          <p:cNvPr id="5" name="Rectangle 4">
+            <a:extLst>
+              <a:ext uri="{FF2B5EF4-FFF2-40B4-BE49-F238E27FC236}">
+                <a16:creationId xmlns:a16="http://schemas.microsoft.com/office/drawing/2014/main" id="{E8D56EAC-7D55-1F36-F93A-DAFD0903E858}"/>
+              </a:ext>
+            </a:extLst>
+          </p:cNvPr>
+          <p:cNvSpPr/>
+          <p:nvPr/>
+        </p:nvSpPr>
+        <p:spPr>
+          <a:xfrm>
+            <a:off x="3791985" y="2942826"/>
+            <a:ext cx="920156" cy="915255"/>
+          </a:xfrm>
+          <a:prstGeom prst="rect">
+            <a:avLst/>
+          </a:prstGeom>
+        </p:spPr>
+        <p:style>
+          <a:lnRef idx="2">
+            <a:schemeClr val="accent1">
+              <a:shade val="50000"/>
+            </a:schemeClr>
+          </a:lnRef>
+          <a:fillRef idx="1">
+            <a:schemeClr val="accent1"/>
+          </a:fillRef>
+          <a:effectRef idx="0">
+            <a:schemeClr val="accent1"/>
+          </a:effectRef>
+          <a:fontRef idx="minor">
+            <a:schemeClr val="lt1"/>
+          </a:fontRef>
+        </p:style>
+        <p:txBody>
+          <a:bodyPr rtlCol="0" anchor="ctr"/>
+          <a:lstStyle/>
+          <a:p>
+            <a:pPr algn="ctr"/>
+            <a:r>
+              <a:rPr lang="en-CH" dirty="0"/>
+              <a:t>Wc</a:t>
+            </a:r>
+          </a:p>
+        </p:txBody>
+      </p:sp>
+      <p:sp>
+        <p:nvSpPr>
+          <p:cNvPr id="6" name="Rectangle 5">
+            <a:extLst>
+              <a:ext uri="{FF2B5EF4-FFF2-40B4-BE49-F238E27FC236}">
+                <a16:creationId xmlns:a16="http://schemas.microsoft.com/office/drawing/2014/main" id="{D874BD9B-2793-400A-439D-883393AE44CD}"/>
+              </a:ext>
+            </a:extLst>
+          </p:cNvPr>
+          <p:cNvSpPr/>
+          <p:nvPr/>
+        </p:nvSpPr>
+        <p:spPr>
+          <a:xfrm>
+            <a:off x="869605" y="819284"/>
+            <a:ext cx="920156" cy="915255"/>
+          </a:xfrm>
+          <a:prstGeom prst="rect">
+            <a:avLst/>
+          </a:prstGeom>
+        </p:spPr>
+        <p:style>
+          <a:lnRef idx="2">
+            <a:schemeClr val="accent1">
+              <a:shade val="50000"/>
+            </a:schemeClr>
+          </a:lnRef>
+          <a:fillRef idx="1">
+            <a:schemeClr val="accent1"/>
+          </a:fillRef>
+          <a:effectRef idx="0">
+            <a:schemeClr val="accent1"/>
+          </a:effectRef>
+          <a:fontRef idx="minor">
+            <a:schemeClr val="lt1"/>
+          </a:fontRef>
+        </p:style>
+        <p:txBody>
+          <a:bodyPr rtlCol="0" anchor="ctr"/>
+          <a:lstStyle/>
+          <a:p>
+            <a:pPr algn="ctr"/>
+            <a:r>
+              <a:rPr lang="en-CH" dirty="0"/>
+              <a:t>P</a:t>
+            </a:r>
+            <a:r>
+              <a:rPr lang="en-CH" baseline="-25000" dirty="0"/>
+              <a:t>1</a:t>
+            </a:r>
+          </a:p>
+        </p:txBody>
+      </p:sp>
+      <p:sp>
+        <p:nvSpPr>
+          <p:cNvPr id="7" name="Rectangle 6">
+            <a:extLst>
+              <a:ext uri="{FF2B5EF4-FFF2-40B4-BE49-F238E27FC236}">
+                <a16:creationId xmlns:a16="http://schemas.microsoft.com/office/drawing/2014/main" id="{ACD8451D-70D9-D4BD-99F6-727BDE2D709E}"/>
+              </a:ext>
+            </a:extLst>
+          </p:cNvPr>
+          <p:cNvSpPr/>
+          <p:nvPr/>
+        </p:nvSpPr>
+        <p:spPr>
+          <a:xfrm>
+            <a:off x="869605" y="5046729"/>
+            <a:ext cx="920156" cy="915255"/>
+          </a:xfrm>
+          <a:prstGeom prst="rect">
+            <a:avLst/>
+          </a:prstGeom>
+        </p:spPr>
+        <p:style>
+          <a:lnRef idx="2">
+            <a:schemeClr val="accent1">
+              <a:shade val="50000"/>
+            </a:schemeClr>
+          </a:lnRef>
+          <a:fillRef idx="1">
+            <a:schemeClr val="accent1"/>
+          </a:fillRef>
+          <a:effectRef idx="0">
+            <a:schemeClr val="accent1"/>
+          </a:effectRef>
+          <a:fontRef idx="minor">
+            <a:schemeClr val="lt1"/>
+          </a:fontRef>
+        </p:style>
+        <p:txBody>
+          <a:bodyPr rtlCol="0" anchor="ctr"/>
+          <a:lstStyle/>
+          <a:p>
+            <a:pPr algn="ctr"/>
+            <a:r>
+              <a:rPr lang="en-CH" dirty="0"/>
+              <a:t>P</a:t>
+            </a:r>
+            <a:r>
+              <a:rPr lang="en-CH" baseline="-25000" dirty="0"/>
+              <a:t>2</a:t>
+            </a:r>
+          </a:p>
+        </p:txBody>
+      </p:sp>
+      <p:sp>
+        <p:nvSpPr>
+          <p:cNvPr id="8" name="Rectangle 7">
+            <a:extLst>
+              <a:ext uri="{FF2B5EF4-FFF2-40B4-BE49-F238E27FC236}">
+                <a16:creationId xmlns:a16="http://schemas.microsoft.com/office/drawing/2014/main" id="{95399688-3BC2-B4DF-0E6E-DBD228AABCCA}"/>
+              </a:ext>
+            </a:extLst>
+          </p:cNvPr>
+          <p:cNvSpPr/>
+          <p:nvPr/>
+        </p:nvSpPr>
+        <p:spPr>
+          <a:xfrm>
+            <a:off x="6877299" y="2942826"/>
+            <a:ext cx="920156" cy="915255"/>
+          </a:xfrm>
+          <a:prstGeom prst="rect">
+            <a:avLst/>
+          </a:prstGeom>
+        </p:spPr>
+        <p:style>
+          <a:lnRef idx="2">
+            <a:schemeClr val="accent1">
+              <a:shade val="50000"/>
+            </a:schemeClr>
+          </a:lnRef>
+          <a:fillRef idx="1">
+            <a:schemeClr val="accent1"/>
+          </a:fillRef>
+          <a:effectRef idx="0">
+            <a:schemeClr val="accent1"/>
+          </a:effectRef>
+          <a:fontRef idx="minor">
+            <a:schemeClr val="lt1"/>
+          </a:fontRef>
+        </p:style>
+        <p:txBody>
+          <a:bodyPr rtlCol="0" anchor="ctr"/>
+          <a:lstStyle/>
+          <a:p>
+            <a:pPr algn="ctr"/>
+            <a:r>
+              <a:rPr lang="en-CH" dirty="0"/>
+              <a:t>S</a:t>
+            </a:r>
+          </a:p>
+        </p:txBody>
+      </p:sp>
+      <p:sp>
+        <p:nvSpPr>
+          <p:cNvPr id="9" name="Rectangle 8">
+            <a:extLst>
+              <a:ext uri="{FF2B5EF4-FFF2-40B4-BE49-F238E27FC236}">
+                <a16:creationId xmlns:a16="http://schemas.microsoft.com/office/drawing/2014/main" id="{59ED44CC-39F5-4F19-430B-0AAEA4216C94}"/>
+              </a:ext>
+            </a:extLst>
+          </p:cNvPr>
+          <p:cNvSpPr/>
+          <p:nvPr/>
+        </p:nvSpPr>
+        <p:spPr>
+          <a:xfrm>
+            <a:off x="5356524" y="849905"/>
+            <a:ext cx="920156" cy="915255"/>
+          </a:xfrm>
+          <a:prstGeom prst="rect">
+            <a:avLst/>
+          </a:prstGeom>
+        </p:spPr>
+        <p:style>
+          <a:lnRef idx="2">
+            <a:schemeClr val="accent1">
+              <a:shade val="50000"/>
+            </a:schemeClr>
+          </a:lnRef>
+          <a:fillRef idx="1">
+            <a:schemeClr val="accent1"/>
+          </a:fillRef>
+          <a:effectRef idx="0">
+            <a:schemeClr val="accent1"/>
+          </a:effectRef>
+          <a:fontRef idx="minor">
+            <a:schemeClr val="lt1"/>
+          </a:fontRef>
+        </p:style>
+        <p:txBody>
+          <a:bodyPr rtlCol="0" anchor="ctr"/>
+          <a:lstStyle/>
+          <a:p>
+            <a:pPr algn="ctr"/>
+            <a:r>
+              <a:rPr lang="en-CH" dirty="0"/>
+              <a:t>Rc</a:t>
+            </a:r>
+            <a:r>
+              <a:rPr lang="en-CH" baseline="-25000" dirty="0"/>
+              <a:t>1</a:t>
+            </a:r>
+          </a:p>
+        </p:txBody>
+      </p:sp>
+      <p:sp>
+        <p:nvSpPr>
+          <p:cNvPr id="10" name="Rectangle 9">
+            <a:extLst>
+              <a:ext uri="{FF2B5EF4-FFF2-40B4-BE49-F238E27FC236}">
+                <a16:creationId xmlns:a16="http://schemas.microsoft.com/office/drawing/2014/main" id="{DD8601B1-E846-4A08-1629-EB0094DA0A9C}"/>
+              </a:ext>
+            </a:extLst>
+          </p:cNvPr>
+          <p:cNvSpPr/>
+          <p:nvPr/>
+        </p:nvSpPr>
+        <p:spPr>
+          <a:xfrm>
+            <a:off x="5246666" y="4927804"/>
+            <a:ext cx="920156" cy="915255"/>
+          </a:xfrm>
+          <a:prstGeom prst="rect">
+            <a:avLst/>
+          </a:prstGeom>
+        </p:spPr>
+        <p:style>
+          <a:lnRef idx="2">
+            <a:schemeClr val="accent1">
+              <a:shade val="50000"/>
+            </a:schemeClr>
+          </a:lnRef>
+          <a:fillRef idx="1">
+            <a:schemeClr val="accent1"/>
+          </a:fillRef>
+          <a:effectRef idx="0">
+            <a:schemeClr val="accent1"/>
+          </a:effectRef>
+          <a:fontRef idx="minor">
+            <a:schemeClr val="lt1"/>
+          </a:fontRef>
+        </p:style>
+        <p:txBody>
+          <a:bodyPr rtlCol="0" anchor="ctr"/>
+          <a:lstStyle/>
+          <a:p>
+            <a:pPr algn="ctr"/>
+            <a:r>
+              <a:rPr lang="en-CH" dirty="0"/>
+              <a:t>Rc</a:t>
+            </a:r>
+            <a:r>
+              <a:rPr lang="en-CH" baseline="-25000" dirty="0"/>
+              <a:t>2</a:t>
+            </a:r>
+          </a:p>
+        </p:txBody>
+      </p:sp>
+      <p:cxnSp>
+        <p:nvCxnSpPr>
+          <p:cNvPr id="13" name="Straight Arrow Connector 12">
+            <a:extLst>
+              <a:ext uri="{FF2B5EF4-FFF2-40B4-BE49-F238E27FC236}">
+                <a16:creationId xmlns:a16="http://schemas.microsoft.com/office/drawing/2014/main" id="{904BC260-66FB-7035-ED30-860471B2A69B}"/>
+              </a:ext>
+            </a:extLst>
+          </p:cNvPr>
+          <p:cNvCxnSpPr>
+            <a:cxnSpLocks/>
+          </p:cNvCxnSpPr>
+          <p:nvPr/>
+        </p:nvCxnSpPr>
+        <p:spPr>
+          <a:xfrm>
+            <a:off x="4780961" y="3517673"/>
+            <a:ext cx="1949032" cy="0"/>
+          </a:xfrm>
+          <a:prstGeom prst="straightConnector1">
+            <a:avLst/>
+          </a:prstGeom>
+          <a:ln>
+            <a:solidFill>
+              <a:schemeClr val="accent4"/>
+            </a:solidFill>
+            <a:headEnd type="none"/>
+            <a:tailEnd type="triangle"/>
+          </a:ln>
+        </p:spPr>
+        <p:style>
+          <a:lnRef idx="1">
+            <a:schemeClr val="accent1"/>
+          </a:lnRef>
+          <a:fillRef idx="0">
+            <a:schemeClr val="accent1"/>
+          </a:fillRef>
+          <a:effectRef idx="0">
+            <a:schemeClr val="accent1"/>
+          </a:effectRef>
+          <a:fontRef idx="minor">
+            <a:schemeClr val="tx1"/>
+          </a:fontRef>
+        </p:style>
+      </p:cxnSp>
+      <p:cxnSp>
+        <p:nvCxnSpPr>
+          <p:cNvPr id="36" name="Straight Arrow Connector 35">
+            <a:extLst>
+              <a:ext uri="{FF2B5EF4-FFF2-40B4-BE49-F238E27FC236}">
+                <a16:creationId xmlns:a16="http://schemas.microsoft.com/office/drawing/2014/main" id="{970FBB40-4F42-F0A4-7A48-C3C9A84ED85A}"/>
+              </a:ext>
+            </a:extLst>
+          </p:cNvPr>
+          <p:cNvCxnSpPr>
+            <a:cxnSpLocks/>
+          </p:cNvCxnSpPr>
+          <p:nvPr/>
+        </p:nvCxnSpPr>
+        <p:spPr>
+          <a:xfrm flipV="1">
+            <a:off x="4145719" y="1379452"/>
+            <a:ext cx="1124492" cy="1485856"/>
+          </a:xfrm>
+          <a:prstGeom prst="straightConnector1">
+            <a:avLst/>
+          </a:prstGeom>
+          <a:ln>
+            <a:solidFill>
+              <a:schemeClr val="accent4"/>
+            </a:solidFill>
+            <a:tailEnd type="triangle"/>
+          </a:ln>
+        </p:spPr>
+        <p:style>
+          <a:lnRef idx="1">
+            <a:schemeClr val="accent1"/>
+          </a:lnRef>
+          <a:fillRef idx="0">
+            <a:schemeClr val="accent1"/>
+          </a:fillRef>
+          <a:effectRef idx="0">
+            <a:schemeClr val="accent1"/>
+          </a:effectRef>
+          <a:fontRef idx="minor">
+            <a:schemeClr val="tx1"/>
+          </a:fontRef>
+        </p:style>
+      </p:cxnSp>
+      <p:cxnSp>
+        <p:nvCxnSpPr>
+          <p:cNvPr id="44" name="Straight Arrow Connector 43">
+            <a:extLst>
+              <a:ext uri="{FF2B5EF4-FFF2-40B4-BE49-F238E27FC236}">
+                <a16:creationId xmlns:a16="http://schemas.microsoft.com/office/drawing/2014/main" id="{66FD9E5B-6100-5A1B-EC71-0DC637470681}"/>
+              </a:ext>
+            </a:extLst>
+          </p:cNvPr>
+          <p:cNvCxnSpPr>
+            <a:cxnSpLocks/>
+          </p:cNvCxnSpPr>
+          <p:nvPr/>
+        </p:nvCxnSpPr>
+        <p:spPr>
+          <a:xfrm>
+            <a:off x="4173414" y="3891401"/>
+            <a:ext cx="1039249" cy="1486236"/>
+          </a:xfrm>
+          <a:prstGeom prst="straightConnector1">
+            <a:avLst/>
+          </a:prstGeom>
+          <a:ln>
+            <a:solidFill>
+              <a:schemeClr val="accent4"/>
+            </a:solidFill>
+            <a:tailEnd type="triangle"/>
+          </a:ln>
+        </p:spPr>
+        <p:style>
+          <a:lnRef idx="1">
+            <a:schemeClr val="accent1"/>
+          </a:lnRef>
+          <a:fillRef idx="0">
+            <a:schemeClr val="accent1"/>
+          </a:fillRef>
+          <a:effectRef idx="0">
+            <a:schemeClr val="accent1"/>
+          </a:effectRef>
+          <a:fontRef idx="minor">
+            <a:schemeClr val="tx1"/>
+          </a:fontRef>
+        </p:style>
+      </p:cxnSp>
+      <p:cxnSp>
+        <p:nvCxnSpPr>
+          <p:cNvPr id="54" name="Straight Arrow Connector 53">
+            <a:extLst>
+              <a:ext uri="{FF2B5EF4-FFF2-40B4-BE49-F238E27FC236}">
+                <a16:creationId xmlns:a16="http://schemas.microsoft.com/office/drawing/2014/main" id="{A0BB4E15-B96A-130B-07AA-792C1AAC9F8C}"/>
+              </a:ext>
+            </a:extLst>
+          </p:cNvPr>
+          <p:cNvCxnSpPr>
+            <a:cxnSpLocks/>
+          </p:cNvCxnSpPr>
+          <p:nvPr/>
+        </p:nvCxnSpPr>
+        <p:spPr>
+          <a:xfrm flipH="1" flipV="1">
+            <a:off x="1824016" y="1301804"/>
+            <a:ext cx="5013004" cy="1843224"/>
+          </a:xfrm>
+          <a:prstGeom prst="straightConnector1">
+            <a:avLst/>
+          </a:prstGeom>
+          <a:ln w="12700">
+            <a:solidFill>
+              <a:schemeClr val="accent4"/>
+            </a:solidFill>
+            <a:prstDash val="solid"/>
+            <a:headEnd type="none"/>
+            <a:tailEnd type="triangle"/>
+          </a:ln>
+        </p:spPr>
+        <p:style>
+          <a:lnRef idx="1">
+            <a:schemeClr val="accent1"/>
+          </a:lnRef>
+          <a:fillRef idx="0">
+            <a:schemeClr val="accent1"/>
+          </a:fillRef>
+          <a:effectRef idx="0">
+            <a:schemeClr val="accent1"/>
+          </a:effectRef>
+          <a:fontRef idx="minor">
+            <a:schemeClr val="tx1"/>
+          </a:fontRef>
+        </p:style>
+      </p:cxnSp>
+      <p:cxnSp>
+        <p:nvCxnSpPr>
+          <p:cNvPr id="127" name="Straight Arrow Connector 126">
+            <a:extLst>
+              <a:ext uri="{FF2B5EF4-FFF2-40B4-BE49-F238E27FC236}">
+                <a16:creationId xmlns:a16="http://schemas.microsoft.com/office/drawing/2014/main" id="{DAC47A80-22E3-9FF0-6839-E37AA492A27B}"/>
+              </a:ext>
+            </a:extLst>
+          </p:cNvPr>
+          <p:cNvCxnSpPr>
+            <a:cxnSpLocks/>
+          </p:cNvCxnSpPr>
+          <p:nvPr/>
+        </p:nvCxnSpPr>
+        <p:spPr>
+          <a:xfrm flipH="1">
+            <a:off x="1819561" y="3699457"/>
+            <a:ext cx="4981154" cy="1759003"/>
+          </a:xfrm>
+          <a:prstGeom prst="straightConnector1">
+            <a:avLst/>
+          </a:prstGeom>
+          <a:ln w="12700">
+            <a:solidFill>
+              <a:schemeClr val="accent4"/>
+            </a:solidFill>
+            <a:prstDash val="solid"/>
+            <a:headEnd type="none"/>
+            <a:tailEnd type="triangle"/>
+          </a:ln>
+        </p:spPr>
+        <p:style>
+          <a:lnRef idx="1">
+            <a:schemeClr val="accent1"/>
+          </a:lnRef>
+          <a:fillRef idx="0">
+            <a:schemeClr val="accent1"/>
+          </a:fillRef>
+          <a:effectRef idx="0">
+            <a:schemeClr val="accent1"/>
+          </a:effectRef>
+          <a:fontRef idx="minor">
+            <a:schemeClr val="tx1"/>
+          </a:fontRef>
+        </p:style>
+      </p:cxnSp>
+      <p:cxnSp>
+        <p:nvCxnSpPr>
+          <p:cNvPr id="93" name="Straight Arrow Connector 92">
+            <a:extLst>
+              <a:ext uri="{FF2B5EF4-FFF2-40B4-BE49-F238E27FC236}">
+                <a16:creationId xmlns:a16="http://schemas.microsoft.com/office/drawing/2014/main" id="{1EBF8684-C908-6CB9-5C62-39CBB9FDB091}"/>
+              </a:ext>
+            </a:extLst>
+          </p:cNvPr>
+          <p:cNvCxnSpPr>
+            <a:cxnSpLocks/>
+          </p:cNvCxnSpPr>
+          <p:nvPr/>
+        </p:nvCxnSpPr>
+        <p:spPr>
+          <a:xfrm flipH="1">
+            <a:off x="6239869" y="3900959"/>
+            <a:ext cx="845580" cy="1228121"/>
+          </a:xfrm>
+          <a:prstGeom prst="straightConnector1">
+            <a:avLst/>
+          </a:prstGeom>
+          <a:ln>
+            <a:solidFill>
+              <a:schemeClr val="accent4"/>
+            </a:solidFill>
+            <a:headEnd type="triangle"/>
+            <a:tailEnd type="none"/>
+          </a:ln>
+        </p:spPr>
+        <p:style>
+          <a:lnRef idx="1">
+            <a:schemeClr val="accent1"/>
+          </a:lnRef>
+          <a:fillRef idx="0">
+            <a:schemeClr val="accent1"/>
+          </a:fillRef>
+          <a:effectRef idx="0">
+            <a:schemeClr val="accent1"/>
+          </a:effectRef>
+          <a:fontRef idx="minor">
+            <a:schemeClr val="tx1"/>
+          </a:fontRef>
+        </p:style>
+      </p:cxnSp>
+      <p:cxnSp>
+        <p:nvCxnSpPr>
+          <p:cNvPr id="95" name="Straight Arrow Connector 94">
+            <a:extLst>
+              <a:ext uri="{FF2B5EF4-FFF2-40B4-BE49-F238E27FC236}">
+                <a16:creationId xmlns:a16="http://schemas.microsoft.com/office/drawing/2014/main" id="{63A26A68-6740-3098-E09D-7E2D25ACA249}"/>
+              </a:ext>
+            </a:extLst>
+          </p:cNvPr>
+          <p:cNvCxnSpPr>
+            <a:cxnSpLocks/>
+          </p:cNvCxnSpPr>
+          <p:nvPr/>
+        </p:nvCxnSpPr>
+        <p:spPr>
+          <a:xfrm flipH="1" flipV="1">
+            <a:off x="6325633" y="1758910"/>
+            <a:ext cx="646354" cy="1166130"/>
+          </a:xfrm>
+          <a:prstGeom prst="straightConnector1">
+            <a:avLst/>
+          </a:prstGeom>
+          <a:ln>
+            <a:solidFill>
+              <a:schemeClr val="accent4"/>
+            </a:solidFill>
+            <a:headEnd type="triangle"/>
+            <a:tailEnd type="none"/>
+          </a:ln>
+        </p:spPr>
+        <p:style>
+          <a:lnRef idx="1">
+            <a:schemeClr val="accent1"/>
+          </a:lnRef>
+          <a:fillRef idx="0">
+            <a:schemeClr val="accent1"/>
+          </a:fillRef>
+          <a:effectRef idx="0">
+            <a:schemeClr val="accent1"/>
+          </a:effectRef>
+          <a:fontRef idx="minor">
+            <a:schemeClr val="tx1"/>
+          </a:fontRef>
+        </p:style>
+      </p:cxnSp>
+      <p:cxnSp>
+        <p:nvCxnSpPr>
+          <p:cNvPr id="67" name="Straight Arrow Connector 66">
+            <a:extLst>
+              <a:ext uri="{FF2B5EF4-FFF2-40B4-BE49-F238E27FC236}">
+                <a16:creationId xmlns:a16="http://schemas.microsoft.com/office/drawing/2014/main" id="{35BF6440-BA6E-B9ED-605E-71BD2ADCDD96}"/>
+              </a:ext>
+            </a:extLst>
+          </p:cNvPr>
+          <p:cNvCxnSpPr>
+            <a:cxnSpLocks/>
+          </p:cNvCxnSpPr>
+          <p:nvPr/>
+        </p:nvCxnSpPr>
+        <p:spPr>
+          <a:xfrm flipH="1" flipV="1">
+            <a:off x="6246008" y="1850712"/>
+            <a:ext cx="593443" cy="1066066"/>
+          </a:xfrm>
+          <a:prstGeom prst="straightConnector1">
+            <a:avLst/>
+          </a:prstGeom>
+          <a:ln w="12700">
+            <a:solidFill>
+              <a:schemeClr val="accent4"/>
+            </a:solidFill>
+            <a:prstDash val="solid"/>
+            <a:headEnd type="none"/>
+            <a:tailEnd type="triangle"/>
+          </a:ln>
+        </p:spPr>
+        <p:style>
+          <a:lnRef idx="1">
+            <a:schemeClr val="accent1"/>
+          </a:lnRef>
+          <a:fillRef idx="0">
+            <a:schemeClr val="accent1"/>
+          </a:fillRef>
+          <a:effectRef idx="0">
+            <a:schemeClr val="accent1"/>
+          </a:effectRef>
+          <a:fontRef idx="minor">
+            <a:schemeClr val="tx1"/>
+          </a:fontRef>
+        </p:style>
+      </p:cxnSp>
+      <p:cxnSp>
+        <p:nvCxnSpPr>
+          <p:cNvPr id="96" name="Straight Arrow Connector 95">
+            <a:extLst>
+              <a:ext uri="{FF2B5EF4-FFF2-40B4-BE49-F238E27FC236}">
+                <a16:creationId xmlns:a16="http://schemas.microsoft.com/office/drawing/2014/main" id="{34CB3543-967D-2E59-A38B-12897BBA801C}"/>
+              </a:ext>
+            </a:extLst>
+          </p:cNvPr>
+          <p:cNvCxnSpPr>
+            <a:cxnSpLocks/>
+          </p:cNvCxnSpPr>
+          <p:nvPr/>
+        </p:nvCxnSpPr>
+        <p:spPr>
+          <a:xfrm flipH="1">
+            <a:off x="6194133" y="3942220"/>
+            <a:ext cx="777854" cy="1091823"/>
+          </a:xfrm>
+          <a:prstGeom prst="straightConnector1">
+            <a:avLst/>
+          </a:prstGeom>
+          <a:ln w="12700">
+            <a:solidFill>
+              <a:schemeClr val="accent4"/>
+            </a:solidFill>
+            <a:prstDash val="solid"/>
+            <a:headEnd type="none"/>
+            <a:tailEnd type="triangle"/>
+          </a:ln>
+        </p:spPr>
+        <p:style>
+          <a:lnRef idx="1">
+            <a:schemeClr val="accent1"/>
+          </a:lnRef>
+          <a:fillRef idx="0">
+            <a:schemeClr val="accent1"/>
+          </a:fillRef>
+          <a:effectRef idx="0">
+            <a:schemeClr val="accent1"/>
+          </a:effectRef>
+          <a:fontRef idx="minor">
+            <a:schemeClr val="tx1"/>
+          </a:fontRef>
+        </p:style>
+      </p:cxnSp>
+      <p:sp>
+        <p:nvSpPr>
+          <p:cNvPr id="99" name="TextBox 98">
+            <a:extLst>
+              <a:ext uri="{FF2B5EF4-FFF2-40B4-BE49-F238E27FC236}">
+                <a16:creationId xmlns:a16="http://schemas.microsoft.com/office/drawing/2014/main" id="{782B42EC-6EA8-76D2-D11E-B051EA510DA8}"/>
+              </a:ext>
+            </a:extLst>
+          </p:cNvPr>
+          <p:cNvSpPr txBox="1"/>
+          <p:nvPr/>
+        </p:nvSpPr>
+        <p:spPr>
+          <a:xfrm>
+            <a:off x="2754444" y="1384541"/>
+            <a:ext cx="1037541" cy="308065"/>
+          </a:xfrm>
+          <a:prstGeom prst="rect">
+            <a:avLst/>
+          </a:prstGeom>
+          <a:noFill/>
+        </p:spPr>
+        <p:txBody>
+          <a:bodyPr wrap="square" rtlCol="0">
+            <a:spAutoFit/>
+          </a:bodyPr>
+          <a:lstStyle/>
+          <a:p>
+            <a:r>
+              <a:rPr lang="en-CH" sz="1400" dirty="0">
+                <a:solidFill>
+                  <a:schemeClr val="accent4"/>
+                </a:solidFill>
+              </a:rPr>
+              <a:t>Pr*R</a:t>
+            </a:r>
+            <a:r>
+              <a:rPr lang="en-CH" sz="1400" baseline="-25000" dirty="0">
+                <a:solidFill>
+                  <a:schemeClr val="accent4"/>
+                </a:solidFill>
+              </a:rPr>
+              <a:t>1</a:t>
+            </a:r>
+            <a:r>
+              <a:rPr lang="en-GB" sz="1400" dirty="0">
+                <a:solidFill>
+                  <a:schemeClr val="accent4"/>
+                </a:solidFill>
+                <a:sym typeface="Symbol" pitchFamily="2" charset="2"/>
+              </a:rPr>
+              <a:t>*</a:t>
+            </a:r>
+            <a:r>
+              <a:rPr lang="el-GR" sz="1400" dirty="0">
+                <a:solidFill>
+                  <a:schemeClr val="accent4"/>
+                </a:solidFill>
+              </a:rPr>
+              <a:t>ρ</a:t>
+            </a:r>
+            <a:r>
+              <a:rPr lang="de-CH" sz="1400" dirty="0">
+                <a:solidFill>
+                  <a:schemeClr val="accent4"/>
+                </a:solidFill>
+              </a:rPr>
+              <a:t>*</a:t>
+            </a:r>
+            <a:r>
+              <a:rPr lang="en-GB" sz="1400" dirty="0">
+                <a:solidFill>
+                  <a:schemeClr val="accent4"/>
+                </a:solidFill>
+                <a:sym typeface="Symbol" pitchFamily="2" charset="2"/>
+              </a:rPr>
+              <a:t></a:t>
+            </a:r>
+            <a:r>
+              <a:rPr lang="en-CH" sz="1400" baseline="-25000" dirty="0">
+                <a:solidFill>
+                  <a:schemeClr val="accent4"/>
+                </a:solidFill>
+                <a:sym typeface="Symbol" pitchFamily="2" charset="2"/>
+              </a:rPr>
+              <a:t>1</a:t>
+            </a:r>
+            <a:endParaRPr lang="en-CH" sz="1400" baseline="-25000" dirty="0">
+              <a:solidFill>
+                <a:schemeClr val="accent4"/>
+              </a:solidFill>
+            </a:endParaRPr>
+          </a:p>
+        </p:txBody>
+      </p:sp>
+      <p:sp>
+        <p:nvSpPr>
+          <p:cNvPr id="100" name="TextBox 99">
+            <a:extLst>
+              <a:ext uri="{FF2B5EF4-FFF2-40B4-BE49-F238E27FC236}">
+                <a16:creationId xmlns:a16="http://schemas.microsoft.com/office/drawing/2014/main" id="{EDE7FEC9-430B-CA38-DEAD-6DC89BDFF786}"/>
+              </a:ext>
+            </a:extLst>
+          </p:cNvPr>
+          <p:cNvSpPr txBox="1"/>
+          <p:nvPr/>
+        </p:nvSpPr>
+        <p:spPr>
+          <a:xfrm>
+            <a:off x="4011614" y="1296087"/>
+            <a:ext cx="1176268" cy="307777"/>
+          </a:xfrm>
+          <a:prstGeom prst="rect">
+            <a:avLst/>
+          </a:prstGeom>
+          <a:noFill/>
+        </p:spPr>
+        <p:txBody>
+          <a:bodyPr wrap="square" rtlCol="0">
+            <a:spAutoFit/>
+          </a:bodyPr>
+          <a:lstStyle/>
+          <a:p>
+            <a:r>
+              <a:rPr lang="en-CH" sz="1400" dirty="0">
+                <a:solidFill>
+                  <a:schemeClr val="accent4"/>
+                </a:solidFill>
+              </a:rPr>
+              <a:t>Pr</a:t>
+            </a:r>
+            <a:r>
+              <a:rPr lang="en-GB" sz="1400" dirty="0">
+                <a:solidFill>
+                  <a:schemeClr val="accent4"/>
+                </a:solidFill>
+                <a:sym typeface="Symbol" pitchFamily="2" charset="2"/>
+              </a:rPr>
+              <a:t>R</a:t>
+            </a:r>
+            <a:r>
+              <a:rPr lang="en-GB" sz="1400" baseline="-25000" dirty="0">
+                <a:solidFill>
+                  <a:schemeClr val="accent4"/>
+                </a:solidFill>
+                <a:sym typeface="Symbol" pitchFamily="2" charset="2"/>
+              </a:rPr>
+              <a:t>1</a:t>
+            </a:r>
+            <a:r>
+              <a:rPr lang="en-GB" sz="1400" dirty="0">
+                <a:solidFill>
+                  <a:schemeClr val="accent4"/>
+                </a:solidFill>
+                <a:sym typeface="Symbol" pitchFamily="2" charset="2"/>
+              </a:rPr>
+              <a:t>(1-</a:t>
+            </a:r>
+            <a:r>
+              <a:rPr lang="en-GB" sz="1400" b="1" dirty="0">
+                <a:solidFill>
+                  <a:srgbClr val="FF0000"/>
+                </a:solidFill>
+                <a:sym typeface="Symbol" pitchFamily="2" charset="2"/>
+              </a:rPr>
+              <a:t></a:t>
+            </a:r>
+            <a:r>
+              <a:rPr lang="en-CH" sz="1400" dirty="0"/>
+              <a:t> </a:t>
+            </a:r>
+            <a:r>
+              <a:rPr lang="de-CH" sz="1400" dirty="0">
+                <a:solidFill>
+                  <a:schemeClr val="accent4"/>
+                </a:solidFill>
+              </a:rPr>
+              <a:t>)</a:t>
+            </a:r>
+            <a:r>
+              <a:rPr lang="en-GB" sz="1400" dirty="0">
+                <a:solidFill>
+                  <a:schemeClr val="accent4"/>
+                </a:solidFill>
+                <a:sym typeface="Symbol" pitchFamily="2" charset="2"/>
+              </a:rPr>
+              <a:t>*</a:t>
+            </a:r>
+            <a:r>
+              <a:rPr lang="en-CH" sz="1400" baseline="-25000" dirty="0">
+                <a:solidFill>
+                  <a:schemeClr val="accent4"/>
+                </a:solidFill>
+                <a:sym typeface="Symbol" pitchFamily="2" charset="2"/>
+              </a:rPr>
+              <a:t>1</a:t>
+            </a:r>
+            <a:endParaRPr lang="en-CH" sz="1400" baseline="-25000" dirty="0">
+              <a:solidFill>
+                <a:schemeClr val="accent4"/>
+              </a:solidFill>
+            </a:endParaRPr>
+          </a:p>
+        </p:txBody>
+      </p:sp>
+      <p:sp>
+        <p:nvSpPr>
+          <p:cNvPr id="101" name="TextBox 100">
+            <a:extLst>
+              <a:ext uri="{FF2B5EF4-FFF2-40B4-BE49-F238E27FC236}">
+                <a16:creationId xmlns:a16="http://schemas.microsoft.com/office/drawing/2014/main" id="{F4AA0C68-7330-CE1B-0F37-89C44F2CA9B4}"/>
+              </a:ext>
+            </a:extLst>
+          </p:cNvPr>
+          <p:cNvSpPr txBox="1"/>
+          <p:nvPr/>
+        </p:nvSpPr>
+        <p:spPr>
+          <a:xfrm>
+            <a:off x="4746396" y="3129549"/>
+            <a:ext cx="1832797" cy="307777"/>
+          </a:xfrm>
+          <a:prstGeom prst="rect">
+            <a:avLst/>
+          </a:prstGeom>
+          <a:noFill/>
+        </p:spPr>
+        <p:txBody>
+          <a:bodyPr wrap="square" rtlCol="0">
+            <a:spAutoFit/>
+          </a:bodyPr>
+          <a:lstStyle/>
+          <a:p>
+            <a:r>
+              <a:rPr lang="en-CH" sz="1400" dirty="0">
+                <a:solidFill>
+                  <a:schemeClr val="accent4"/>
+                </a:solidFill>
+              </a:rPr>
+              <a:t>Pr*</a:t>
+            </a:r>
+            <a:r>
+              <a:rPr lang="en-GB" sz="1400" b="1" dirty="0">
+                <a:solidFill>
+                  <a:srgbClr val="FF0000"/>
+                </a:solidFill>
+                <a:sym typeface="Symbol" pitchFamily="2" charset="2"/>
+              </a:rPr>
+              <a:t></a:t>
+            </a:r>
+            <a:r>
+              <a:rPr lang="en-CH" sz="1400" dirty="0"/>
+              <a:t> </a:t>
+            </a:r>
+            <a:r>
+              <a:rPr lang="en-GB" sz="1400" dirty="0">
+                <a:solidFill>
+                  <a:schemeClr val="accent4"/>
+                </a:solidFill>
+                <a:sym typeface="Symbol" pitchFamily="2" charset="2"/>
+              </a:rPr>
+              <a:t>*(R</a:t>
+            </a:r>
+            <a:r>
+              <a:rPr lang="en-GB" sz="1400" baseline="-25000" dirty="0">
+                <a:solidFill>
+                  <a:schemeClr val="accent4"/>
+                </a:solidFill>
+                <a:sym typeface="Symbol" pitchFamily="2" charset="2"/>
+              </a:rPr>
+              <a:t>1</a:t>
+            </a:r>
+            <a:r>
+              <a:rPr lang="en-GB" sz="1400" dirty="0">
+                <a:solidFill>
+                  <a:schemeClr val="accent4"/>
+                </a:solidFill>
+                <a:sym typeface="Symbol" pitchFamily="2" charset="2"/>
+              </a:rPr>
+              <a:t>*</a:t>
+            </a:r>
+            <a:r>
+              <a:rPr lang="en-CH" sz="1400" baseline="-25000" dirty="0">
+                <a:solidFill>
+                  <a:schemeClr val="accent4"/>
+                </a:solidFill>
+                <a:sym typeface="Symbol" pitchFamily="2" charset="2"/>
+              </a:rPr>
+              <a:t>1</a:t>
+            </a:r>
+            <a:r>
+              <a:rPr lang="en-CH" sz="1400" dirty="0">
+                <a:solidFill>
+                  <a:schemeClr val="accent4"/>
+                </a:solidFill>
+                <a:sym typeface="Symbol" pitchFamily="2" charset="2"/>
+              </a:rPr>
+              <a:t>)+</a:t>
+            </a:r>
+            <a:r>
+              <a:rPr lang="en-GB" sz="1400" dirty="0">
+                <a:solidFill>
+                  <a:schemeClr val="accent4"/>
+                </a:solidFill>
+                <a:sym typeface="Symbol" pitchFamily="2" charset="2"/>
+              </a:rPr>
+              <a:t>(R</a:t>
+            </a:r>
+            <a:r>
+              <a:rPr lang="en-GB" sz="1400" baseline="-25000" dirty="0">
+                <a:solidFill>
+                  <a:schemeClr val="accent4"/>
+                </a:solidFill>
+                <a:sym typeface="Symbol" pitchFamily="2" charset="2"/>
+              </a:rPr>
+              <a:t>2</a:t>
+            </a:r>
+            <a:r>
+              <a:rPr lang="en-GB" sz="1400" dirty="0">
+                <a:solidFill>
+                  <a:schemeClr val="accent4"/>
+                </a:solidFill>
+                <a:sym typeface="Symbol" pitchFamily="2" charset="2"/>
+              </a:rPr>
+              <a:t>*</a:t>
+            </a:r>
+            <a:r>
+              <a:rPr lang="en-CH" sz="1400" baseline="-25000" dirty="0">
+                <a:solidFill>
+                  <a:schemeClr val="accent4"/>
+                </a:solidFill>
+                <a:sym typeface="Symbol" pitchFamily="2" charset="2"/>
+              </a:rPr>
+              <a:t>2</a:t>
+            </a:r>
+            <a:r>
+              <a:rPr lang="en-CH" sz="1400" dirty="0">
+                <a:solidFill>
+                  <a:schemeClr val="accent4"/>
+                </a:solidFill>
+                <a:sym typeface="Symbol" pitchFamily="2" charset="2"/>
+              </a:rPr>
+              <a:t>)</a:t>
+            </a:r>
+            <a:endParaRPr lang="en-CH" sz="1400" dirty="0">
+              <a:solidFill>
+                <a:schemeClr val="accent4"/>
+              </a:solidFill>
+            </a:endParaRPr>
+          </a:p>
+        </p:txBody>
+      </p:sp>
+      <p:sp>
+        <p:nvSpPr>
+          <p:cNvPr id="102" name="TextBox 101">
+            <a:extLst>
+              <a:ext uri="{FF2B5EF4-FFF2-40B4-BE49-F238E27FC236}">
+                <a16:creationId xmlns:a16="http://schemas.microsoft.com/office/drawing/2014/main" id="{55A5DB43-38CB-8F66-71D7-BC493C197AFF}"/>
+              </a:ext>
+            </a:extLst>
+          </p:cNvPr>
+          <p:cNvSpPr txBox="1"/>
+          <p:nvPr/>
+        </p:nvSpPr>
+        <p:spPr>
+          <a:xfrm>
+            <a:off x="3951977" y="4959953"/>
+            <a:ext cx="1176268" cy="307777"/>
+          </a:xfrm>
+          <a:prstGeom prst="rect">
+            <a:avLst/>
+          </a:prstGeom>
+          <a:noFill/>
+        </p:spPr>
+        <p:txBody>
+          <a:bodyPr wrap="square" rtlCol="0">
+            <a:spAutoFit/>
+          </a:bodyPr>
+          <a:lstStyle/>
+          <a:p>
+            <a:r>
+              <a:rPr lang="en-CH" sz="1400" dirty="0">
+                <a:solidFill>
+                  <a:schemeClr val="accent4"/>
+                </a:solidFill>
+              </a:rPr>
+              <a:t>Pr</a:t>
+            </a:r>
+            <a:r>
+              <a:rPr lang="en-GB" sz="1400" dirty="0">
+                <a:solidFill>
+                  <a:schemeClr val="accent4"/>
+                </a:solidFill>
+                <a:sym typeface="Symbol" pitchFamily="2" charset="2"/>
+              </a:rPr>
+              <a:t>R</a:t>
+            </a:r>
+            <a:r>
+              <a:rPr lang="en-GB" sz="1400" baseline="-25000" dirty="0">
+                <a:solidFill>
+                  <a:schemeClr val="accent4"/>
+                </a:solidFill>
+                <a:sym typeface="Symbol" pitchFamily="2" charset="2"/>
+              </a:rPr>
+              <a:t>2</a:t>
+            </a:r>
+            <a:r>
+              <a:rPr lang="en-GB" sz="1400" dirty="0">
+                <a:solidFill>
+                  <a:schemeClr val="accent4"/>
+                </a:solidFill>
+                <a:sym typeface="Symbol" pitchFamily="2" charset="2"/>
+              </a:rPr>
+              <a:t>(1-</a:t>
+            </a:r>
+            <a:r>
+              <a:rPr lang="en-GB" sz="1400" b="1" dirty="0">
+                <a:solidFill>
+                  <a:srgbClr val="FF0000"/>
+                </a:solidFill>
+                <a:sym typeface="Symbol" pitchFamily="2" charset="2"/>
+              </a:rPr>
+              <a:t></a:t>
+            </a:r>
+            <a:r>
+              <a:rPr lang="de-CH" sz="1400" dirty="0">
+                <a:solidFill>
+                  <a:schemeClr val="accent4"/>
+                </a:solidFill>
+              </a:rPr>
+              <a:t>)</a:t>
+            </a:r>
+            <a:r>
+              <a:rPr lang="en-GB" sz="1400" dirty="0">
+                <a:solidFill>
+                  <a:schemeClr val="accent4"/>
+                </a:solidFill>
+                <a:sym typeface="Symbol" pitchFamily="2" charset="2"/>
+              </a:rPr>
+              <a:t>*</a:t>
+            </a:r>
+            <a:r>
+              <a:rPr lang="en-CH" sz="1400" baseline="-25000" dirty="0">
+                <a:solidFill>
+                  <a:schemeClr val="accent4"/>
+                </a:solidFill>
+                <a:sym typeface="Symbol" pitchFamily="2" charset="2"/>
+              </a:rPr>
+              <a:t>2</a:t>
+            </a:r>
+            <a:endParaRPr lang="en-CH" sz="1400" baseline="-25000" dirty="0">
+              <a:solidFill>
+                <a:schemeClr val="accent4"/>
+              </a:solidFill>
+            </a:endParaRPr>
+          </a:p>
+        </p:txBody>
+      </p:sp>
+      <p:sp>
+        <p:nvSpPr>
+          <p:cNvPr id="103" name="TextBox 102">
+            <a:extLst>
+              <a:ext uri="{FF2B5EF4-FFF2-40B4-BE49-F238E27FC236}">
+                <a16:creationId xmlns:a16="http://schemas.microsoft.com/office/drawing/2014/main" id="{C6B349DE-C597-8629-4A39-5C10EC4628FF}"/>
+              </a:ext>
+            </a:extLst>
+          </p:cNvPr>
+          <p:cNvSpPr txBox="1"/>
+          <p:nvPr/>
+        </p:nvSpPr>
+        <p:spPr>
+          <a:xfrm>
+            <a:off x="6604541" y="4448083"/>
+            <a:ext cx="1394652" cy="307777"/>
+          </a:xfrm>
+          <a:prstGeom prst="rect">
+            <a:avLst/>
+          </a:prstGeom>
+          <a:noFill/>
+        </p:spPr>
+        <p:txBody>
+          <a:bodyPr wrap="square" rtlCol="0">
+            <a:spAutoFit/>
+          </a:bodyPr>
+          <a:lstStyle/>
+          <a:p>
+            <a:r>
+              <a:rPr lang="en-CH" sz="1400" dirty="0">
+                <a:solidFill>
+                  <a:schemeClr val="accent4"/>
+                </a:solidFill>
+              </a:rPr>
+              <a:t>Pr</a:t>
+            </a:r>
+            <a:r>
+              <a:rPr lang="en-GB" sz="1400" dirty="0">
+                <a:solidFill>
+                  <a:schemeClr val="accent4"/>
+                </a:solidFill>
+                <a:sym typeface="Symbol" pitchFamily="2" charset="2"/>
+              </a:rPr>
+              <a:t>R</a:t>
+            </a:r>
+            <a:r>
+              <a:rPr lang="en-GB" sz="1400" baseline="-25000" dirty="0">
+                <a:solidFill>
+                  <a:schemeClr val="accent4"/>
+                </a:solidFill>
+                <a:sym typeface="Symbol" pitchFamily="2" charset="2"/>
+              </a:rPr>
+              <a:t>1</a:t>
+            </a:r>
+            <a:r>
+              <a:rPr lang="en-GB" sz="1400" dirty="0">
+                <a:solidFill>
+                  <a:schemeClr val="accent4"/>
+                </a:solidFill>
+                <a:sym typeface="Symbol" pitchFamily="2" charset="2"/>
+              </a:rPr>
+              <a:t>*</a:t>
+            </a:r>
+            <a:r>
+              <a:rPr lang="en-CH" sz="1400" baseline="-25000" dirty="0">
+                <a:solidFill>
+                  <a:schemeClr val="accent4"/>
+                </a:solidFill>
+                <a:sym typeface="Symbol" pitchFamily="2" charset="2"/>
+              </a:rPr>
+              <a:t>1</a:t>
+            </a:r>
+            <a:r>
+              <a:rPr lang="en-CH" sz="1400" dirty="0">
+                <a:solidFill>
+                  <a:schemeClr val="accent4"/>
+                </a:solidFill>
+                <a:sym typeface="Symbol" pitchFamily="2" charset="2"/>
+              </a:rPr>
+              <a:t>*</a:t>
+            </a:r>
+            <a:r>
+              <a:rPr lang="en-CH" sz="1400" dirty="0">
+                <a:solidFill>
+                  <a:srgbClr val="FF0000"/>
+                </a:solidFill>
+                <a:sym typeface="Symbol" pitchFamily="2" charset="2"/>
+              </a:rPr>
+              <a:t>Switch</a:t>
+            </a:r>
+            <a:endParaRPr lang="en-CH" sz="1400" baseline="-25000" dirty="0">
+              <a:solidFill>
+                <a:srgbClr val="FF0000"/>
+              </a:solidFill>
+            </a:endParaRPr>
+          </a:p>
+        </p:txBody>
+      </p:sp>
+      <p:sp>
+        <p:nvSpPr>
+          <p:cNvPr id="104" name="TextBox 103">
+            <a:extLst>
+              <a:ext uri="{FF2B5EF4-FFF2-40B4-BE49-F238E27FC236}">
+                <a16:creationId xmlns:a16="http://schemas.microsoft.com/office/drawing/2014/main" id="{27321372-D3EA-2910-EB15-25BF70C051F7}"/>
+              </a:ext>
+            </a:extLst>
+          </p:cNvPr>
+          <p:cNvSpPr txBox="1"/>
+          <p:nvPr/>
+        </p:nvSpPr>
+        <p:spPr>
+          <a:xfrm>
+            <a:off x="6757769" y="2333570"/>
+            <a:ext cx="1378698" cy="307777"/>
+          </a:xfrm>
+          <a:prstGeom prst="rect">
+            <a:avLst/>
+          </a:prstGeom>
+          <a:noFill/>
+        </p:spPr>
+        <p:txBody>
+          <a:bodyPr wrap="square" rtlCol="0">
+            <a:spAutoFit/>
+          </a:bodyPr>
+          <a:lstStyle/>
+          <a:p>
+            <a:r>
+              <a:rPr lang="en-CH" sz="1400" dirty="0">
+                <a:solidFill>
+                  <a:schemeClr val="accent4"/>
+                </a:solidFill>
+              </a:rPr>
+              <a:t>Pr</a:t>
+            </a:r>
+            <a:r>
+              <a:rPr lang="en-GB" sz="1400" dirty="0">
+                <a:solidFill>
+                  <a:schemeClr val="accent4"/>
+                </a:solidFill>
+                <a:sym typeface="Symbol" pitchFamily="2" charset="2"/>
+              </a:rPr>
+              <a:t>R</a:t>
+            </a:r>
+            <a:r>
+              <a:rPr lang="en-GB" sz="1400" baseline="-25000" dirty="0">
+                <a:solidFill>
+                  <a:schemeClr val="accent4"/>
+                </a:solidFill>
+                <a:sym typeface="Symbol" pitchFamily="2" charset="2"/>
+              </a:rPr>
+              <a:t>2</a:t>
+            </a:r>
+            <a:r>
+              <a:rPr lang="en-GB" sz="1400" dirty="0">
+                <a:solidFill>
+                  <a:schemeClr val="accent4"/>
+                </a:solidFill>
+                <a:sym typeface="Symbol" pitchFamily="2" charset="2"/>
+              </a:rPr>
+              <a:t>*</a:t>
+            </a:r>
+            <a:r>
+              <a:rPr lang="en-CH" sz="1400" baseline="-25000" dirty="0">
+                <a:solidFill>
+                  <a:schemeClr val="accent4"/>
+                </a:solidFill>
+                <a:sym typeface="Symbol" pitchFamily="2" charset="2"/>
+              </a:rPr>
+              <a:t>2</a:t>
+            </a:r>
+            <a:r>
+              <a:rPr lang="en-CH" sz="1400" dirty="0">
+                <a:solidFill>
+                  <a:schemeClr val="accent4"/>
+                </a:solidFill>
+                <a:sym typeface="Symbol" pitchFamily="2" charset="2"/>
+              </a:rPr>
+              <a:t>*</a:t>
+            </a:r>
+            <a:r>
+              <a:rPr lang="en-CH" sz="1400" dirty="0">
+                <a:solidFill>
+                  <a:srgbClr val="FF0000"/>
+                </a:solidFill>
+                <a:sym typeface="Symbol" pitchFamily="2" charset="2"/>
+              </a:rPr>
+              <a:t>Switch</a:t>
+            </a:r>
+            <a:endParaRPr lang="en-CH" sz="1400" baseline="-25000" dirty="0">
+              <a:solidFill>
+                <a:srgbClr val="FF0000"/>
+              </a:solidFill>
+            </a:endParaRPr>
+          </a:p>
+        </p:txBody>
+      </p:sp>
+      <p:sp>
+        <p:nvSpPr>
+          <p:cNvPr id="105" name="TextBox 104">
+            <a:extLst>
+              <a:ext uri="{FF2B5EF4-FFF2-40B4-BE49-F238E27FC236}">
+                <a16:creationId xmlns:a16="http://schemas.microsoft.com/office/drawing/2014/main" id="{8E498B8C-A9D1-7A7C-F693-F5E61AA7665A}"/>
+              </a:ext>
+            </a:extLst>
+          </p:cNvPr>
+          <p:cNvSpPr txBox="1"/>
+          <p:nvPr/>
+        </p:nvSpPr>
+        <p:spPr>
+          <a:xfrm>
+            <a:off x="2645138" y="4574687"/>
+            <a:ext cx="1037541" cy="308065"/>
+          </a:xfrm>
+          <a:prstGeom prst="rect">
+            <a:avLst/>
+          </a:prstGeom>
+          <a:noFill/>
+        </p:spPr>
+        <p:txBody>
+          <a:bodyPr wrap="square" rtlCol="0">
+            <a:spAutoFit/>
+          </a:bodyPr>
+          <a:lstStyle/>
+          <a:p>
+            <a:r>
+              <a:rPr lang="en-CH" sz="1400" dirty="0">
+                <a:solidFill>
+                  <a:schemeClr val="accent4"/>
+                </a:solidFill>
+              </a:rPr>
+              <a:t>Pr*R</a:t>
+            </a:r>
+            <a:r>
+              <a:rPr lang="en-CH" sz="1400" baseline="-25000" dirty="0">
+                <a:solidFill>
+                  <a:schemeClr val="accent4"/>
+                </a:solidFill>
+              </a:rPr>
+              <a:t>2</a:t>
+            </a:r>
+            <a:r>
+              <a:rPr lang="en-GB" sz="1400" dirty="0">
+                <a:solidFill>
+                  <a:schemeClr val="accent4"/>
+                </a:solidFill>
+                <a:sym typeface="Symbol" pitchFamily="2" charset="2"/>
+              </a:rPr>
+              <a:t>*</a:t>
+            </a:r>
+            <a:r>
+              <a:rPr lang="el-GR" sz="1400" dirty="0">
+                <a:solidFill>
+                  <a:schemeClr val="accent4"/>
+                </a:solidFill>
+              </a:rPr>
+              <a:t>ρ</a:t>
+            </a:r>
+            <a:r>
+              <a:rPr lang="de-CH" sz="1400" dirty="0">
+                <a:solidFill>
+                  <a:schemeClr val="accent4"/>
+                </a:solidFill>
+              </a:rPr>
+              <a:t>*</a:t>
+            </a:r>
+            <a:r>
+              <a:rPr lang="en-GB" sz="1400" dirty="0">
+                <a:solidFill>
+                  <a:schemeClr val="accent4"/>
+                </a:solidFill>
+                <a:sym typeface="Symbol" pitchFamily="2" charset="2"/>
+              </a:rPr>
+              <a:t></a:t>
+            </a:r>
+            <a:r>
+              <a:rPr lang="en-CH" sz="1400" baseline="-25000" dirty="0">
+                <a:solidFill>
+                  <a:schemeClr val="accent4"/>
+                </a:solidFill>
+                <a:sym typeface="Symbol" pitchFamily="2" charset="2"/>
+              </a:rPr>
+              <a:t>2</a:t>
+            </a:r>
+            <a:endParaRPr lang="en-CH" sz="1400" baseline="-25000" dirty="0">
+              <a:solidFill>
+                <a:schemeClr val="accent4"/>
+              </a:solidFill>
+            </a:endParaRPr>
+          </a:p>
+        </p:txBody>
+      </p:sp>
+      <p:sp>
+        <p:nvSpPr>
+          <p:cNvPr id="106" name="TextBox 105">
+            <a:extLst>
+              <a:ext uri="{FF2B5EF4-FFF2-40B4-BE49-F238E27FC236}">
+                <a16:creationId xmlns:a16="http://schemas.microsoft.com/office/drawing/2014/main" id="{238DB56C-F814-8170-1B59-65CFA38AFAE9}"/>
+              </a:ext>
+            </a:extLst>
+          </p:cNvPr>
+          <p:cNvSpPr txBox="1"/>
+          <p:nvPr/>
+        </p:nvSpPr>
+        <p:spPr>
+          <a:xfrm>
+            <a:off x="5450568" y="2207310"/>
+            <a:ext cx="1113358" cy="308065"/>
+          </a:xfrm>
+          <a:prstGeom prst="rect">
+            <a:avLst/>
+          </a:prstGeom>
+          <a:noFill/>
+        </p:spPr>
+        <p:txBody>
+          <a:bodyPr wrap="square" rtlCol="0">
+            <a:spAutoFit/>
+          </a:bodyPr>
+          <a:lstStyle/>
+          <a:p>
+            <a:r>
+              <a:rPr lang="en-CH" sz="1400" dirty="0">
+                <a:solidFill>
+                  <a:schemeClr val="accent4"/>
+                </a:solidFill>
+              </a:rPr>
+              <a:t>PrR</a:t>
+            </a:r>
+            <a:r>
+              <a:rPr lang="en-CH" sz="1400" baseline="-25000" dirty="0">
+                <a:solidFill>
+                  <a:schemeClr val="accent4"/>
+                </a:solidFill>
+              </a:rPr>
+              <a:t>1</a:t>
+            </a:r>
+            <a:r>
+              <a:rPr lang="en-GB" sz="1400" dirty="0">
+                <a:solidFill>
+                  <a:schemeClr val="accent4"/>
+                </a:solidFill>
+                <a:sym typeface="Symbol" pitchFamily="2" charset="2"/>
+              </a:rPr>
+              <a:t>(1-</a:t>
+            </a:r>
+            <a:r>
+              <a:rPr lang="el-GR" sz="1400" dirty="0">
+                <a:solidFill>
+                  <a:schemeClr val="accent4"/>
+                </a:solidFill>
+              </a:rPr>
+              <a:t>ρ</a:t>
+            </a:r>
+            <a:r>
+              <a:rPr lang="de-CH" sz="1400" dirty="0">
+                <a:solidFill>
+                  <a:schemeClr val="accent4"/>
+                </a:solidFill>
+              </a:rPr>
+              <a:t>)*</a:t>
+            </a:r>
+            <a:r>
+              <a:rPr lang="en-GB" sz="1400" dirty="0">
+                <a:solidFill>
+                  <a:schemeClr val="accent4"/>
+                </a:solidFill>
+                <a:sym typeface="Symbol" pitchFamily="2" charset="2"/>
+              </a:rPr>
+              <a:t></a:t>
+            </a:r>
+            <a:r>
+              <a:rPr lang="en-CH" sz="1400" baseline="-25000" dirty="0">
+                <a:solidFill>
+                  <a:schemeClr val="accent4"/>
+                </a:solidFill>
+                <a:sym typeface="Symbol" pitchFamily="2" charset="2"/>
+              </a:rPr>
+              <a:t>1</a:t>
+            </a:r>
+            <a:endParaRPr lang="en-CH" sz="1400" baseline="-25000" dirty="0">
+              <a:solidFill>
+                <a:schemeClr val="accent4"/>
+              </a:solidFill>
+            </a:endParaRPr>
+          </a:p>
+        </p:txBody>
+      </p:sp>
+      <p:sp>
+        <p:nvSpPr>
+          <p:cNvPr id="108" name="TextBox 107">
+            <a:extLst>
+              <a:ext uri="{FF2B5EF4-FFF2-40B4-BE49-F238E27FC236}">
+                <a16:creationId xmlns:a16="http://schemas.microsoft.com/office/drawing/2014/main" id="{6D59673C-C2C0-5ABD-85E2-995D8C2615D1}"/>
+              </a:ext>
+            </a:extLst>
+          </p:cNvPr>
+          <p:cNvSpPr txBox="1"/>
+          <p:nvPr/>
+        </p:nvSpPr>
+        <p:spPr>
+          <a:xfrm>
+            <a:off x="5473874" y="4364956"/>
+            <a:ext cx="1113358" cy="308065"/>
+          </a:xfrm>
+          <a:prstGeom prst="rect">
+            <a:avLst/>
+          </a:prstGeom>
+          <a:noFill/>
+        </p:spPr>
+        <p:txBody>
+          <a:bodyPr wrap="square" rtlCol="0">
+            <a:spAutoFit/>
+          </a:bodyPr>
+          <a:lstStyle/>
+          <a:p>
+            <a:r>
+              <a:rPr lang="en-CH" sz="1400" dirty="0">
+                <a:solidFill>
+                  <a:schemeClr val="accent4"/>
+                </a:solidFill>
+              </a:rPr>
+              <a:t>PrR</a:t>
+            </a:r>
+            <a:r>
+              <a:rPr lang="en-CH" sz="1400" baseline="-25000" dirty="0">
+                <a:solidFill>
+                  <a:schemeClr val="accent4"/>
+                </a:solidFill>
+              </a:rPr>
+              <a:t>2</a:t>
+            </a:r>
+            <a:r>
+              <a:rPr lang="en-GB" sz="1400" dirty="0">
+                <a:solidFill>
+                  <a:schemeClr val="accent4"/>
+                </a:solidFill>
+                <a:sym typeface="Symbol" pitchFamily="2" charset="2"/>
+              </a:rPr>
+              <a:t>(1-</a:t>
+            </a:r>
+            <a:r>
+              <a:rPr lang="el-GR" sz="1400" dirty="0">
+                <a:solidFill>
+                  <a:schemeClr val="accent4"/>
+                </a:solidFill>
+              </a:rPr>
+              <a:t>ρ</a:t>
+            </a:r>
+            <a:r>
+              <a:rPr lang="de-CH" sz="1400" dirty="0">
+                <a:solidFill>
+                  <a:schemeClr val="accent4"/>
+                </a:solidFill>
+              </a:rPr>
+              <a:t>)*</a:t>
+            </a:r>
+            <a:r>
+              <a:rPr lang="en-GB" sz="1400" dirty="0">
+                <a:solidFill>
+                  <a:schemeClr val="accent4"/>
+                </a:solidFill>
+                <a:sym typeface="Symbol" pitchFamily="2" charset="2"/>
+              </a:rPr>
+              <a:t></a:t>
+            </a:r>
+            <a:r>
+              <a:rPr lang="en-CH" sz="1400" baseline="-25000" dirty="0">
+                <a:solidFill>
+                  <a:schemeClr val="accent4"/>
+                </a:solidFill>
+                <a:sym typeface="Symbol" pitchFamily="2" charset="2"/>
+              </a:rPr>
+              <a:t>2</a:t>
+            </a:r>
+            <a:endParaRPr lang="en-CH" sz="1400" baseline="-25000" dirty="0">
+              <a:solidFill>
+                <a:schemeClr val="accent4"/>
+              </a:solidFill>
+            </a:endParaRPr>
+          </a:p>
+        </p:txBody>
+      </p:sp>
+      <p:sp>
+        <p:nvSpPr>
+          <p:cNvPr id="3" name="TextBox 2">
+            <a:extLst>
+              <a:ext uri="{FF2B5EF4-FFF2-40B4-BE49-F238E27FC236}">
+                <a16:creationId xmlns:a16="http://schemas.microsoft.com/office/drawing/2014/main" id="{6FEC2630-F3A4-5A05-2AFF-AF3A3B69B579}"/>
+              </a:ext>
+            </a:extLst>
+          </p:cNvPr>
+          <p:cNvSpPr txBox="1"/>
+          <p:nvPr/>
+        </p:nvSpPr>
+        <p:spPr>
+          <a:xfrm>
+            <a:off x="8703734" y="1515533"/>
+            <a:ext cx="2965242" cy="2862322"/>
+          </a:xfrm>
+          <a:prstGeom prst="rect">
+            <a:avLst/>
+          </a:prstGeom>
+          <a:noFill/>
+        </p:spPr>
+        <p:txBody>
+          <a:bodyPr wrap="square" rtlCol="0">
+            <a:spAutoFit/>
+          </a:bodyPr>
+          <a:lstStyle/>
+          <a:p>
+            <a:r>
+              <a:rPr lang="en-CH" b="1" u="sng" dirty="0"/>
+              <a:t>Switch Parameter</a:t>
+            </a:r>
+          </a:p>
+          <a:p>
+            <a:r>
+              <a:rPr lang="en-CH" dirty="0"/>
+              <a:t>Binary switch turning ability for prophylaxis to “treat” resistant infections on and off</a:t>
+            </a:r>
+          </a:p>
+          <a:p>
+            <a:endParaRPr lang="en-CH" dirty="0">
+              <a:sym typeface="Symbol" pitchFamily="2" charset="2"/>
+            </a:endParaRPr>
+          </a:p>
+          <a:p>
+            <a:r>
+              <a:rPr lang="en-GB" b="1" u="sng" dirty="0">
+                <a:sym typeface="Symbol" pitchFamily="2" charset="2"/>
+              </a:rPr>
+              <a:t> Parameter</a:t>
+            </a:r>
+          </a:p>
+          <a:p>
+            <a:r>
+              <a:rPr lang="en-GB" dirty="0">
+                <a:sym typeface="Symbol" pitchFamily="2" charset="2"/>
+              </a:rPr>
+              <a:t>Scaling Parameter modulating ability for prophylaxis to “treat” WT colonised individuals </a:t>
+            </a:r>
+            <a:endParaRPr lang="en-CH" dirty="0"/>
+          </a:p>
+        </p:txBody>
+      </p:sp>
+    </p:spTree>
+    <p:extLst>
+      <p:ext uri="{BB962C8B-B14F-4D97-AF65-F5344CB8AC3E}">
+        <p14:creationId xmlns:p14="http://schemas.microsoft.com/office/powerpoint/2010/main" val="1195199264"/>
+      </p:ext>
+    </p:extLst>
+  </p:cSld>
+  <p:clrMapOvr>
+    <a:masterClrMapping/>
+  </p:clrMapOvr>
+</p:sld>
+</file>
+
+<file path=ppt/slides/slide7.xml><?xml version="1.0" encoding="utf-8"?>
+<p:sld xmlns:a="http://schemas.openxmlformats.org/drawingml/2006/main" xmlns:r="http://schemas.openxmlformats.org/officeDocument/2006/relationships" xmlns:p="http://schemas.openxmlformats.org/presentationml/2006/main">
+  <p:cSld>
+    <p:spTree>
+      <p:nvGrpSpPr>
+        <p:cNvPr id="1" name=""/>
+        <p:cNvGrpSpPr/>
+        <p:nvPr/>
+      </p:nvGrpSpPr>
+      <p:grpSpPr>
+        <a:xfrm>
+          <a:off x="0" y="0"/>
+          <a:ext cx="0" cy="0"/>
+          <a:chOff x="0" y="0"/>
+          <a:chExt cx="0" cy="0"/>
+        </a:xfrm>
+      </p:grpSpPr>
+      <p:sp>
+        <p:nvSpPr>
           <p:cNvPr id="2" name="Title 1">
             <a:extLst>
               <a:ext uri="{FF2B5EF4-FFF2-40B4-BE49-F238E27FC236}">
@@ -19834,7 +21638,7 @@
 </p:sld>
 </file>
 
-<file path=ppt/slides/slide7.xml><?xml version="1.0" encoding="utf-8"?>
+<file path=ppt/slides/slide8.xml><?xml version="1.0" encoding="utf-8"?>
 <p:sld xmlns:a="http://schemas.openxmlformats.org/drawingml/2006/main" xmlns:r="http://schemas.openxmlformats.org/officeDocument/2006/relationships" xmlns:p="http://schemas.openxmlformats.org/presentationml/2006/main">
   <p:cSld>
     <p:spTree>

</xml_diff>